<commit_message>
FC gets ApiSegment too
</commit_message>
<xml_diff>
--- a/doc/ElementsApplicationPattern/Names/StructureOfUuids/pictures/uuid-structure.pptx
+++ b/doc/ElementsApplicationPattern/Names/StructureOfUuids/pictures/uuid-structure.pptx
@@ -104,6 +104,11 @@
       </a:defRPr>
     </a:lvl9pPr>
   </p:defaultTextStyle>
+  <p:extLst>
+    <p:ext uri="{EFAFB233-063F-42B5-8137-9DF3F51BA10A}">
+      <p15:sldGuideLst xmlns:p15="http://schemas.microsoft.com/office/powerpoint/2012/main"/>
+    </p:ext>
+  </p:extLst>
 </p:presentation>
 </file>
 
@@ -149,10 +154,9 @@
           </a:lstStyle>
           <a:p>
             <a:r>
-              <a:rPr lang="de-DE" smtClean="0"/>
+              <a:rPr lang="de-DE"/>
               <a:t>Titelmasterformat durch Klicken bearbeiten</a:t>
             </a:r>
-            <a:endParaRPr lang="de-DE"/>
           </a:p>
         </p:txBody>
       </p:sp>
@@ -214,10 +218,9 @@
           </a:lstStyle>
           <a:p>
             <a:r>
-              <a:rPr lang="de-DE" smtClean="0"/>
+              <a:rPr lang="de-DE"/>
               <a:t>Formatvorlage des Untertitelmasters durch Klicken bearbeiten</a:t>
             </a:r>
-            <a:endParaRPr lang="de-DE"/>
           </a:p>
         </p:txBody>
       </p:sp>
@@ -238,7 +241,7 @@
           <a:p>
             <a:fld id="{C1068C6F-CF2F-4201-9BAA-A88518D20D6F}" type="datetimeFigureOut">
               <a:rPr lang="de-DE" smtClean="0"/>
-              <a:t>27.07.2022</a:t>
+              <a:t>03.08.2022</a:t>
             </a:fld>
             <a:endParaRPr lang="de-DE"/>
           </a:p>
@@ -332,10 +335,9 @@
           <a:lstStyle/>
           <a:p>
             <a:r>
-              <a:rPr lang="de-DE" smtClean="0"/>
+              <a:rPr lang="de-DE"/>
               <a:t>Titelmasterformat durch Klicken bearbeiten</a:t>
             </a:r>
-            <a:endParaRPr lang="de-DE"/>
           </a:p>
         </p:txBody>
       </p:sp>
@@ -356,38 +358,37 @@
           <a:p>
             <a:pPr lvl="0"/>
             <a:r>
-              <a:rPr lang="de-DE" smtClean="0"/>
+              <a:rPr lang="de-DE"/>
               <a:t>Textmasterformat bearbeiten</a:t>
             </a:r>
           </a:p>
           <a:p>
             <a:pPr lvl="1"/>
             <a:r>
-              <a:rPr lang="de-DE" smtClean="0"/>
+              <a:rPr lang="de-DE"/>
               <a:t>Zweite Ebene</a:t>
             </a:r>
           </a:p>
           <a:p>
             <a:pPr lvl="2"/>
             <a:r>
-              <a:rPr lang="de-DE" smtClean="0"/>
+              <a:rPr lang="de-DE"/>
               <a:t>Dritte Ebene</a:t>
             </a:r>
           </a:p>
           <a:p>
             <a:pPr lvl="3"/>
             <a:r>
-              <a:rPr lang="de-DE" smtClean="0"/>
+              <a:rPr lang="de-DE"/>
               <a:t>Vierte Ebene</a:t>
             </a:r>
           </a:p>
           <a:p>
             <a:pPr lvl="4"/>
             <a:r>
-              <a:rPr lang="de-DE" smtClean="0"/>
+              <a:rPr lang="de-DE"/>
               <a:t>Fünfte Ebene</a:t>
             </a:r>
-            <a:endParaRPr lang="de-DE"/>
           </a:p>
         </p:txBody>
       </p:sp>
@@ -408,7 +409,7 @@
           <a:p>
             <a:fld id="{C1068C6F-CF2F-4201-9BAA-A88518D20D6F}" type="datetimeFigureOut">
               <a:rPr lang="de-DE" smtClean="0"/>
-              <a:t>27.07.2022</a:t>
+              <a:t>03.08.2022</a:t>
             </a:fld>
             <a:endParaRPr lang="de-DE"/>
           </a:p>
@@ -507,10 +508,9 @@
           <a:lstStyle/>
           <a:p>
             <a:r>
-              <a:rPr lang="de-DE" smtClean="0"/>
+              <a:rPr lang="de-DE"/>
               <a:t>Titelmasterformat durch Klicken bearbeiten</a:t>
             </a:r>
-            <a:endParaRPr lang="de-DE"/>
           </a:p>
         </p:txBody>
       </p:sp>
@@ -536,38 +536,37 @@
           <a:p>
             <a:pPr lvl="0"/>
             <a:r>
-              <a:rPr lang="de-DE" smtClean="0"/>
+              <a:rPr lang="de-DE"/>
               <a:t>Textmasterformat bearbeiten</a:t>
             </a:r>
           </a:p>
           <a:p>
             <a:pPr lvl="1"/>
             <a:r>
-              <a:rPr lang="de-DE" smtClean="0"/>
+              <a:rPr lang="de-DE"/>
               <a:t>Zweite Ebene</a:t>
             </a:r>
           </a:p>
           <a:p>
             <a:pPr lvl="2"/>
             <a:r>
-              <a:rPr lang="de-DE" smtClean="0"/>
+              <a:rPr lang="de-DE"/>
               <a:t>Dritte Ebene</a:t>
             </a:r>
           </a:p>
           <a:p>
             <a:pPr lvl="3"/>
             <a:r>
-              <a:rPr lang="de-DE" smtClean="0"/>
+              <a:rPr lang="de-DE"/>
               <a:t>Vierte Ebene</a:t>
             </a:r>
           </a:p>
           <a:p>
             <a:pPr lvl="4"/>
             <a:r>
-              <a:rPr lang="de-DE" smtClean="0"/>
+              <a:rPr lang="de-DE"/>
               <a:t>Fünfte Ebene</a:t>
             </a:r>
-            <a:endParaRPr lang="de-DE"/>
           </a:p>
         </p:txBody>
       </p:sp>
@@ -588,7 +587,7 @@
           <a:p>
             <a:fld id="{C1068C6F-CF2F-4201-9BAA-A88518D20D6F}" type="datetimeFigureOut">
               <a:rPr lang="de-DE" smtClean="0"/>
-              <a:t>27.07.2022</a:t>
+              <a:t>03.08.2022</a:t>
             </a:fld>
             <a:endParaRPr lang="de-DE"/>
           </a:p>
@@ -682,10 +681,9 @@
           <a:lstStyle/>
           <a:p>
             <a:r>
-              <a:rPr lang="de-DE" smtClean="0"/>
+              <a:rPr lang="de-DE"/>
               <a:t>Titelmasterformat durch Klicken bearbeiten</a:t>
             </a:r>
-            <a:endParaRPr lang="de-DE"/>
           </a:p>
         </p:txBody>
       </p:sp>
@@ -706,38 +704,37 @@
           <a:p>
             <a:pPr lvl="0"/>
             <a:r>
-              <a:rPr lang="de-DE" smtClean="0"/>
+              <a:rPr lang="de-DE"/>
               <a:t>Textmasterformat bearbeiten</a:t>
             </a:r>
           </a:p>
           <a:p>
             <a:pPr lvl="1"/>
             <a:r>
-              <a:rPr lang="de-DE" smtClean="0"/>
+              <a:rPr lang="de-DE"/>
               <a:t>Zweite Ebene</a:t>
             </a:r>
           </a:p>
           <a:p>
             <a:pPr lvl="2"/>
             <a:r>
-              <a:rPr lang="de-DE" smtClean="0"/>
+              <a:rPr lang="de-DE"/>
               <a:t>Dritte Ebene</a:t>
             </a:r>
           </a:p>
           <a:p>
             <a:pPr lvl="3"/>
             <a:r>
-              <a:rPr lang="de-DE" smtClean="0"/>
+              <a:rPr lang="de-DE"/>
               <a:t>Vierte Ebene</a:t>
             </a:r>
           </a:p>
           <a:p>
             <a:pPr lvl="4"/>
             <a:r>
-              <a:rPr lang="de-DE" smtClean="0"/>
+              <a:rPr lang="de-DE"/>
               <a:t>Fünfte Ebene</a:t>
             </a:r>
-            <a:endParaRPr lang="de-DE"/>
           </a:p>
         </p:txBody>
       </p:sp>
@@ -758,7 +755,7 @@
           <a:p>
             <a:fld id="{C1068C6F-CF2F-4201-9BAA-A88518D20D6F}" type="datetimeFigureOut">
               <a:rPr lang="de-DE" smtClean="0"/>
-              <a:t>27.07.2022</a:t>
+              <a:t>03.08.2022</a:t>
             </a:fld>
             <a:endParaRPr lang="de-DE"/>
           </a:p>
@@ -861,10 +858,9 @@
           </a:lstStyle>
           <a:p>
             <a:r>
-              <a:rPr lang="de-DE" smtClean="0"/>
+              <a:rPr lang="de-DE"/>
               <a:t>Titelmasterformat durch Klicken bearbeiten</a:t>
             </a:r>
-            <a:endParaRPr lang="de-DE"/>
           </a:p>
         </p:txBody>
       </p:sp>
@@ -981,7 +977,7 @@
           <a:p>
             <a:pPr lvl="0"/>
             <a:r>
-              <a:rPr lang="de-DE" smtClean="0"/>
+              <a:rPr lang="de-DE"/>
               <a:t>Textmasterformat bearbeiten</a:t>
             </a:r>
           </a:p>
@@ -1004,7 +1000,7 @@
           <a:p>
             <a:fld id="{C1068C6F-CF2F-4201-9BAA-A88518D20D6F}" type="datetimeFigureOut">
               <a:rPr lang="de-DE" smtClean="0"/>
-              <a:t>27.07.2022</a:t>
+              <a:t>03.08.2022</a:t>
             </a:fld>
             <a:endParaRPr lang="de-DE"/>
           </a:p>
@@ -1098,10 +1094,9 @@
           <a:lstStyle/>
           <a:p>
             <a:r>
-              <a:rPr lang="de-DE" smtClean="0"/>
+              <a:rPr lang="de-DE"/>
               <a:t>Titelmasterformat durch Klicken bearbeiten</a:t>
             </a:r>
-            <a:endParaRPr lang="de-DE"/>
           </a:p>
         </p:txBody>
       </p:sp>
@@ -1127,38 +1122,37 @@
           <a:p>
             <a:pPr lvl="0"/>
             <a:r>
-              <a:rPr lang="de-DE" smtClean="0"/>
+              <a:rPr lang="de-DE"/>
               <a:t>Textmasterformat bearbeiten</a:t>
             </a:r>
           </a:p>
           <a:p>
             <a:pPr lvl="1"/>
             <a:r>
-              <a:rPr lang="de-DE" smtClean="0"/>
+              <a:rPr lang="de-DE"/>
               <a:t>Zweite Ebene</a:t>
             </a:r>
           </a:p>
           <a:p>
             <a:pPr lvl="2"/>
             <a:r>
-              <a:rPr lang="de-DE" smtClean="0"/>
+              <a:rPr lang="de-DE"/>
               <a:t>Dritte Ebene</a:t>
             </a:r>
           </a:p>
           <a:p>
             <a:pPr lvl="3"/>
             <a:r>
-              <a:rPr lang="de-DE" smtClean="0"/>
+              <a:rPr lang="de-DE"/>
               <a:t>Vierte Ebene</a:t>
             </a:r>
           </a:p>
           <a:p>
             <a:pPr lvl="4"/>
             <a:r>
-              <a:rPr lang="de-DE" smtClean="0"/>
+              <a:rPr lang="de-DE"/>
               <a:t>Fünfte Ebene</a:t>
             </a:r>
-            <a:endParaRPr lang="de-DE"/>
           </a:p>
         </p:txBody>
       </p:sp>
@@ -1184,38 +1178,37 @@
           <a:p>
             <a:pPr lvl="0"/>
             <a:r>
-              <a:rPr lang="de-DE" smtClean="0"/>
+              <a:rPr lang="de-DE"/>
               <a:t>Textmasterformat bearbeiten</a:t>
             </a:r>
           </a:p>
           <a:p>
             <a:pPr lvl="1"/>
             <a:r>
-              <a:rPr lang="de-DE" smtClean="0"/>
+              <a:rPr lang="de-DE"/>
               <a:t>Zweite Ebene</a:t>
             </a:r>
           </a:p>
           <a:p>
             <a:pPr lvl="2"/>
             <a:r>
-              <a:rPr lang="de-DE" smtClean="0"/>
+              <a:rPr lang="de-DE"/>
               <a:t>Dritte Ebene</a:t>
             </a:r>
           </a:p>
           <a:p>
             <a:pPr lvl="3"/>
             <a:r>
-              <a:rPr lang="de-DE" smtClean="0"/>
+              <a:rPr lang="de-DE"/>
               <a:t>Vierte Ebene</a:t>
             </a:r>
           </a:p>
           <a:p>
             <a:pPr lvl="4"/>
             <a:r>
-              <a:rPr lang="de-DE" smtClean="0"/>
+              <a:rPr lang="de-DE"/>
               <a:t>Fünfte Ebene</a:t>
             </a:r>
-            <a:endParaRPr lang="de-DE"/>
           </a:p>
         </p:txBody>
       </p:sp>
@@ -1236,7 +1229,7 @@
           <a:p>
             <a:fld id="{C1068C6F-CF2F-4201-9BAA-A88518D20D6F}" type="datetimeFigureOut">
               <a:rPr lang="de-DE" smtClean="0"/>
-              <a:t>27.07.2022</a:t>
+              <a:t>03.08.2022</a:t>
             </a:fld>
             <a:endParaRPr lang="de-DE"/>
           </a:p>
@@ -1335,10 +1328,9 @@
           <a:lstStyle/>
           <a:p>
             <a:r>
-              <a:rPr lang="de-DE" smtClean="0"/>
+              <a:rPr lang="de-DE"/>
               <a:t>Titelmasterformat durch Klicken bearbeiten</a:t>
             </a:r>
-            <a:endParaRPr lang="de-DE"/>
           </a:p>
         </p:txBody>
       </p:sp>
@@ -1401,7 +1393,7 @@
           <a:p>
             <a:pPr lvl="0"/>
             <a:r>
-              <a:rPr lang="de-DE" smtClean="0"/>
+              <a:rPr lang="de-DE"/>
               <a:t>Textmasterformat bearbeiten</a:t>
             </a:r>
           </a:p>
@@ -1429,38 +1421,37 @@
           <a:p>
             <a:pPr lvl="0"/>
             <a:r>
-              <a:rPr lang="de-DE" smtClean="0"/>
+              <a:rPr lang="de-DE"/>
               <a:t>Textmasterformat bearbeiten</a:t>
             </a:r>
           </a:p>
           <a:p>
             <a:pPr lvl="1"/>
             <a:r>
-              <a:rPr lang="de-DE" smtClean="0"/>
+              <a:rPr lang="de-DE"/>
               <a:t>Zweite Ebene</a:t>
             </a:r>
           </a:p>
           <a:p>
             <a:pPr lvl="2"/>
             <a:r>
-              <a:rPr lang="de-DE" smtClean="0"/>
+              <a:rPr lang="de-DE"/>
               <a:t>Dritte Ebene</a:t>
             </a:r>
           </a:p>
           <a:p>
             <a:pPr lvl="3"/>
             <a:r>
-              <a:rPr lang="de-DE" smtClean="0"/>
+              <a:rPr lang="de-DE"/>
               <a:t>Vierte Ebene</a:t>
             </a:r>
           </a:p>
           <a:p>
             <a:pPr lvl="4"/>
             <a:r>
-              <a:rPr lang="de-DE" smtClean="0"/>
+              <a:rPr lang="de-DE"/>
               <a:t>Fünfte Ebene</a:t>
             </a:r>
-            <a:endParaRPr lang="de-DE"/>
           </a:p>
         </p:txBody>
       </p:sp>
@@ -1523,7 +1514,7 @@
           <a:p>
             <a:pPr lvl="0"/>
             <a:r>
-              <a:rPr lang="de-DE" smtClean="0"/>
+              <a:rPr lang="de-DE"/>
               <a:t>Textmasterformat bearbeiten</a:t>
             </a:r>
           </a:p>
@@ -1551,38 +1542,37 @@
           <a:p>
             <a:pPr lvl="0"/>
             <a:r>
-              <a:rPr lang="de-DE" smtClean="0"/>
+              <a:rPr lang="de-DE"/>
               <a:t>Textmasterformat bearbeiten</a:t>
             </a:r>
           </a:p>
           <a:p>
             <a:pPr lvl="1"/>
             <a:r>
-              <a:rPr lang="de-DE" smtClean="0"/>
+              <a:rPr lang="de-DE"/>
               <a:t>Zweite Ebene</a:t>
             </a:r>
           </a:p>
           <a:p>
             <a:pPr lvl="2"/>
             <a:r>
-              <a:rPr lang="de-DE" smtClean="0"/>
+              <a:rPr lang="de-DE"/>
               <a:t>Dritte Ebene</a:t>
             </a:r>
           </a:p>
           <a:p>
             <a:pPr lvl="3"/>
             <a:r>
-              <a:rPr lang="de-DE" smtClean="0"/>
+              <a:rPr lang="de-DE"/>
               <a:t>Vierte Ebene</a:t>
             </a:r>
           </a:p>
           <a:p>
             <a:pPr lvl="4"/>
             <a:r>
-              <a:rPr lang="de-DE" smtClean="0"/>
+              <a:rPr lang="de-DE"/>
               <a:t>Fünfte Ebene</a:t>
             </a:r>
-            <a:endParaRPr lang="de-DE"/>
           </a:p>
         </p:txBody>
       </p:sp>
@@ -1603,7 +1593,7 @@
           <a:p>
             <a:fld id="{C1068C6F-CF2F-4201-9BAA-A88518D20D6F}" type="datetimeFigureOut">
               <a:rPr lang="de-DE" smtClean="0"/>
-              <a:t>27.07.2022</a:t>
+              <a:t>03.08.2022</a:t>
             </a:fld>
             <a:endParaRPr lang="de-DE"/>
           </a:p>
@@ -1697,10 +1687,9 @@
           <a:lstStyle/>
           <a:p>
             <a:r>
-              <a:rPr lang="de-DE" smtClean="0"/>
+              <a:rPr lang="de-DE"/>
               <a:t>Titelmasterformat durch Klicken bearbeiten</a:t>
             </a:r>
-            <a:endParaRPr lang="de-DE"/>
           </a:p>
         </p:txBody>
       </p:sp>
@@ -1721,7 +1710,7 @@
           <a:p>
             <a:fld id="{C1068C6F-CF2F-4201-9BAA-A88518D20D6F}" type="datetimeFigureOut">
               <a:rPr lang="de-DE" smtClean="0"/>
-              <a:t>27.07.2022</a:t>
+              <a:t>03.08.2022</a:t>
             </a:fld>
             <a:endParaRPr lang="de-DE"/>
           </a:p>
@@ -1816,7 +1805,7 @@
           <a:p>
             <a:fld id="{C1068C6F-CF2F-4201-9BAA-A88518D20D6F}" type="datetimeFigureOut">
               <a:rPr lang="de-DE" smtClean="0"/>
-              <a:t>27.07.2022</a:t>
+              <a:t>03.08.2022</a:t>
             </a:fld>
             <a:endParaRPr lang="de-DE"/>
           </a:p>
@@ -1919,10 +1908,9 @@
           </a:lstStyle>
           <a:p>
             <a:r>
-              <a:rPr lang="de-DE" smtClean="0"/>
+              <a:rPr lang="de-DE"/>
               <a:t>Titelmasterformat durch Klicken bearbeiten</a:t>
             </a:r>
-            <a:endParaRPr lang="de-DE"/>
           </a:p>
         </p:txBody>
       </p:sp>
@@ -1976,38 +1964,37 @@
           <a:p>
             <a:pPr lvl="0"/>
             <a:r>
-              <a:rPr lang="de-DE" smtClean="0"/>
+              <a:rPr lang="de-DE"/>
               <a:t>Textmasterformat bearbeiten</a:t>
             </a:r>
           </a:p>
           <a:p>
             <a:pPr lvl="1"/>
             <a:r>
-              <a:rPr lang="de-DE" smtClean="0"/>
+              <a:rPr lang="de-DE"/>
               <a:t>Zweite Ebene</a:t>
             </a:r>
           </a:p>
           <a:p>
             <a:pPr lvl="2"/>
             <a:r>
-              <a:rPr lang="de-DE" smtClean="0"/>
+              <a:rPr lang="de-DE"/>
               <a:t>Dritte Ebene</a:t>
             </a:r>
           </a:p>
           <a:p>
             <a:pPr lvl="3"/>
             <a:r>
-              <a:rPr lang="de-DE" smtClean="0"/>
+              <a:rPr lang="de-DE"/>
               <a:t>Vierte Ebene</a:t>
             </a:r>
           </a:p>
           <a:p>
             <a:pPr lvl="4"/>
             <a:r>
-              <a:rPr lang="de-DE" smtClean="0"/>
+              <a:rPr lang="de-DE"/>
               <a:t>Fünfte Ebene</a:t>
             </a:r>
-            <a:endParaRPr lang="de-DE"/>
           </a:p>
         </p:txBody>
       </p:sp>
@@ -2070,7 +2057,7 @@
           <a:p>
             <a:pPr lvl="0"/>
             <a:r>
-              <a:rPr lang="de-DE" smtClean="0"/>
+              <a:rPr lang="de-DE"/>
               <a:t>Textmasterformat bearbeiten</a:t>
             </a:r>
           </a:p>
@@ -2093,7 +2080,7 @@
           <a:p>
             <a:fld id="{C1068C6F-CF2F-4201-9BAA-A88518D20D6F}" type="datetimeFigureOut">
               <a:rPr lang="de-DE" smtClean="0"/>
-              <a:t>27.07.2022</a:t>
+              <a:t>03.08.2022</a:t>
             </a:fld>
             <a:endParaRPr lang="de-DE"/>
           </a:p>
@@ -2196,10 +2183,9 @@
           </a:lstStyle>
           <a:p>
             <a:r>
-              <a:rPr lang="de-DE" smtClean="0"/>
+              <a:rPr lang="de-DE"/>
               <a:t>Titelmasterformat durch Klicken bearbeiten</a:t>
             </a:r>
-            <a:endParaRPr lang="de-DE"/>
           </a:p>
         </p:txBody>
       </p:sp>
@@ -2323,7 +2309,7 @@
           <a:p>
             <a:pPr lvl="0"/>
             <a:r>
-              <a:rPr lang="de-DE" smtClean="0"/>
+              <a:rPr lang="de-DE"/>
               <a:t>Textmasterformat bearbeiten</a:t>
             </a:r>
           </a:p>
@@ -2346,7 +2332,7 @@
           <a:p>
             <a:fld id="{C1068C6F-CF2F-4201-9BAA-A88518D20D6F}" type="datetimeFigureOut">
               <a:rPr lang="de-DE" smtClean="0"/>
-              <a:t>27.07.2022</a:t>
+              <a:t>03.08.2022</a:t>
             </a:fld>
             <a:endParaRPr lang="de-DE"/>
           </a:p>
@@ -2455,10 +2441,9 @@
           <a:lstStyle/>
           <a:p>
             <a:r>
-              <a:rPr lang="de-DE" smtClean="0"/>
+              <a:rPr lang="de-DE"/>
               <a:t>Titelmasterformat durch Klicken bearbeiten</a:t>
             </a:r>
-            <a:endParaRPr lang="de-DE"/>
           </a:p>
         </p:txBody>
       </p:sp>
@@ -2489,38 +2474,37 @@
           <a:p>
             <a:pPr lvl="0"/>
             <a:r>
-              <a:rPr lang="de-DE" smtClean="0"/>
+              <a:rPr lang="de-DE"/>
               <a:t>Textmasterformat bearbeiten</a:t>
             </a:r>
           </a:p>
           <a:p>
             <a:pPr lvl="1"/>
             <a:r>
-              <a:rPr lang="de-DE" smtClean="0"/>
+              <a:rPr lang="de-DE"/>
               <a:t>Zweite Ebene</a:t>
             </a:r>
           </a:p>
           <a:p>
             <a:pPr lvl="2"/>
             <a:r>
-              <a:rPr lang="de-DE" smtClean="0"/>
+              <a:rPr lang="de-DE"/>
               <a:t>Dritte Ebene</a:t>
             </a:r>
           </a:p>
           <a:p>
             <a:pPr lvl="3"/>
             <a:r>
-              <a:rPr lang="de-DE" smtClean="0"/>
+              <a:rPr lang="de-DE"/>
               <a:t>Vierte Ebene</a:t>
             </a:r>
           </a:p>
           <a:p>
             <a:pPr lvl="4"/>
             <a:r>
-              <a:rPr lang="de-DE" smtClean="0"/>
+              <a:rPr lang="de-DE"/>
               <a:t>Fünfte Ebene</a:t>
             </a:r>
-            <a:endParaRPr lang="de-DE"/>
           </a:p>
         </p:txBody>
       </p:sp>
@@ -2559,7 +2543,7 @@
           <a:p>
             <a:fld id="{C1068C6F-CF2F-4201-9BAA-A88518D20D6F}" type="datetimeFigureOut">
               <a:rPr lang="de-DE" smtClean="0"/>
-              <a:t>27.07.2022</a:t>
+              <a:t>03.08.2022</a:t>
             </a:fld>
             <a:endParaRPr lang="de-DE"/>
           </a:p>
@@ -2973,7 +2957,7 @@
         <p:spPr>
           <a:xfrm>
             <a:off x="283780" y="436207"/>
-            <a:ext cx="11908220" cy="338554"/>
+            <a:ext cx="10730271" cy="338554"/>
           </a:xfrm>
           <a:prstGeom prst="rect">
             <a:avLst/>
@@ -2986,64 +2970,64 @@
           <a:lstStyle/>
           <a:p>
             <a:r>
-              <a:rPr lang="en-US" sz="1600" b="0" i="0" smtClean="0">
+              <a:rPr lang="en-US" sz="1600" b="0" i="0" dirty="0">
                 <a:effectLst/>
                 <a:latin typeface="Consolas" panose="020B0609020204030204" pitchFamily="49" charset="0"/>
                 <a:cs typeface="Consolas" panose="020B0609020204030204" pitchFamily="49" charset="0"/>
               </a:rPr>
-              <a:t>[OwnApplicationID]-</a:t>
-            </a:r>
-            <a:r>
-              <a:rPr lang="en-US" sz="1600" b="0" i="0" smtClean="0">
-                <a:solidFill>
-                  <a:srgbClr val="0070C0"/>
-                </a:solidFill>
+              <a:t>[</a:t>
+            </a:r>
+            <a:r>
+              <a:rPr lang="en-US" sz="1600" b="0" i="0" dirty="0" err="1">
                 <a:effectLst/>
                 <a:latin typeface="Consolas" panose="020B0609020204030204" pitchFamily="49" charset="0"/>
                 <a:cs typeface="Consolas" panose="020B0609020204030204" pitchFamily="49" charset="0"/>
               </a:rPr>
-              <a:t>[LayerID]</a:t>
-            </a:r>
-            <a:r>
-              <a:rPr lang="en-US" sz="1600" b="0" i="0" smtClean="0">
+              <a:t>OwnApplicationID</a:t>
+            </a:r>
+            <a:r>
+              <a:rPr lang="en-US" sz="1600" b="0" i="0" dirty="0">
                 <a:effectLst/>
                 <a:latin typeface="Consolas" panose="020B0609020204030204" pitchFamily="49" charset="0"/>
                 <a:cs typeface="Consolas" panose="020B0609020204030204" pitchFamily="49" charset="0"/>
               </a:rPr>
-              <a:t>-</a:t>
-            </a:r>
-            <a:r>
-              <a:rPr lang="en-US" sz="1600" b="0" i="0" smtClean="0">
-                <a:solidFill>
-                  <a:srgbClr val="00B050"/>
+              <a:t>]-</a:t>
+            </a:r>
+            <a:r>
+              <a:rPr lang="en-US" sz="1600" b="0" i="0" dirty="0">
+                <a:solidFill>
+                  <a:srgbClr val="0070C0"/>
                 </a:solidFill>
                 <a:effectLst/>
                 <a:latin typeface="Consolas" panose="020B0609020204030204" pitchFamily="49" charset="0"/>
                 <a:cs typeface="Consolas" panose="020B0609020204030204" pitchFamily="49" charset="0"/>
               </a:rPr>
-              <a:t>[ObjectType]</a:t>
-            </a:r>
-            <a:r>
-              <a:rPr lang="en-US" sz="1600" b="0" i="0" smtClean="0">
+              <a:t>[</a:t>
+            </a:r>
+            <a:r>
+              <a:rPr lang="en-US" sz="1600" b="0" i="0" dirty="0" err="1">
+                <a:solidFill>
+                  <a:srgbClr val="0070C0"/>
+                </a:solidFill>
                 <a:effectLst/>
                 <a:latin typeface="Consolas" panose="020B0609020204030204" pitchFamily="49" charset="0"/>
                 <a:cs typeface="Consolas" panose="020B0609020204030204" pitchFamily="49" charset="0"/>
               </a:rPr>
-              <a:t>-</a:t>
-            </a:r>
-            <a:r>
-              <a:rPr lang="en-US" sz="1600" b="0" i="0" smtClean="0">
-                <a:solidFill>
-                  <a:srgbClr val="C00000"/>
+              <a:t>LayerID</a:t>
+            </a:r>
+            <a:r>
+              <a:rPr lang="en-US" sz="1600" b="0" i="0" dirty="0">
+                <a:solidFill>
+                  <a:srgbClr val="0070C0"/>
                 </a:solidFill>
                 <a:effectLst/>
                 <a:latin typeface="Consolas" panose="020B0609020204030204" pitchFamily="49" charset="0"/>
                 <a:cs typeface="Consolas" panose="020B0609020204030204" pitchFamily="49" charset="0"/>
               </a:rPr>
-              <a:t>[ApiSegment]</a:t>
-            </a:r>
-            <a:r>
-              <a:rPr lang="en-US" sz="1600" b="0" i="0" smtClean="0">
+              <a:t>]</a:t>
+            </a:r>
+            <a:r>
+              <a:rPr lang="en-US" sz="1600" b="0" i="0" dirty="0">
                 <a:effectLst/>
                 <a:latin typeface="Consolas" panose="020B0609020204030204" pitchFamily="49" charset="0"/>
                 <a:cs typeface="Consolas" panose="020B0609020204030204" pitchFamily="49" charset="0"/>
@@ -3051,7 +3035,89 @@
               <a:t>-</a:t>
             </a:r>
             <a:r>
-              <a:rPr lang="en-US" sz="1600" b="0" i="0" smtClean="0">
+              <a:rPr lang="en-US" sz="1600" b="0" i="0" dirty="0">
+                <a:solidFill>
+                  <a:srgbClr val="00B050"/>
+                </a:solidFill>
+                <a:effectLst/>
+                <a:latin typeface="Consolas" panose="020B0609020204030204" pitchFamily="49" charset="0"/>
+                <a:cs typeface="Consolas" panose="020B0609020204030204" pitchFamily="49" charset="0"/>
+              </a:rPr>
+              <a:t>[</a:t>
+            </a:r>
+            <a:r>
+              <a:rPr lang="en-US" sz="1600" b="0" i="0" dirty="0" err="1">
+                <a:solidFill>
+                  <a:srgbClr val="00B050"/>
+                </a:solidFill>
+                <a:effectLst/>
+                <a:latin typeface="Consolas" panose="020B0609020204030204" pitchFamily="49" charset="0"/>
+                <a:cs typeface="Consolas" panose="020B0609020204030204" pitchFamily="49" charset="0"/>
+              </a:rPr>
+              <a:t>ObjectType</a:t>
+            </a:r>
+            <a:r>
+              <a:rPr lang="en-US" sz="1600" b="0" i="0" dirty="0">
+                <a:solidFill>
+                  <a:srgbClr val="00B050"/>
+                </a:solidFill>
+                <a:effectLst/>
+                <a:latin typeface="Consolas" panose="020B0609020204030204" pitchFamily="49" charset="0"/>
+                <a:cs typeface="Consolas" panose="020B0609020204030204" pitchFamily="49" charset="0"/>
+              </a:rPr>
+              <a:t>]</a:t>
+            </a:r>
+            <a:r>
+              <a:rPr lang="en-US" sz="1600" b="0" i="0" dirty="0">
+                <a:effectLst/>
+                <a:latin typeface="Consolas" panose="020B0609020204030204" pitchFamily="49" charset="0"/>
+                <a:cs typeface="Consolas" panose="020B0609020204030204" pitchFamily="49" charset="0"/>
+              </a:rPr>
+              <a:t>-</a:t>
+            </a:r>
+            <a:r>
+              <a:rPr lang="en-US" sz="1600" b="0" i="0" dirty="0">
+                <a:solidFill>
+                  <a:srgbClr val="C00000"/>
+                </a:solidFill>
+                <a:effectLst/>
+                <a:latin typeface="Consolas" panose="020B0609020204030204" pitchFamily="49" charset="0"/>
+                <a:cs typeface="Consolas" panose="020B0609020204030204" pitchFamily="49" charset="0"/>
+              </a:rPr>
+              <a:t>[</a:t>
+            </a:r>
+            <a:r>
+              <a:rPr lang="en-US" sz="1600" b="0" i="0" dirty="0" err="1">
+                <a:solidFill>
+                  <a:srgbClr val="C00000"/>
+                </a:solidFill>
+                <a:effectLst/>
+                <a:latin typeface="Consolas" panose="020B0609020204030204" pitchFamily="49" charset="0"/>
+                <a:cs typeface="Consolas" panose="020B0609020204030204" pitchFamily="49" charset="0"/>
+              </a:rPr>
+              <a:t>ApiSegment</a:t>
+            </a:r>
+            <a:r>
+              <a:rPr lang="en-US" sz="1600" b="0" i="0" dirty="0">
+                <a:solidFill>
+                  <a:srgbClr val="C00000"/>
+                </a:solidFill>
+                <a:effectLst/>
+                <a:latin typeface="Consolas" panose="020B0609020204030204" pitchFamily="49" charset="0"/>
+                <a:cs typeface="Consolas" panose="020B0609020204030204" pitchFamily="49" charset="0"/>
+              </a:rPr>
+              <a:t>]</a:t>
+            </a:r>
+            <a:r>
+              <a:rPr lang="en-US" sz="1600" b="0" i="0" dirty="0">
+                <a:effectLst/>
+                <a:latin typeface="Consolas" panose="020B0609020204030204" pitchFamily="49" charset="0"/>
+                <a:cs typeface="Consolas" panose="020B0609020204030204" pitchFamily="49" charset="0"/>
+              </a:rPr>
+              <a:t>-</a:t>
+            </a:r>
+            <a:r>
+              <a:rPr lang="en-US" sz="1600" b="0" i="0" dirty="0">
                 <a:solidFill>
                   <a:schemeClr val="accent2">
                     <a:lumMod val="75000"/>
@@ -3061,28 +3127,76 @@
                 <a:latin typeface="Consolas" panose="020B0609020204030204" pitchFamily="49" charset="0"/>
                 <a:cs typeface="Consolas" panose="020B0609020204030204" pitchFamily="49" charset="0"/>
               </a:rPr>
-              <a:t>[TargetApplicationID]</a:t>
-            </a:r>
-            <a:r>
-              <a:rPr lang="en-US" sz="1600" b="0" i="0" smtClean="0">
+              <a:t>[</a:t>
+            </a:r>
+            <a:r>
+              <a:rPr lang="en-US" sz="1600" b="0" i="0" dirty="0" err="1">
+                <a:solidFill>
+                  <a:schemeClr val="accent2">
+                    <a:lumMod val="75000"/>
+                  </a:schemeClr>
+                </a:solidFill>
                 <a:effectLst/>
                 <a:latin typeface="Consolas" panose="020B0609020204030204" pitchFamily="49" charset="0"/>
                 <a:cs typeface="Consolas" panose="020B0609020204030204" pitchFamily="49" charset="0"/>
               </a:rPr>
-              <a:t>-</a:t>
-            </a:r>
-            <a:r>
-              <a:rPr lang="en-US" sz="1600" b="0" i="0" smtClean="0">
-                <a:solidFill>
-                  <a:srgbClr val="7030A0"/>
+              <a:t>TargetApplicationID</a:t>
+            </a:r>
+            <a:r>
+              <a:rPr lang="en-US" sz="1600" b="0" i="0" dirty="0">
+                <a:solidFill>
+                  <a:schemeClr val="accent2">
+                    <a:lumMod val="75000"/>
+                  </a:schemeClr>
                 </a:solidFill>
                 <a:effectLst/>
                 <a:latin typeface="Consolas" panose="020B0609020204030204" pitchFamily="49" charset="0"/>
                 <a:cs typeface="Consolas" panose="020B0609020204030204" pitchFamily="49" charset="0"/>
               </a:rPr>
-              <a:t>[SequenceNumber]</a:t>
-            </a:r>
-            <a:endParaRPr lang="de-DE" sz="1600">
+              <a:t>]</a:t>
+            </a:r>
+            <a:r>
+              <a:rPr lang="en-US" sz="1600" b="0" i="0" dirty="0">
+                <a:effectLst/>
+                <a:latin typeface="Consolas" panose="020B0609020204030204" pitchFamily="49" charset="0"/>
+                <a:cs typeface="Consolas" panose="020B0609020204030204" pitchFamily="49" charset="0"/>
+              </a:rPr>
+              <a:t>-</a:t>
+            </a:r>
+            <a:r>
+              <a:rPr lang="en-US" sz="1600" b="0" i="0" dirty="0">
+                <a:solidFill>
+                  <a:srgbClr val="7030A0"/>
+                </a:solidFill>
+                <a:effectLst/>
+                <a:latin typeface="Consolas" panose="020B0609020204030204" pitchFamily="49" charset="0"/>
+                <a:cs typeface="Consolas" panose="020B0609020204030204" pitchFamily="49" charset="0"/>
+              </a:rPr>
+              <a:t>[</a:t>
+            </a:r>
+            <a:r>
+              <a:rPr lang="en-US" sz="1600" b="0" i="0" dirty="0" err="1">
+                <a:solidFill>
+                  <a:srgbClr val="7030A0"/>
+                </a:solidFill>
+                <a:effectLst/>
+                <a:latin typeface="Consolas" panose="020B0609020204030204" pitchFamily="49" charset="0"/>
+                <a:cs typeface="Consolas" panose="020B0609020204030204" pitchFamily="49" charset="0"/>
+              </a:rPr>
+              <a:t>SequenceNumber</a:t>
+            </a:r>
+            <a:r>
+              <a:rPr lang="en-US" sz="1600" b="0" i="0" dirty="0">
+                <a:solidFill>
+                  <a:srgbClr val="7030A0"/>
+                </a:solidFill>
+                <a:effectLst/>
+                <a:latin typeface="Consolas" panose="020B0609020204030204" pitchFamily="49" charset="0"/>
+                <a:cs typeface="Consolas" panose="020B0609020204030204" pitchFamily="49" charset="0"/>
+              </a:rPr>
+              <a:t>]</a:t>
+            </a:r>
+            <a:endParaRPr lang="de-DE" sz="1600" dirty="0">
               <a:solidFill>
                 <a:srgbClr val="7030A0"/>
               </a:solidFill>
@@ -3120,7 +3234,7 @@
           <a:lstStyle/>
           <a:p>
             <a:r>
-              <a:rPr lang="de-DE" sz="1200" i="1" smtClean="0"/>
+              <a:rPr lang="de-DE" sz="1200" i="1"/>
               <a:t>Official abbreviation of app name &amp; official release number</a:t>
             </a:r>
           </a:p>
@@ -3129,14 +3243,13 @@
           </a:p>
           <a:p>
             <a:r>
-              <a:rPr lang="de-DE" sz="1200" i="1" smtClean="0"/>
+              <a:rPr lang="de-DE" sz="1200" i="1"/>
               <a:t>e.g. </a:t>
             </a:r>
             <a:r>
-              <a:rPr lang="de-DE" sz="1200" smtClean="0"/>
+              <a:rPr lang="de-DE" sz="1200"/>
               <a:t>tar-1-0-1</a:t>
             </a:r>
-            <a:endParaRPr lang="de-DE" sz="1200"/>
           </a:p>
         </p:txBody>
       </p:sp>
@@ -3170,7 +3283,7 @@
           <a:lstStyle/>
           <a:p>
             <a:r>
-              <a:rPr lang="de-DE" sz="1200" smtClean="0">
+              <a:rPr lang="de-DE" sz="1200">
                 <a:solidFill>
                   <a:srgbClr val="0070C0"/>
                 </a:solidFill>
@@ -3178,7 +3291,7 @@
               <a:t>op</a:t>
             </a:r>
             <a:r>
-              <a:rPr lang="de-DE" sz="1200" smtClean="0">
+              <a:rPr lang="de-DE" sz="1200">
                 <a:solidFill>
                   <a:schemeClr val="bg1">
                     <a:lumMod val="75000"/>
@@ -3190,7 +3303,7 @@
           </a:p>
           <a:p>
             <a:r>
-              <a:rPr lang="de-DE" sz="1200" smtClean="0">
+              <a:rPr lang="de-DE" sz="1200">
                 <a:solidFill>
                   <a:srgbClr val="0070C0"/>
                 </a:solidFill>
@@ -3200,7 +3313,7 @@
           </a:p>
           <a:p>
             <a:r>
-              <a:rPr lang="de-DE" sz="1200" smtClean="0">
+              <a:rPr lang="de-DE" sz="1200">
                 <a:solidFill>
                   <a:srgbClr val="0070C0"/>
                 </a:solidFill>
@@ -3210,7 +3323,7 @@
           </a:p>
           <a:p>
             <a:r>
-              <a:rPr lang="de-DE" sz="1200" smtClean="0">
+              <a:rPr lang="de-DE" sz="1200">
                 <a:solidFill>
                   <a:srgbClr val="0070C0"/>
                 </a:solidFill>
@@ -3218,7 +3331,7 @@
               <a:t>meth</a:t>
             </a:r>
             <a:r>
-              <a:rPr lang="de-DE" sz="1200" smtClean="0">
+              <a:rPr lang="de-DE" sz="1200">
                 <a:solidFill>
                   <a:schemeClr val="bg1">
                     <a:lumMod val="75000"/>
@@ -3230,7 +3343,7 @@
           </a:p>
           <a:p>
             <a:r>
-              <a:rPr lang="de-DE" sz="1200" smtClean="0">
+              <a:rPr lang="de-DE" sz="1200">
                 <a:solidFill>
                   <a:srgbClr val="0070C0"/>
                 </a:solidFill>
@@ -3238,7 +3351,7 @@
               <a:t>prot</a:t>
             </a:r>
             <a:r>
-              <a:rPr lang="de-DE" sz="1200" smtClean="0">
+              <a:rPr lang="de-DE" sz="1200">
                 <a:solidFill>
                   <a:schemeClr val="bg1">
                     <a:lumMod val="75000"/>
@@ -3247,13 +3360,6 @@
               </a:rPr>
               <a:t>ocol</a:t>
             </a:r>
-            <a:endParaRPr lang="de-DE" sz="1200">
-              <a:solidFill>
-                <a:schemeClr val="bg1">
-                  <a:lumMod val="75000"/>
-                </a:schemeClr>
-              </a:solidFill>
-            </a:endParaRPr>
           </a:p>
         </p:txBody>
       </p:sp>
@@ -3287,7 +3393,7 @@
           <a:lstStyle/>
           <a:p>
             <a:r>
-              <a:rPr lang="de-DE" sz="1200" smtClean="0">
+              <a:rPr lang="de-DE" sz="1200">
                 <a:solidFill>
                   <a:srgbClr val="0070C0"/>
                 </a:solidFill>
@@ -3297,7 +3403,7 @@
           </a:p>
           <a:p>
             <a:r>
-              <a:rPr lang="de-DE" sz="1200" smtClean="0">
+              <a:rPr lang="de-DE" sz="1200">
                 <a:solidFill>
                   <a:srgbClr val="0070C0"/>
                 </a:solidFill>
@@ -3307,7 +3413,7 @@
           </a:p>
           <a:p>
             <a:r>
-              <a:rPr lang="de-DE" sz="1200" smtClean="0">
+              <a:rPr lang="de-DE" sz="1200">
                 <a:solidFill>
                   <a:srgbClr val="0070C0"/>
                 </a:solidFill>
@@ -3316,26 +3422,21 @@
             </a:r>
           </a:p>
           <a:p>
-            <a:endParaRPr lang="de-DE" sz="1200" smtClean="0">
-              <a:solidFill>
-                <a:srgbClr val="0070C0"/>
-              </a:solidFill>
-            </a:endParaRPr>
-          </a:p>
-          <a:p>
-            <a:r>
-              <a:rPr lang="de-DE" sz="1200" smtClean="0">
-                <a:solidFill>
-                  <a:srgbClr val="0070C0"/>
-                </a:solidFill>
-              </a:rPr>
-              <a:t>&lt;own profile types&gt;</a:t>
-            </a:r>
             <a:endParaRPr lang="de-DE" sz="1200">
               <a:solidFill>
                 <a:srgbClr val="0070C0"/>
               </a:solidFill>
             </a:endParaRPr>
+          </a:p>
+          <a:p>
+            <a:r>
+              <a:rPr lang="de-DE" sz="1200">
+                <a:solidFill>
+                  <a:srgbClr val="0070C0"/>
+                </a:solidFill>
+              </a:rPr>
+              <a:t>&lt;own profile types&gt;</a:t>
+            </a:r>
           </a:p>
         </p:txBody>
       </p:sp>
@@ -3369,7 +3470,7 @@
           <a:lstStyle/>
           <a:p>
             <a:r>
-              <a:rPr lang="de-DE" sz="1200" smtClean="0">
+              <a:rPr lang="de-DE" sz="1200">
                 <a:solidFill>
                   <a:srgbClr val="00B050"/>
                 </a:solidFill>
@@ -3377,7 +3478,7 @@
               <a:t>c</a:t>
             </a:r>
             <a:r>
-              <a:rPr lang="de-DE" sz="1200" smtClean="0">
+              <a:rPr lang="de-DE" sz="1200">
                 <a:solidFill>
                   <a:schemeClr val="bg1">
                     <a:lumMod val="75000"/>
@@ -3389,7 +3490,7 @@
           </a:p>
           <a:p>
             <a:r>
-              <a:rPr lang="de-DE" sz="1200" smtClean="0">
+              <a:rPr lang="de-DE" sz="1200">
                 <a:solidFill>
                   <a:srgbClr val="00B050"/>
                 </a:solidFill>
@@ -3397,7 +3498,7 @@
               <a:t>s</a:t>
             </a:r>
             <a:r>
-              <a:rPr lang="de-DE" sz="1200" smtClean="0">
+              <a:rPr lang="de-DE" sz="1200">
                 <a:solidFill>
                   <a:schemeClr val="bg1">
                     <a:lumMod val="75000"/>
@@ -3409,7 +3510,7 @@
           </a:p>
           <a:p>
             <a:r>
-              <a:rPr lang="de-DE" sz="1200" smtClean="0">
+              <a:rPr lang="de-DE" sz="1200">
                 <a:solidFill>
                   <a:srgbClr val="00B050"/>
                 </a:solidFill>
@@ -3419,7 +3520,7 @@
           </a:p>
           <a:p>
             <a:r>
-              <a:rPr lang="de-DE" sz="1200" smtClean="0">
+              <a:rPr lang="de-DE" sz="1200">
                 <a:solidFill>
                   <a:srgbClr val="00B050"/>
                 </a:solidFill>
@@ -3429,7 +3530,7 @@
           </a:p>
           <a:p>
             <a:r>
-              <a:rPr lang="de-DE" sz="1200" smtClean="0">
+              <a:rPr lang="de-DE" sz="1200">
                 <a:solidFill>
                   <a:srgbClr val="00B050"/>
                 </a:solidFill>
@@ -3468,13 +3569,6 @@
           </a:bodyPr>
           <a:lstStyle/>
           <a:p>
-            <a:endParaRPr lang="de-DE" sz="1200" smtClean="0">
-              <a:solidFill>
-                <a:srgbClr val="00B050"/>
-              </a:solidFill>
-            </a:endParaRPr>
-          </a:p>
-          <a:p>
             <a:endParaRPr lang="de-DE" sz="1200">
               <a:solidFill>
                 <a:srgbClr val="00B050"/>
@@ -3482,8 +3576,15 @@
             </a:endParaRPr>
           </a:p>
           <a:p>
-            <a:r>
-              <a:rPr lang="de-DE" sz="1200" smtClean="0">
+            <a:endParaRPr lang="de-DE" sz="1200">
+              <a:solidFill>
+                <a:srgbClr val="00B050"/>
+              </a:solidFill>
+            </a:endParaRPr>
+          </a:p>
+          <a:p>
+            <a:r>
+              <a:rPr lang="de-DE" sz="1200">
                 <a:solidFill>
                   <a:srgbClr val="00B050"/>
                 </a:solidFill>
@@ -3497,7 +3598,7 @@
             </a:endParaRPr>
           </a:p>
           <a:p>
-            <a:endParaRPr lang="de-DE" sz="1200" smtClean="0">
+            <a:endParaRPr lang="de-DE" sz="1200">
               <a:solidFill>
                 <a:srgbClr val="0070C0"/>
               </a:solidFill>
@@ -3635,8 +3736,71 @@
               </a:tabLst>
             </a:pPr>
             <a:r>
-              <a:rPr lang="de-DE" sz="1200" i="1" smtClean="0"/>
-              <a:t>only for client &amp; server (i.e.) not for profile, fd, fc and link!</a:t>
+              <a:rPr lang="de-DE" sz="1200" i="1" dirty="0" err="1"/>
+              <a:t>only</a:t>
+            </a:r>
+            <a:r>
+              <a:rPr lang="de-DE" sz="1200" i="1" dirty="0"/>
+              <a:t> </a:t>
+            </a:r>
+            <a:r>
+              <a:rPr lang="de-DE" sz="1200" i="1" dirty="0" err="1"/>
+              <a:t>for</a:t>
+            </a:r>
+            <a:r>
+              <a:rPr lang="de-DE" sz="1200" i="1" dirty="0"/>
+              <a:t> </a:t>
+            </a:r>
+            <a:r>
+              <a:rPr lang="de-DE" sz="1200" i="1" dirty="0" err="1"/>
+              <a:t>client</a:t>
+            </a:r>
+            <a:r>
+              <a:rPr lang="de-DE" sz="1200" i="1" dirty="0"/>
+              <a:t>, </a:t>
+            </a:r>
+            <a:r>
+              <a:rPr lang="de-DE" sz="1200" i="1" dirty="0" err="1"/>
+              <a:t>server</a:t>
+            </a:r>
+            <a:r>
+              <a:rPr lang="de-DE" sz="1200" i="1" dirty="0"/>
+              <a:t> and </a:t>
+            </a:r>
+            <a:r>
+              <a:rPr lang="de-DE" sz="1200" i="1" dirty="0" err="1"/>
+              <a:t>fc</a:t>
+            </a:r>
+            <a:br>
+              <a:rPr lang="de-DE" sz="1200" i="1" dirty="0"/>
+            </a:br>
+            <a:r>
+              <a:rPr lang="de-DE" sz="1200" i="1" dirty="0"/>
+              <a:t>not </a:t>
+            </a:r>
+            <a:r>
+              <a:rPr lang="de-DE" sz="1200" i="1" dirty="0" err="1"/>
+              <a:t>for</a:t>
+            </a:r>
+            <a:r>
+              <a:rPr lang="de-DE" sz="1200" i="1" dirty="0"/>
+              <a:t> </a:t>
+            </a:r>
+            <a:r>
+              <a:rPr lang="de-DE" sz="1200" i="1" dirty="0" err="1"/>
+              <a:t>profile</a:t>
+            </a:r>
+            <a:r>
+              <a:rPr lang="de-DE" sz="1200" i="1" dirty="0"/>
+              <a:t>, </a:t>
+            </a:r>
+            <a:r>
+              <a:rPr lang="de-DE" sz="1200" i="1" dirty="0" err="1"/>
+              <a:t>fd</a:t>
+            </a:r>
+            <a:r>
+              <a:rPr lang="de-DE" sz="1200" i="1" dirty="0"/>
+              <a:t> and link!</a:t>
             </a:r>
           </a:p>
           <a:p>
@@ -3645,7 +3809,7 @@
                 <a:tab pos="358775" algn="l"/>
               </a:tabLst>
             </a:pPr>
-            <a:endParaRPr lang="de-DE" sz="1200">
+            <a:endParaRPr lang="de-DE" sz="1200" dirty="0">
               <a:solidFill>
                 <a:srgbClr val="C00000"/>
               </a:solidFill>
@@ -3658,23 +3822,58 @@
               </a:tabLst>
             </a:pPr>
             <a:r>
-              <a:rPr lang="de-DE" sz="1200" smtClean="0">
+              <a:rPr lang="de-DE" sz="1200" dirty="0" err="1">
                 <a:solidFill>
                   <a:srgbClr val="C00000"/>
                 </a:solidFill>
               </a:rPr>
-              <a:t>bm	</a:t>
-            </a:r>
-            <a:r>
-              <a:rPr lang="de-DE" sz="1200" smtClean="0">
+              <a:t>bm</a:t>
+            </a:r>
+            <a:r>
+              <a:rPr lang="de-DE" sz="1200" dirty="0">
+                <a:solidFill>
+                  <a:srgbClr val="C00000"/>
+                </a:solidFill>
+              </a:rPr>
+              <a:t>	</a:t>
+            </a:r>
+            <a:r>
+              <a:rPr lang="de-DE" sz="1200" dirty="0" err="1">
                 <a:solidFill>
                   <a:schemeClr val="bg1">
                     <a:lumMod val="75000"/>
                   </a:schemeClr>
                 </a:solidFill>
               </a:rPr>
-              <a:t>basic mgmt</a:t>
-            </a:r>
+              <a:t>basic</a:t>
+            </a:r>
+            <a:r>
+              <a:rPr lang="de-DE" sz="1200" dirty="0">
+                <a:solidFill>
+                  <a:schemeClr val="bg1">
+                    <a:lumMod val="75000"/>
+                  </a:schemeClr>
+                </a:solidFill>
+              </a:rPr>
+              <a:t> </a:t>
+            </a:r>
+            <a:r>
+              <a:rPr lang="de-DE" sz="1200" dirty="0" err="1">
+                <a:solidFill>
+                  <a:schemeClr val="bg1">
+                    <a:lumMod val="75000"/>
+                  </a:schemeClr>
+                </a:solidFill>
+              </a:rPr>
+              <a:t>mgmt</a:t>
+            </a:r>
+            <a:endParaRPr lang="de-DE" sz="1200" dirty="0">
+              <a:solidFill>
+                <a:schemeClr val="bg1">
+                  <a:lumMod val="75000"/>
+                </a:schemeClr>
+              </a:solidFill>
+            </a:endParaRPr>
           </a:p>
           <a:p>
             <a:pPr>
@@ -3683,31 +3882,50 @@
               </a:tabLst>
             </a:pPr>
             <a:r>
-              <a:rPr lang="de-DE" sz="1200">
+              <a:rPr lang="de-DE" sz="1200" dirty="0">
                 <a:solidFill>
                   <a:srgbClr val="C00000"/>
                 </a:solidFill>
               </a:rPr>
-              <a:t>i</a:t>
-            </a:r>
-            <a:r>
-              <a:rPr lang="de-DE" sz="1200" smtClean="0">
-                <a:solidFill>
-                  <a:srgbClr val="C00000"/>
-                </a:solidFill>
-              </a:rPr>
-              <a:t>m	</a:t>
-            </a:r>
-            <a:r>
-              <a:rPr lang="de-DE" sz="1200" smtClean="0">
+              <a:t>im	</a:t>
+            </a:r>
+            <a:r>
+              <a:rPr lang="de-DE" sz="1200" dirty="0" err="1">
                 <a:solidFill>
                   <a:schemeClr val="bg1">
                     <a:lumMod val="75000"/>
                   </a:schemeClr>
                 </a:solidFill>
               </a:rPr>
-              <a:t>indiv. mgmt</a:t>
-            </a:r>
+              <a:t>indiv</a:t>
+            </a:r>
+            <a:r>
+              <a:rPr lang="de-DE" sz="1200" dirty="0">
+                <a:solidFill>
+                  <a:schemeClr val="bg1">
+                    <a:lumMod val="75000"/>
+                  </a:schemeClr>
+                </a:solidFill>
+              </a:rPr>
+              <a:t>. </a:t>
+            </a:r>
+            <a:r>
+              <a:rPr lang="de-DE" sz="1200" dirty="0" err="1">
+                <a:solidFill>
+                  <a:schemeClr val="bg1">
+                    <a:lumMod val="75000"/>
+                  </a:schemeClr>
+                </a:solidFill>
+              </a:rPr>
+              <a:t>mgmt</a:t>
+            </a:r>
+            <a:endParaRPr lang="de-DE" sz="1200" dirty="0">
+              <a:solidFill>
+                <a:schemeClr val="bg1">
+                  <a:lumMod val="75000"/>
+                </a:schemeClr>
+              </a:solidFill>
+            </a:endParaRPr>
           </a:p>
           <a:p>
             <a:pPr>
@@ -3716,25 +3934,53 @@
               </a:tabLst>
             </a:pPr>
             <a:r>
-              <a:rPr lang="de-DE" sz="1200" smtClean="0">
+              <a:rPr lang="de-DE" sz="1200" dirty="0" err="1">
                 <a:solidFill>
                   <a:srgbClr val="C00000"/>
                 </a:solidFill>
               </a:rPr>
-              <a:t>bs	</a:t>
-            </a:r>
-            <a:r>
-              <a:rPr lang="de-DE" sz="1200" smtClean="0">
+              <a:t>bs</a:t>
+            </a:r>
+            <a:r>
+              <a:rPr lang="de-DE" sz="1200" dirty="0">
+                <a:solidFill>
+                  <a:srgbClr val="C00000"/>
+                </a:solidFill>
+              </a:rPr>
+              <a:t>	</a:t>
+            </a:r>
+            <a:r>
+              <a:rPr lang="de-DE" sz="1200" dirty="0" err="1">
                 <a:solidFill>
                   <a:schemeClr val="bg1">
                     <a:lumMod val="75000"/>
                   </a:schemeClr>
                 </a:solidFill>
               </a:rPr>
-              <a:t>basic service</a:t>
-            </a:r>
-            <a:r>
-              <a:rPr lang="de-DE" sz="1200" smtClean="0">
+              <a:t>basic</a:t>
+            </a:r>
+            <a:r>
+              <a:rPr lang="de-DE" sz="1200" dirty="0">
+                <a:solidFill>
+                  <a:schemeClr val="bg1">
+                    <a:lumMod val="75000"/>
+                  </a:schemeClr>
+                </a:solidFill>
+              </a:rPr>
+              <a:t> </a:t>
+            </a:r>
+            <a:r>
+              <a:rPr lang="de-DE" sz="1200" dirty="0" err="1">
+                <a:solidFill>
+                  <a:schemeClr val="bg1">
+                    <a:lumMod val="75000"/>
+                  </a:schemeClr>
+                </a:solidFill>
+              </a:rPr>
+              <a:t>service</a:t>
+            </a:r>
+            <a:r>
+              <a:rPr lang="de-DE" sz="1200" dirty="0">
                 <a:solidFill>
                   <a:srgbClr val="C00000"/>
                 </a:solidFill>
@@ -3749,30 +3995,40 @@
               </a:tabLst>
             </a:pPr>
             <a:r>
-              <a:rPr lang="de-DE" sz="1200">
+              <a:rPr lang="de-DE" sz="1200" dirty="0" err="1">
                 <a:solidFill>
                   <a:srgbClr val="C00000"/>
                 </a:solidFill>
               </a:rPr>
-              <a:t>i</a:t>
-            </a:r>
-            <a:r>
-              <a:rPr lang="de-DE" sz="1200" smtClean="0">
+              <a:t>is</a:t>
+            </a:r>
+            <a:r>
+              <a:rPr lang="de-DE" sz="1200" dirty="0">
                 <a:solidFill>
                   <a:srgbClr val="C00000"/>
                 </a:solidFill>
               </a:rPr>
-              <a:t>s	</a:t>
-            </a:r>
-            <a:r>
-              <a:rPr lang="de-DE" sz="1200" smtClean="0">
+              <a:t>	</a:t>
+            </a:r>
+            <a:r>
+              <a:rPr lang="de-DE" sz="1200" dirty="0" err="1">
                 <a:solidFill>
                   <a:schemeClr val="bg1">
                     <a:lumMod val="75000"/>
                   </a:schemeClr>
                 </a:solidFill>
               </a:rPr>
-              <a:t>indiv. Service</a:t>
+              <a:t>indiv</a:t>
+            </a:r>
+            <a:r>
+              <a:rPr lang="de-DE" sz="1200" dirty="0">
+                <a:solidFill>
+                  <a:schemeClr val="bg1">
+                    <a:lumMod val="75000"/>
+                  </a:schemeClr>
+                </a:solidFill>
+              </a:rPr>
+              <a:t>. Service</a:t>
             </a:r>
           </a:p>
         </p:txBody>
@@ -3821,7 +4077,7 @@
         </p:nvSpPr>
         <p:spPr>
           <a:xfrm>
-            <a:off x="6555412" y="825023"/>
+            <a:off x="6598418" y="1130240"/>
             <a:ext cx="2215207" cy="1015663"/>
           </a:xfrm>
           <a:prstGeom prst="rect">
@@ -3843,22 +4099,67 @@
           <a:lstStyle/>
           <a:p>
             <a:r>
-              <a:rPr lang="de-DE" sz="1200" i="1"/>
-              <a:t>o</a:t>
-            </a:r>
-            <a:r>
-              <a:rPr lang="de-DE" sz="1200" i="1" smtClean="0"/>
-              <a:t>nly for client!</a:t>
-            </a:r>
-          </a:p>
-          <a:p>
-            <a:r>
-              <a:rPr lang="de-DE" sz="1200" i="1" smtClean="0"/>
-              <a:t>Abbreviation &amp; release number of target app</a:t>
-            </a:r>
-          </a:p>
-          <a:p>
-            <a:endParaRPr lang="de-DE" sz="1200">
+              <a:rPr lang="de-DE" sz="1200" i="1" dirty="0" err="1"/>
+              <a:t>only</a:t>
+            </a:r>
+            <a:r>
+              <a:rPr lang="de-DE" sz="1200" i="1" dirty="0"/>
+              <a:t> </a:t>
+            </a:r>
+            <a:r>
+              <a:rPr lang="de-DE" sz="1200" i="1" dirty="0" err="1"/>
+              <a:t>for</a:t>
+            </a:r>
+            <a:r>
+              <a:rPr lang="de-DE" sz="1200" i="1" dirty="0"/>
+              <a:t> </a:t>
+            </a:r>
+            <a:r>
+              <a:rPr lang="de-DE" sz="1200" i="1" dirty="0" err="1"/>
+              <a:t>client</a:t>
+            </a:r>
+            <a:r>
+              <a:rPr lang="de-DE" sz="1200" i="1" dirty="0"/>
+              <a:t>!</a:t>
+            </a:r>
+          </a:p>
+          <a:p>
+            <a:r>
+              <a:rPr lang="de-DE" sz="1200" i="1" dirty="0"/>
+              <a:t>Abbreviation &amp; release </a:t>
+            </a:r>
+            <a:r>
+              <a:rPr lang="de-DE" sz="1200" i="1" dirty="0" err="1"/>
+              <a:t>number</a:t>
+            </a:r>
+            <a:r>
+              <a:rPr lang="de-DE" sz="1200" i="1" dirty="0"/>
+              <a:t> </a:t>
+            </a:r>
+            <a:r>
+              <a:rPr lang="de-DE" sz="1200" i="1" dirty="0" err="1"/>
+              <a:t>of</a:t>
+            </a:r>
+            <a:r>
+              <a:rPr lang="de-DE" sz="1200" i="1" dirty="0"/>
+              <a:t> </a:t>
+            </a:r>
+            <a:r>
+              <a:rPr lang="de-DE" sz="1200" i="1" dirty="0" err="1"/>
+              <a:t>target</a:t>
+            </a:r>
+            <a:r>
+              <a:rPr lang="de-DE" sz="1200" i="1" dirty="0"/>
+              <a:t> </a:t>
+            </a:r>
+            <a:r>
+              <a:rPr lang="de-DE" sz="1200" i="1" dirty="0" err="1"/>
+              <a:t>application</a:t>
+            </a:r>
+            <a:endParaRPr lang="de-DE" sz="1200" i="1" dirty="0"/>
+          </a:p>
+          <a:p>
+            <a:endParaRPr lang="de-DE" sz="1200" dirty="0">
               <a:solidFill>
                 <a:schemeClr val="accent2">
                   <a:lumMod val="75000"/>
@@ -3868,11 +4169,11 @@
           </a:p>
           <a:p>
             <a:r>
-              <a:rPr lang="de-DE" sz="1200" i="1" smtClean="0"/>
+              <a:rPr lang="de-DE" sz="1200" i="1" dirty="0"/>
               <a:t>e.g. </a:t>
             </a:r>
             <a:r>
-              <a:rPr lang="de-DE" sz="1200" smtClean="0">
+              <a:rPr lang="de-DE" sz="1200" dirty="0">
                 <a:solidFill>
                   <a:schemeClr val="accent2">
                     <a:lumMod val="75000"/>
@@ -3915,33 +4216,29 @@
           <a:p>
             <a:r>
               <a:rPr lang="de-DE" sz="1200" i="1"/>
-              <a:t>d</a:t>
-            </a:r>
-            <a:r>
-              <a:rPr lang="de-DE" sz="1200" i="1" smtClean="0"/>
-              <a:t>ecimal number with 3 digits</a:t>
+              <a:t>decimal number with 3 digits</a:t>
             </a:r>
           </a:p>
           <a:p>
             <a:endParaRPr lang="de-DE" sz="1200" i="1"/>
           </a:p>
           <a:p>
-            <a:endParaRPr lang="de-DE" sz="1200" i="1" smtClean="0"/>
-          </a:p>
-          <a:p>
-            <a:r>
-              <a:rPr lang="de-DE" sz="1200" i="1" smtClean="0"/>
+            <a:endParaRPr lang="de-DE" sz="1200" i="1"/>
+          </a:p>
+          <a:p>
+            <a:r>
+              <a:rPr lang="de-DE" sz="1200" i="1"/>
               <a:t>e.g. </a:t>
             </a:r>
             <a:r>
-              <a:rPr lang="de-DE" sz="1200" i="1" smtClean="0">
+              <a:rPr lang="de-DE" sz="1200" i="1">
                 <a:solidFill>
                   <a:srgbClr val="7030A0"/>
                 </a:solidFill>
               </a:rPr>
               <a:t>002</a:t>
             </a:r>
-            <a:endParaRPr lang="de-DE" sz="1200" smtClean="0">
+            <a:endParaRPr lang="de-DE" sz="1200">
               <a:solidFill>
                 <a:srgbClr val="7030A0"/>
               </a:solidFill>
@@ -3988,13 +4285,57 @@
       <p:cxnSp>
         <p:nvCxnSpPr>
           <p:cNvPr id="26" name="Gerade Verbindung mit Pfeil 25"/>
+          <p:cNvCxnSpPr>
+            <a:cxnSpLocks/>
+          </p:cNvCxnSpPr>
+          <p:nvPr/>
+        </p:nvCxnSpPr>
+        <p:spPr>
+          <a:xfrm>
+            <a:off x="4183380" y="952500"/>
+            <a:ext cx="2415038" cy="238125"/>
+          </a:xfrm>
+          <a:prstGeom prst="straightConnector1">
+            <a:avLst/>
+          </a:prstGeom>
+          <a:ln>
+            <a:solidFill>
+              <a:schemeClr val="tx1"/>
+            </a:solidFill>
+            <a:tailEnd type="triangle"/>
+          </a:ln>
+        </p:spPr>
+        <p:style>
+          <a:lnRef idx="1">
+            <a:schemeClr val="accent1"/>
+          </a:lnRef>
+          <a:fillRef idx="0">
+            <a:schemeClr val="accent1"/>
+          </a:fillRef>
+          <a:effectRef idx="0">
+            <a:schemeClr val="accent1"/>
+          </a:effectRef>
+          <a:fontRef idx="minor">
+            <a:schemeClr val="tx1"/>
+          </a:fontRef>
+        </p:style>
+      </p:cxnSp>
+      <p:cxnSp>
+        <p:nvCxnSpPr>
+          <p:cNvPr id="16" name="Gerade Verbindung mit Pfeil 15">
+            <a:extLst>
+              <a:ext uri="{FF2B5EF4-FFF2-40B4-BE49-F238E27FC236}">
+                <a16:creationId xmlns:a16="http://schemas.microsoft.com/office/drawing/2014/main" id="{E451CFCA-62BA-4828-8143-288032C2F4FF}"/>
+              </a:ext>
+            </a:extLst>
+          </p:cNvPr>
           <p:cNvCxnSpPr/>
           <p:nvPr/>
         </p:nvCxnSpPr>
         <p:spPr>
           <a:xfrm>
-            <a:off x="4183380" y="952500"/>
-            <a:ext cx="2415540" cy="0"/>
+            <a:off x="4179981" y="1530016"/>
+            <a:ext cx="906414" cy="476250"/>
           </a:xfrm>
           <a:prstGeom prst="straightConnector1">
             <a:avLst/>

</xml_diff>

<commit_message>
Correct according to Prathibas feedback
</commit_message>
<xml_diff>
--- a/doc/ElementsApplicationPattern/Names/StructureOfUuids/pictures/uuid-structure.pptx
+++ b/doc/ElementsApplicationPattern/Names/StructureOfUuids/pictures/uuid-structure.pptx
@@ -241,7 +241,7 @@
           <a:p>
             <a:fld id="{C1068C6F-CF2F-4201-9BAA-A88518D20D6F}" type="datetimeFigureOut">
               <a:rPr lang="de-DE" smtClean="0"/>
-              <a:t>03.08.2022</a:t>
+              <a:t>09.08.2022</a:t>
             </a:fld>
             <a:endParaRPr lang="de-DE"/>
           </a:p>
@@ -409,7 +409,7 @@
           <a:p>
             <a:fld id="{C1068C6F-CF2F-4201-9BAA-A88518D20D6F}" type="datetimeFigureOut">
               <a:rPr lang="de-DE" smtClean="0"/>
-              <a:t>03.08.2022</a:t>
+              <a:t>09.08.2022</a:t>
             </a:fld>
             <a:endParaRPr lang="de-DE"/>
           </a:p>
@@ -587,7 +587,7 @@
           <a:p>
             <a:fld id="{C1068C6F-CF2F-4201-9BAA-A88518D20D6F}" type="datetimeFigureOut">
               <a:rPr lang="de-DE" smtClean="0"/>
-              <a:t>03.08.2022</a:t>
+              <a:t>09.08.2022</a:t>
             </a:fld>
             <a:endParaRPr lang="de-DE"/>
           </a:p>
@@ -755,7 +755,7 @@
           <a:p>
             <a:fld id="{C1068C6F-CF2F-4201-9BAA-A88518D20D6F}" type="datetimeFigureOut">
               <a:rPr lang="de-DE" smtClean="0"/>
-              <a:t>03.08.2022</a:t>
+              <a:t>09.08.2022</a:t>
             </a:fld>
             <a:endParaRPr lang="de-DE"/>
           </a:p>
@@ -1000,7 +1000,7 @@
           <a:p>
             <a:fld id="{C1068C6F-CF2F-4201-9BAA-A88518D20D6F}" type="datetimeFigureOut">
               <a:rPr lang="de-DE" smtClean="0"/>
-              <a:t>03.08.2022</a:t>
+              <a:t>09.08.2022</a:t>
             </a:fld>
             <a:endParaRPr lang="de-DE"/>
           </a:p>
@@ -1229,7 +1229,7 @@
           <a:p>
             <a:fld id="{C1068C6F-CF2F-4201-9BAA-A88518D20D6F}" type="datetimeFigureOut">
               <a:rPr lang="de-DE" smtClean="0"/>
-              <a:t>03.08.2022</a:t>
+              <a:t>09.08.2022</a:t>
             </a:fld>
             <a:endParaRPr lang="de-DE"/>
           </a:p>
@@ -1593,7 +1593,7 @@
           <a:p>
             <a:fld id="{C1068C6F-CF2F-4201-9BAA-A88518D20D6F}" type="datetimeFigureOut">
               <a:rPr lang="de-DE" smtClean="0"/>
-              <a:t>03.08.2022</a:t>
+              <a:t>09.08.2022</a:t>
             </a:fld>
             <a:endParaRPr lang="de-DE"/>
           </a:p>
@@ -1710,7 +1710,7 @@
           <a:p>
             <a:fld id="{C1068C6F-CF2F-4201-9BAA-A88518D20D6F}" type="datetimeFigureOut">
               <a:rPr lang="de-DE" smtClean="0"/>
-              <a:t>03.08.2022</a:t>
+              <a:t>09.08.2022</a:t>
             </a:fld>
             <a:endParaRPr lang="de-DE"/>
           </a:p>
@@ -1805,7 +1805,7 @@
           <a:p>
             <a:fld id="{C1068C6F-CF2F-4201-9BAA-A88518D20D6F}" type="datetimeFigureOut">
               <a:rPr lang="de-DE" smtClean="0"/>
-              <a:t>03.08.2022</a:t>
+              <a:t>09.08.2022</a:t>
             </a:fld>
             <a:endParaRPr lang="de-DE"/>
           </a:p>
@@ -2080,7 +2080,7 @@
           <a:p>
             <a:fld id="{C1068C6F-CF2F-4201-9BAA-A88518D20D6F}" type="datetimeFigureOut">
               <a:rPr lang="de-DE" smtClean="0"/>
-              <a:t>03.08.2022</a:t>
+              <a:t>09.08.2022</a:t>
             </a:fld>
             <a:endParaRPr lang="de-DE"/>
           </a:p>
@@ -2332,7 +2332,7 @@
           <a:p>
             <a:fld id="{C1068C6F-CF2F-4201-9BAA-A88518D20D6F}" type="datetimeFigureOut">
               <a:rPr lang="de-DE" smtClean="0"/>
-              <a:t>03.08.2022</a:t>
+              <a:t>09.08.2022</a:t>
             </a:fld>
             <a:endParaRPr lang="de-DE"/>
           </a:p>
@@ -2543,7 +2543,7 @@
           <a:p>
             <a:fld id="{C1068C6F-CF2F-4201-9BAA-A88518D20D6F}" type="datetimeFigureOut">
               <a:rPr lang="de-DE" smtClean="0"/>
-              <a:t>03.08.2022</a:t>
+              <a:t>09.08.2022</a:t>
             </a:fld>
             <a:endParaRPr lang="de-DE"/>
           </a:p>
@@ -3470,7 +3470,7 @@
           <a:lstStyle/>
           <a:p>
             <a:r>
-              <a:rPr lang="de-DE" sz="1200">
+              <a:rPr lang="de-DE" sz="1200" dirty="0" err="1">
                 <a:solidFill>
                   <a:srgbClr val="00B050"/>
                 </a:solidFill>
@@ -3478,7 +3478,7 @@
               <a:t>c</a:t>
             </a:r>
             <a:r>
-              <a:rPr lang="de-DE" sz="1200">
+              <a:rPr lang="de-DE" sz="1200" dirty="0" err="1">
                 <a:solidFill>
                   <a:schemeClr val="bg1">
                     <a:lumMod val="75000"/>
@@ -3487,10 +3487,17 @@
               </a:rPr>
               <a:t>lient</a:t>
             </a:r>
-          </a:p>
-          <a:p>
-            <a:r>
-              <a:rPr lang="de-DE" sz="1200">
+            <a:endParaRPr lang="de-DE" sz="1200" dirty="0">
+              <a:solidFill>
+                <a:schemeClr val="bg1">
+                  <a:lumMod val="75000"/>
+                </a:schemeClr>
+              </a:solidFill>
+            </a:endParaRPr>
+          </a:p>
+          <a:p>
+            <a:r>
+              <a:rPr lang="de-DE" sz="1200" dirty="0" err="1">
                 <a:solidFill>
                   <a:srgbClr val="00B050"/>
                 </a:solidFill>
@@ -3498,7 +3505,7 @@
               <a:t>s</a:t>
             </a:r>
             <a:r>
-              <a:rPr lang="de-DE" sz="1200">
+              <a:rPr lang="de-DE" sz="1200" dirty="0" err="1">
                 <a:solidFill>
                   <a:schemeClr val="bg1">
                     <a:lumMod val="75000"/>
@@ -3507,30 +3514,47 @@
               </a:rPr>
               <a:t>erver</a:t>
             </a:r>
-          </a:p>
-          <a:p>
-            <a:r>
-              <a:rPr lang="de-DE" sz="1200">
+            <a:endParaRPr lang="de-DE" sz="1200" dirty="0">
+              <a:solidFill>
+                <a:schemeClr val="bg1">
+                  <a:lumMod val="75000"/>
+                </a:schemeClr>
+              </a:solidFill>
+            </a:endParaRPr>
+          </a:p>
+          <a:p>
+            <a:r>
+              <a:rPr lang="de-DE" sz="1200" dirty="0" err="1">
                 <a:solidFill>
                   <a:srgbClr val="00B050"/>
                 </a:solidFill>
               </a:rPr>
               <a:t>fd</a:t>
             </a:r>
-          </a:p>
-          <a:p>
-            <a:r>
-              <a:rPr lang="de-DE" sz="1200">
+            <a:endParaRPr lang="de-DE" sz="1200" dirty="0">
+              <a:solidFill>
+                <a:srgbClr val="00B050"/>
+              </a:solidFill>
+            </a:endParaRPr>
+          </a:p>
+          <a:p>
+            <a:r>
+              <a:rPr lang="de-DE" sz="1200" dirty="0" err="1">
                 <a:solidFill>
                   <a:srgbClr val="00B050"/>
                 </a:solidFill>
               </a:rPr>
               <a:t>fc</a:t>
             </a:r>
-          </a:p>
-          <a:p>
-            <a:r>
-              <a:rPr lang="de-DE" sz="1200">
+            <a:endParaRPr lang="de-DE" sz="1200" dirty="0">
+              <a:solidFill>
+                <a:srgbClr val="00B050"/>
+              </a:solidFill>
+            </a:endParaRPr>
+          </a:p>
+          <a:p>
+            <a:r>
+              <a:rPr lang="de-DE" sz="1200" dirty="0">
                 <a:solidFill>
                   <a:srgbClr val="00B050"/>
                 </a:solidFill>
@@ -3569,14 +3593,14 @@
           </a:bodyPr>
           <a:lstStyle/>
           <a:p>
-            <a:endParaRPr lang="de-DE" sz="1200">
+            <a:endParaRPr lang="de-DE" sz="1200" dirty="0">
               <a:solidFill>
                 <a:srgbClr val="00B050"/>
               </a:solidFill>
             </a:endParaRPr>
           </a:p>
           <a:p>
-            <a:endParaRPr lang="de-DE" sz="1200">
+            <a:endParaRPr lang="de-DE" sz="1200" dirty="0">
               <a:solidFill>
                 <a:srgbClr val="00B050"/>
               </a:solidFill>
@@ -3584,35 +3608,47 @@
           </a:p>
           <a:p>
             <a:r>
-              <a:rPr lang="de-DE" sz="1200">
+              <a:rPr lang="de-DE" sz="1200" dirty="0" err="1">
                 <a:solidFill>
                   <a:srgbClr val="00B050"/>
                 </a:solidFill>
               </a:rPr>
-              <a:t>profile</a:t>
-            </a:r>
-            <a:endParaRPr lang="de-DE" sz="1200">
+              <a:t>p</a:t>
+            </a:r>
+            <a:r>
+              <a:rPr lang="de-DE" sz="1200" dirty="0" err="1">
+                <a:solidFill>
+                  <a:schemeClr val="bg1">
+                    <a:lumMod val="75000"/>
+                  </a:schemeClr>
+                </a:solidFill>
+              </a:rPr>
+              <a:t>rofile</a:t>
+            </a:r>
+            <a:endParaRPr lang="de-DE" sz="1200" dirty="0">
+              <a:solidFill>
+                <a:schemeClr val="bg1">
+                  <a:lumMod val="75000"/>
+                </a:schemeClr>
+              </a:solidFill>
+            </a:endParaRPr>
+          </a:p>
+          <a:p>
+            <a:endParaRPr lang="de-DE" sz="1200" dirty="0">
               <a:solidFill>
                 <a:srgbClr val="0070C0"/>
               </a:solidFill>
             </a:endParaRPr>
           </a:p>
           <a:p>
-            <a:endParaRPr lang="de-DE" sz="1200">
+            <a:endParaRPr lang="de-DE" sz="1200" dirty="0">
               <a:solidFill>
                 <a:srgbClr val="0070C0"/>
               </a:solidFill>
             </a:endParaRPr>
           </a:p>
           <a:p>
-            <a:endParaRPr lang="de-DE" sz="1200">
-              <a:solidFill>
-                <a:srgbClr val="0070C0"/>
-              </a:solidFill>
-            </a:endParaRPr>
-          </a:p>
-          <a:p>
-            <a:endParaRPr lang="de-DE" sz="1200">
+            <a:endParaRPr lang="de-DE" sz="1200" dirty="0">
               <a:solidFill>
                 <a:srgbClr val="0070C0"/>
               </a:solidFill>

</xml_diff>

<commit_message>
Add FileProfile for addressing files
</commit_message>
<xml_diff>
--- a/doc/ElementsApplicationPattern/Names/StructureOfUuids/pictures/uuid-structure.pptx
+++ b/doc/ElementsApplicationPattern/Names/StructureOfUuids/pictures/uuid-structure.pptx
@@ -241,7 +241,7 @@
           <a:p>
             <a:fld id="{C1068C6F-CF2F-4201-9BAA-A88518D20D6F}" type="datetimeFigureOut">
               <a:rPr lang="de-DE" smtClean="0"/>
-              <a:t>09.08.2022</a:t>
+              <a:t>21.09.2022</a:t>
             </a:fld>
             <a:endParaRPr lang="de-DE"/>
           </a:p>
@@ -409,7 +409,7 @@
           <a:p>
             <a:fld id="{C1068C6F-CF2F-4201-9BAA-A88518D20D6F}" type="datetimeFigureOut">
               <a:rPr lang="de-DE" smtClean="0"/>
-              <a:t>09.08.2022</a:t>
+              <a:t>21.09.2022</a:t>
             </a:fld>
             <a:endParaRPr lang="de-DE"/>
           </a:p>
@@ -587,7 +587,7 @@
           <a:p>
             <a:fld id="{C1068C6F-CF2F-4201-9BAA-A88518D20D6F}" type="datetimeFigureOut">
               <a:rPr lang="de-DE" smtClean="0"/>
-              <a:t>09.08.2022</a:t>
+              <a:t>21.09.2022</a:t>
             </a:fld>
             <a:endParaRPr lang="de-DE"/>
           </a:p>
@@ -755,7 +755,7 @@
           <a:p>
             <a:fld id="{C1068C6F-CF2F-4201-9BAA-A88518D20D6F}" type="datetimeFigureOut">
               <a:rPr lang="de-DE" smtClean="0"/>
-              <a:t>09.08.2022</a:t>
+              <a:t>21.09.2022</a:t>
             </a:fld>
             <a:endParaRPr lang="de-DE"/>
           </a:p>
@@ -1000,7 +1000,7 @@
           <a:p>
             <a:fld id="{C1068C6F-CF2F-4201-9BAA-A88518D20D6F}" type="datetimeFigureOut">
               <a:rPr lang="de-DE" smtClean="0"/>
-              <a:t>09.08.2022</a:t>
+              <a:t>21.09.2022</a:t>
             </a:fld>
             <a:endParaRPr lang="de-DE"/>
           </a:p>
@@ -1229,7 +1229,7 @@
           <a:p>
             <a:fld id="{C1068C6F-CF2F-4201-9BAA-A88518D20D6F}" type="datetimeFigureOut">
               <a:rPr lang="de-DE" smtClean="0"/>
-              <a:t>09.08.2022</a:t>
+              <a:t>21.09.2022</a:t>
             </a:fld>
             <a:endParaRPr lang="de-DE"/>
           </a:p>
@@ -1593,7 +1593,7 @@
           <a:p>
             <a:fld id="{C1068C6F-CF2F-4201-9BAA-A88518D20D6F}" type="datetimeFigureOut">
               <a:rPr lang="de-DE" smtClean="0"/>
-              <a:t>09.08.2022</a:t>
+              <a:t>21.09.2022</a:t>
             </a:fld>
             <a:endParaRPr lang="de-DE"/>
           </a:p>
@@ -1710,7 +1710,7 @@
           <a:p>
             <a:fld id="{C1068C6F-CF2F-4201-9BAA-A88518D20D6F}" type="datetimeFigureOut">
               <a:rPr lang="de-DE" smtClean="0"/>
-              <a:t>09.08.2022</a:t>
+              <a:t>21.09.2022</a:t>
             </a:fld>
             <a:endParaRPr lang="de-DE"/>
           </a:p>
@@ -1805,7 +1805,7 @@
           <a:p>
             <a:fld id="{C1068C6F-CF2F-4201-9BAA-A88518D20D6F}" type="datetimeFigureOut">
               <a:rPr lang="de-DE" smtClean="0"/>
-              <a:t>09.08.2022</a:t>
+              <a:t>21.09.2022</a:t>
             </a:fld>
             <a:endParaRPr lang="de-DE"/>
           </a:p>
@@ -2080,7 +2080,7 @@
           <a:p>
             <a:fld id="{C1068C6F-CF2F-4201-9BAA-A88518D20D6F}" type="datetimeFigureOut">
               <a:rPr lang="de-DE" smtClean="0"/>
-              <a:t>09.08.2022</a:t>
+              <a:t>21.09.2022</a:t>
             </a:fld>
             <a:endParaRPr lang="de-DE"/>
           </a:p>
@@ -2332,7 +2332,7 @@
           <a:p>
             <a:fld id="{C1068C6F-CF2F-4201-9BAA-A88518D20D6F}" type="datetimeFigureOut">
               <a:rPr lang="de-DE" smtClean="0"/>
-              <a:t>09.08.2022</a:t>
+              <a:t>21.09.2022</a:t>
             </a:fld>
             <a:endParaRPr lang="de-DE"/>
           </a:p>
@@ -2543,7 +2543,7 @@
           <a:p>
             <a:fld id="{C1068C6F-CF2F-4201-9BAA-A88518D20D6F}" type="datetimeFigureOut">
               <a:rPr lang="de-DE" smtClean="0"/>
-              <a:t>09.08.2022</a:t>
+              <a:t>21.09.2022</a:t>
             </a:fld>
             <a:endParaRPr lang="de-DE"/>
           </a:p>
@@ -3262,7 +3262,7 @@
         <p:spPr>
           <a:xfrm>
             <a:off x="2505928" y="825023"/>
-            <a:ext cx="1014168" cy="1015663"/>
+            <a:ext cx="1014168" cy="1384995"/>
           </a:xfrm>
           <a:prstGeom prst="rect">
             <a:avLst/>
@@ -3283,7 +3283,7 @@
           <a:lstStyle/>
           <a:p>
             <a:r>
-              <a:rPr lang="de-DE" sz="1200">
+              <a:rPr lang="de-DE" sz="1200" dirty="0" err="1">
                 <a:solidFill>
                   <a:srgbClr val="0070C0"/>
                 </a:solidFill>
@@ -3291,7 +3291,7 @@
               <a:t>op</a:t>
             </a:r>
             <a:r>
-              <a:rPr lang="de-DE" sz="1200">
+              <a:rPr lang="de-DE" sz="1200" dirty="0" err="1">
                 <a:solidFill>
                   <a:schemeClr val="bg1">
                     <a:lumMod val="75000"/>
@@ -3300,10 +3300,17 @@
               </a:rPr>
               <a:t>eration</a:t>
             </a:r>
-          </a:p>
-          <a:p>
-            <a:r>
-              <a:rPr lang="de-DE" sz="1200">
+            <a:endParaRPr lang="de-DE" sz="1200" dirty="0">
+              <a:solidFill>
+                <a:schemeClr val="bg1">
+                  <a:lumMod val="75000"/>
+                </a:schemeClr>
+              </a:solidFill>
+            </a:endParaRPr>
+          </a:p>
+          <a:p>
+            <a:r>
+              <a:rPr lang="de-DE" sz="1200" dirty="0">
                 <a:solidFill>
                   <a:srgbClr val="0070C0"/>
                 </a:solidFill>
@@ -3313,17 +3320,22 @@
           </a:p>
           <a:p>
             <a:r>
-              <a:rPr lang="de-DE" sz="1200">
+              <a:rPr lang="de-DE" sz="1200" dirty="0" err="1">
                 <a:solidFill>
                   <a:srgbClr val="0070C0"/>
                 </a:solidFill>
               </a:rPr>
               <a:t>tcp</a:t>
             </a:r>
-          </a:p>
-          <a:p>
-            <a:r>
-              <a:rPr lang="de-DE" sz="1200">
+            <a:endParaRPr lang="de-DE" sz="1200" dirty="0">
+              <a:solidFill>
+                <a:srgbClr val="0070C0"/>
+              </a:solidFill>
+            </a:endParaRPr>
+          </a:p>
+          <a:p>
+            <a:r>
+              <a:rPr lang="de-DE" sz="1200" dirty="0" err="1">
                 <a:solidFill>
                   <a:srgbClr val="0070C0"/>
                 </a:solidFill>
@@ -3331,7 +3343,7 @@
               <a:t>meth</a:t>
             </a:r>
             <a:r>
-              <a:rPr lang="de-DE" sz="1200">
+              <a:rPr lang="de-DE" sz="1200" dirty="0" err="1">
                 <a:solidFill>
                   <a:schemeClr val="bg1">
                     <a:lumMod val="75000"/>
@@ -3340,10 +3352,17 @@
               </a:rPr>
               <a:t>od</a:t>
             </a:r>
-          </a:p>
-          <a:p>
-            <a:r>
-              <a:rPr lang="de-DE" sz="1200">
+            <a:endParaRPr lang="de-DE" sz="1200" dirty="0">
+              <a:solidFill>
+                <a:schemeClr val="bg1">
+                  <a:lumMod val="75000"/>
+                </a:schemeClr>
+              </a:solidFill>
+            </a:endParaRPr>
+          </a:p>
+          <a:p>
+            <a:r>
+              <a:rPr lang="de-DE" sz="1200" dirty="0" err="1">
                 <a:solidFill>
                   <a:srgbClr val="0070C0"/>
                 </a:solidFill>
@@ -3351,7 +3370,7 @@
               <a:t>prot</a:t>
             </a:r>
             <a:r>
-              <a:rPr lang="de-DE" sz="1200">
+              <a:rPr lang="de-DE" sz="1200" dirty="0" err="1">
                 <a:solidFill>
                   <a:schemeClr val="bg1">
                     <a:lumMod val="75000"/>
@@ -3360,6 +3379,67 @@
               </a:rPr>
               <a:t>ocol</a:t>
             </a:r>
+            <a:endParaRPr lang="de-DE" sz="1200" dirty="0">
+              <a:solidFill>
+                <a:schemeClr val="bg1">
+                  <a:lumMod val="75000"/>
+                </a:schemeClr>
+              </a:solidFill>
+            </a:endParaRPr>
+          </a:p>
+          <a:p>
+            <a:r>
+              <a:rPr lang="de-DE" sz="1200" dirty="0" err="1">
+                <a:solidFill>
+                  <a:srgbClr val="0070C0"/>
+                </a:solidFill>
+              </a:rPr>
+              <a:t>e</a:t>
+            </a:r>
+            <a:r>
+              <a:rPr lang="de-DE" sz="1200" dirty="0" err="1">
+                <a:solidFill>
+                  <a:schemeClr val="bg1">
+                    <a:lumMod val="75000"/>
+                  </a:schemeClr>
+                </a:solidFill>
+              </a:rPr>
+              <a:t>lastic</a:t>
+            </a:r>
+            <a:r>
+              <a:rPr lang="de-DE" sz="1200" dirty="0" err="1">
+                <a:solidFill>
+                  <a:srgbClr val="0070C0"/>
+                </a:solidFill>
+              </a:rPr>
+              <a:t>s</a:t>
+            </a:r>
+            <a:r>
+              <a:rPr lang="de-DE" sz="1200" dirty="0" err="1">
+                <a:solidFill>
+                  <a:schemeClr val="bg1">
+                    <a:lumMod val="75000"/>
+                  </a:schemeClr>
+                </a:solidFill>
+              </a:rPr>
+              <a:t>earch</a:t>
+            </a:r>
+            <a:endParaRPr lang="de-DE" sz="1200" dirty="0">
+              <a:solidFill>
+                <a:schemeClr val="bg1">
+                  <a:lumMod val="75000"/>
+                </a:schemeClr>
+              </a:solidFill>
+            </a:endParaRPr>
+          </a:p>
+          <a:p>
+            <a:endParaRPr lang="de-DE" sz="1200" dirty="0">
+              <a:solidFill>
+                <a:schemeClr val="bg1">
+                  <a:lumMod val="75000"/>
+                </a:schemeClr>
+              </a:solidFill>
+            </a:endParaRPr>
           </a:p>
         </p:txBody>
       </p:sp>
@@ -3371,8 +3451,8 @@
         </p:nvSpPr>
         <p:spPr>
           <a:xfrm>
-            <a:off x="2505928" y="1840686"/>
-            <a:ext cx="1014168" cy="1200329"/>
+            <a:off x="2505928" y="2186286"/>
+            <a:ext cx="1014168" cy="1569660"/>
           </a:xfrm>
           <a:prstGeom prst="rect">
             <a:avLst/>
@@ -3393,36 +3473,14 @@
           <a:lstStyle/>
           <a:p>
             <a:r>
-              <a:rPr lang="de-DE" sz="1200">
+              <a:rPr lang="de-DE" sz="1200" dirty="0" err="1">
                 <a:solidFill>
                   <a:srgbClr val="0070C0"/>
                 </a:solidFill>
               </a:rPr>
-              <a:t>integer</a:t>
-            </a:r>
-          </a:p>
-          <a:p>
-            <a:r>
-              <a:rPr lang="de-DE" sz="1200">
-                <a:solidFill>
-                  <a:srgbClr val="0070C0"/>
-                </a:solidFill>
-              </a:rPr>
-              <a:t>string</a:t>
-            </a:r>
-          </a:p>
-          <a:p>
-            <a:r>
-              <a:rPr lang="de-DE" sz="1200">
-                <a:solidFill>
-                  <a:srgbClr val="0070C0"/>
-                </a:solidFill>
-              </a:rPr>
               <a:t>action</a:t>
             </a:r>
-          </a:p>
-          <a:p>
-            <a:endParaRPr lang="de-DE" sz="1200">
+            <a:endParaRPr lang="de-DE" sz="1200" dirty="0">
               <a:solidFill>
                 <a:srgbClr val="0070C0"/>
               </a:solidFill>
@@ -3430,12 +3488,98 @@
           </a:p>
           <a:p>
             <a:r>
-              <a:rPr lang="de-DE" sz="1200">
+              <a:rPr lang="de-DE" sz="1200" dirty="0" err="1">
                 <a:solidFill>
                   <a:srgbClr val="0070C0"/>
                 </a:solidFill>
               </a:rPr>
-              <a:t>&lt;own profile types&gt;</a:t>
+              <a:t>file</a:t>
+            </a:r>
+            <a:endParaRPr lang="de-DE" sz="1200" dirty="0">
+              <a:solidFill>
+                <a:srgbClr val="0070C0"/>
+              </a:solidFill>
+            </a:endParaRPr>
+          </a:p>
+          <a:p>
+            <a:r>
+              <a:rPr lang="de-DE" sz="1200" dirty="0">
+                <a:solidFill>
+                  <a:srgbClr val="0070C0"/>
+                </a:solidFill>
+              </a:rPr>
+              <a:t>integer</a:t>
+            </a:r>
+          </a:p>
+          <a:p>
+            <a:r>
+              <a:rPr lang="de-DE" sz="1200" dirty="0" err="1">
+                <a:solidFill>
+                  <a:srgbClr val="0070C0"/>
+                </a:solidFill>
+              </a:rPr>
+              <a:t>string</a:t>
+            </a:r>
+            <a:endParaRPr lang="de-DE" sz="1200" dirty="0">
+              <a:solidFill>
+                <a:srgbClr val="0070C0"/>
+              </a:solidFill>
+            </a:endParaRPr>
+          </a:p>
+          <a:p>
+            <a:endParaRPr lang="de-DE" sz="1200" dirty="0">
+              <a:solidFill>
+                <a:srgbClr val="0070C0"/>
+              </a:solidFill>
+            </a:endParaRPr>
+          </a:p>
+          <a:p>
+            <a:endParaRPr lang="de-DE" sz="1200" dirty="0">
+              <a:solidFill>
+                <a:srgbClr val="0070C0"/>
+              </a:solidFill>
+            </a:endParaRPr>
+          </a:p>
+          <a:p>
+            <a:r>
+              <a:rPr lang="de-DE" sz="1200" dirty="0">
+                <a:solidFill>
+                  <a:srgbClr val="0070C0"/>
+                </a:solidFill>
+              </a:rPr>
+              <a:t>&lt;own </a:t>
+            </a:r>
+            <a:r>
+              <a:rPr lang="de-DE" sz="1200" dirty="0" err="1">
+                <a:solidFill>
+                  <a:srgbClr val="0070C0"/>
+                </a:solidFill>
+              </a:rPr>
+              <a:t>profile</a:t>
+            </a:r>
+            <a:r>
+              <a:rPr lang="de-DE" sz="1200" dirty="0">
+                <a:solidFill>
+                  <a:srgbClr val="0070C0"/>
+                </a:solidFill>
+              </a:rPr>
+              <a:t> </a:t>
+            </a:r>
+            <a:r>
+              <a:rPr lang="de-DE" sz="1200" dirty="0" err="1">
+                <a:solidFill>
+                  <a:srgbClr val="0070C0"/>
+                </a:solidFill>
+              </a:rPr>
+              <a:t>types</a:t>
+            </a:r>
+            <a:r>
+              <a:rPr lang="de-DE" sz="1200" dirty="0">
+                <a:solidFill>
+                  <a:srgbClr val="0070C0"/>
+                </a:solidFill>
+              </a:rPr>
+              <a:t>&gt;</a:t>
             </a:r>
           </a:p>
         </p:txBody>
@@ -3668,7 +3812,7 @@
         <p:spPr>
           <a:xfrm flipH="1">
             <a:off x="3520096" y="2440851"/>
-            <a:ext cx="154613" cy="0"/>
+            <a:ext cx="154613" cy="530265"/>
           </a:xfrm>
           <a:prstGeom prst="straightConnector1">
             <a:avLst/>
@@ -4072,13 +4216,15 @@
       <p:cxnSp>
         <p:nvCxnSpPr>
           <p:cNvPr id="17" name="Gerade Verbindung mit Pfeil 16"/>
-          <p:cNvCxnSpPr/>
+          <p:cNvCxnSpPr>
+            <a:cxnSpLocks/>
+          </p:cNvCxnSpPr>
           <p:nvPr/>
         </p:nvCxnSpPr>
         <p:spPr>
           <a:xfrm>
-            <a:off x="4183380" y="952500"/>
-            <a:ext cx="906414" cy="476250"/>
+            <a:off x="4190178" y="1022400"/>
+            <a:ext cx="899616" cy="406350"/>
           </a:xfrm>
           <a:prstGeom prst="straightConnector1">
             <a:avLst/>
@@ -4152,11 +4298,11 @@
             </a:r>
             <a:r>
               <a:rPr lang="de-DE" sz="1200" i="1" dirty="0" err="1"/>
-              <a:t>client</a:t>
+              <a:t>OperationClients</a:t>
             </a:r>
             <a:r>
               <a:rPr lang="de-DE" sz="1200" i="1" dirty="0"/>
-              <a:t>!</a:t>
+              <a:t> !</a:t>
             </a:r>
           </a:p>
           <a:p>
@@ -4328,8 +4474,8 @@
         </p:nvCxnSpPr>
         <p:spPr>
           <a:xfrm>
-            <a:off x="4183380" y="952500"/>
-            <a:ext cx="2415038" cy="238125"/>
+            <a:off x="4190178" y="885600"/>
+            <a:ext cx="2408240" cy="305025"/>
           </a:xfrm>
           <a:prstGeom prst="straightConnector1">
             <a:avLst/>
@@ -4381,6 +4527,51 @@
               <a:schemeClr val="tx1"/>
             </a:solidFill>
             <a:tailEnd type="triangle"/>
+          </a:ln>
+        </p:spPr>
+        <p:style>
+          <a:lnRef idx="1">
+            <a:schemeClr val="accent1"/>
+          </a:lnRef>
+          <a:fillRef idx="0">
+            <a:schemeClr val="accent1"/>
+          </a:fillRef>
+          <a:effectRef idx="0">
+            <a:schemeClr val="accent1"/>
+          </a:effectRef>
+          <a:fontRef idx="minor">
+            <a:schemeClr val="tx1"/>
+          </a:fontRef>
+        </p:style>
+      </p:cxnSp>
+      <p:cxnSp>
+        <p:nvCxnSpPr>
+          <p:cNvPr id="12" name="Gerader Verbinder 11">
+            <a:extLst>
+              <a:ext uri="{FF2B5EF4-FFF2-40B4-BE49-F238E27FC236}">
+                <a16:creationId xmlns:a16="http://schemas.microsoft.com/office/drawing/2014/main" id="{29861638-C847-46B0-A46D-0AC2F4F3DD83}"/>
+              </a:ext>
+            </a:extLst>
+          </p:cNvPr>
+          <p:cNvCxnSpPr>
+            <a:cxnSpLocks/>
+          </p:cNvCxnSpPr>
+          <p:nvPr/>
+        </p:nvCxnSpPr>
+        <p:spPr>
+          <a:xfrm>
+            <a:off x="3211200" y="885600"/>
+            <a:ext cx="968781" cy="0"/>
+          </a:xfrm>
+          <a:prstGeom prst="line">
+            <a:avLst/>
+          </a:prstGeom>
+          <a:ln>
+            <a:solidFill>
+              <a:schemeClr val="tx1"/>
+            </a:solidFill>
+            <a:headEnd type="diamond"/>
+            <a:tailEnd type="diamond"/>
           </a:ln>
         </p:spPr>
         <p:style>

</xml_diff>

<commit_message>
Remove ApiSegment from UUIDs of httpC/S + tcpC/S
</commit_message>
<xml_diff>
--- a/doc/ElementsApplicationPattern/Names/StructureOfUuids/pictures/uuid-structure.pptx
+++ b/doc/ElementsApplicationPattern/Names/StructureOfUuids/pictures/uuid-structure.pptx
@@ -241,7 +241,7 @@
           <a:p>
             <a:fld id="{C1068C6F-CF2F-4201-9BAA-A88518D20D6F}" type="datetimeFigureOut">
               <a:rPr lang="de-DE" smtClean="0"/>
-              <a:t>21.09.2022</a:t>
+              <a:t>07.12.2022</a:t>
             </a:fld>
             <a:endParaRPr lang="de-DE"/>
           </a:p>
@@ -409,7 +409,7 @@
           <a:p>
             <a:fld id="{C1068C6F-CF2F-4201-9BAA-A88518D20D6F}" type="datetimeFigureOut">
               <a:rPr lang="de-DE" smtClean="0"/>
-              <a:t>21.09.2022</a:t>
+              <a:t>07.12.2022</a:t>
             </a:fld>
             <a:endParaRPr lang="de-DE"/>
           </a:p>
@@ -587,7 +587,7 @@
           <a:p>
             <a:fld id="{C1068C6F-CF2F-4201-9BAA-A88518D20D6F}" type="datetimeFigureOut">
               <a:rPr lang="de-DE" smtClean="0"/>
-              <a:t>21.09.2022</a:t>
+              <a:t>07.12.2022</a:t>
             </a:fld>
             <a:endParaRPr lang="de-DE"/>
           </a:p>
@@ -755,7 +755,7 @@
           <a:p>
             <a:fld id="{C1068C6F-CF2F-4201-9BAA-A88518D20D6F}" type="datetimeFigureOut">
               <a:rPr lang="de-DE" smtClean="0"/>
-              <a:t>21.09.2022</a:t>
+              <a:t>07.12.2022</a:t>
             </a:fld>
             <a:endParaRPr lang="de-DE"/>
           </a:p>
@@ -1000,7 +1000,7 @@
           <a:p>
             <a:fld id="{C1068C6F-CF2F-4201-9BAA-A88518D20D6F}" type="datetimeFigureOut">
               <a:rPr lang="de-DE" smtClean="0"/>
-              <a:t>21.09.2022</a:t>
+              <a:t>07.12.2022</a:t>
             </a:fld>
             <a:endParaRPr lang="de-DE"/>
           </a:p>
@@ -1229,7 +1229,7 @@
           <a:p>
             <a:fld id="{C1068C6F-CF2F-4201-9BAA-A88518D20D6F}" type="datetimeFigureOut">
               <a:rPr lang="de-DE" smtClean="0"/>
-              <a:t>21.09.2022</a:t>
+              <a:t>07.12.2022</a:t>
             </a:fld>
             <a:endParaRPr lang="de-DE"/>
           </a:p>
@@ -1593,7 +1593,7 @@
           <a:p>
             <a:fld id="{C1068C6F-CF2F-4201-9BAA-A88518D20D6F}" type="datetimeFigureOut">
               <a:rPr lang="de-DE" smtClean="0"/>
-              <a:t>21.09.2022</a:t>
+              <a:t>07.12.2022</a:t>
             </a:fld>
             <a:endParaRPr lang="de-DE"/>
           </a:p>
@@ -1710,7 +1710,7 @@
           <a:p>
             <a:fld id="{C1068C6F-CF2F-4201-9BAA-A88518D20D6F}" type="datetimeFigureOut">
               <a:rPr lang="de-DE" smtClean="0"/>
-              <a:t>21.09.2022</a:t>
+              <a:t>07.12.2022</a:t>
             </a:fld>
             <a:endParaRPr lang="de-DE"/>
           </a:p>
@@ -1805,7 +1805,7 @@
           <a:p>
             <a:fld id="{C1068C6F-CF2F-4201-9BAA-A88518D20D6F}" type="datetimeFigureOut">
               <a:rPr lang="de-DE" smtClean="0"/>
-              <a:t>21.09.2022</a:t>
+              <a:t>07.12.2022</a:t>
             </a:fld>
             <a:endParaRPr lang="de-DE"/>
           </a:p>
@@ -2080,7 +2080,7 @@
           <a:p>
             <a:fld id="{C1068C6F-CF2F-4201-9BAA-A88518D20D6F}" type="datetimeFigureOut">
               <a:rPr lang="de-DE" smtClean="0"/>
-              <a:t>21.09.2022</a:t>
+              <a:t>07.12.2022</a:t>
             </a:fld>
             <a:endParaRPr lang="de-DE"/>
           </a:p>
@@ -2332,7 +2332,7 @@
           <a:p>
             <a:fld id="{C1068C6F-CF2F-4201-9BAA-A88518D20D6F}" type="datetimeFigureOut">
               <a:rPr lang="de-DE" smtClean="0"/>
-              <a:t>21.09.2022</a:t>
+              <a:t>07.12.2022</a:t>
             </a:fld>
             <a:endParaRPr lang="de-DE"/>
           </a:p>
@@ -2543,7 +2543,7 @@
           <a:p>
             <a:fld id="{C1068C6F-CF2F-4201-9BAA-A88518D20D6F}" type="datetimeFigureOut">
               <a:rPr lang="de-DE" smtClean="0"/>
-              <a:t>21.09.2022</a:t>
+              <a:t>07.12.2022</a:t>
             </a:fld>
             <a:endParaRPr lang="de-DE"/>
           </a:p>
@@ -2956,8 +2956,8 @@
         </p:nvSpPr>
         <p:spPr>
           <a:xfrm>
-            <a:off x="283780" y="436207"/>
-            <a:ext cx="10730271" cy="338554"/>
+            <a:off x="100900" y="436207"/>
+            <a:ext cx="11048684" cy="338554"/>
           </a:xfrm>
           <a:prstGeom prst="rect">
             <a:avLst/>
@@ -3024,7 +3024,7 @@
                 <a:latin typeface="Consolas" panose="020B0609020204030204" pitchFamily="49" charset="0"/>
                 <a:cs typeface="Consolas" panose="020B0609020204030204" pitchFamily="49" charset="0"/>
               </a:rPr>
-              <a:t>]</a:t>
+              <a:t>] </a:t>
             </a:r>
             <a:r>
               <a:rPr lang="en-US" sz="1600" b="0" i="0" dirty="0">
@@ -3032,7 +3032,7 @@
                 <a:latin typeface="Consolas" panose="020B0609020204030204" pitchFamily="49" charset="0"/>
                 <a:cs typeface="Consolas" panose="020B0609020204030204" pitchFamily="49" charset="0"/>
               </a:rPr>
-              <a:t>-</a:t>
+              <a:t>- </a:t>
             </a:r>
             <a:r>
               <a:rPr lang="en-US" sz="1600" b="0" i="0" dirty="0">
@@ -3214,7 +3214,7 @@
         </p:nvSpPr>
         <p:spPr>
           <a:xfrm>
-            <a:off x="380349" y="825023"/>
+            <a:off x="228686" y="836909"/>
             <a:ext cx="1888464" cy="1015663"/>
           </a:xfrm>
           <a:prstGeom prst="rect">
@@ -3261,8 +3261,8 @@
         </p:nvSpPr>
         <p:spPr>
           <a:xfrm>
-            <a:off x="2505928" y="825023"/>
-            <a:ext cx="1014168" cy="1384995"/>
+            <a:off x="2218945" y="825023"/>
+            <a:ext cx="1301152" cy="1384995"/>
           </a:xfrm>
           <a:prstGeom prst="rect">
             <a:avLst/>
@@ -3451,8 +3451,8 @@
         </p:nvSpPr>
         <p:spPr>
           <a:xfrm>
-            <a:off x="2505928" y="2186286"/>
-            <a:ext cx="1014168" cy="1569660"/>
+            <a:off x="2218944" y="2186286"/>
+            <a:ext cx="1301152" cy="1754326"/>
           </a:xfrm>
           <a:prstGeom prst="rect">
             <a:avLst/>
@@ -3490,10 +3490,20 @@
             <a:r>
               <a:rPr lang="de-DE" sz="1200" dirty="0" err="1">
                 <a:solidFill>
+                  <a:schemeClr val="bg1">
+                    <a:lumMod val="75000"/>
+                  </a:schemeClr>
+                </a:solidFill>
+              </a:rPr>
+              <a:t>generic</a:t>
+            </a:r>
+            <a:r>
+              <a:rPr lang="de-DE" sz="1200" dirty="0" err="1">
+                <a:solidFill>
                   <a:srgbClr val="0070C0"/>
                 </a:solidFill>
               </a:rPr>
-              <a:t>file</a:t>
+              <a:t>response</a:t>
             </a:r>
             <a:endParaRPr lang="de-DE" sz="1200" dirty="0">
               <a:solidFill>
@@ -3503,22 +3513,12 @@
           </a:p>
           <a:p>
             <a:r>
-              <a:rPr lang="de-DE" sz="1200" dirty="0">
+              <a:rPr lang="de-DE" sz="1200" dirty="0" err="1">
                 <a:solidFill>
                   <a:srgbClr val="0070C0"/>
                 </a:solidFill>
               </a:rPr>
-              <a:t>integer</a:t>
-            </a:r>
-          </a:p>
-          <a:p>
-            <a:r>
-              <a:rPr lang="de-DE" sz="1200" dirty="0" err="1">
-                <a:solidFill>
-                  <a:srgbClr val="0070C0"/>
-                </a:solidFill>
-              </a:rPr>
-              <a:t>string</a:t>
+              <a:t>file</a:t>
             </a:r>
             <a:endParaRPr lang="de-DE" sz="1200" dirty="0">
               <a:solidFill>
@@ -3527,6 +3527,24 @@
             </a:endParaRPr>
           </a:p>
           <a:p>
+            <a:r>
+              <a:rPr lang="de-DE" sz="1200" dirty="0">
+                <a:solidFill>
+                  <a:srgbClr val="0070C0"/>
+                </a:solidFill>
+              </a:rPr>
+              <a:t>integer</a:t>
+            </a:r>
+          </a:p>
+          <a:p>
+            <a:r>
+              <a:rPr lang="de-DE" sz="1200" dirty="0" err="1">
+                <a:solidFill>
+                  <a:srgbClr val="0070C0"/>
+                </a:solidFill>
+              </a:rPr>
+              <a:t>string</a:t>
+            </a:r>
             <a:endParaRPr lang="de-DE" sz="1200" dirty="0">
               <a:solidFill>
                 <a:srgbClr val="0070C0"/>
@@ -3541,6 +3559,13 @@
             </a:endParaRPr>
           </a:p>
           <a:p>
+            <a:endParaRPr lang="de-DE" sz="1200" dirty="0">
+              <a:solidFill>
+                <a:srgbClr val="0070C0"/>
+              </a:solidFill>
+            </a:endParaRPr>
+          </a:p>
+          <a:p>
             <a:r>
               <a:rPr lang="de-DE" sz="1200" dirty="0">
                 <a:solidFill>
@@ -3593,7 +3618,7 @@
         <p:spPr>
           <a:xfrm>
             <a:off x="3674709" y="825023"/>
-            <a:ext cx="1227300" cy="1015663"/>
+            <a:ext cx="1227300" cy="1384995"/>
           </a:xfrm>
           <a:prstGeom prst="rect">
             <a:avLst/>
@@ -3703,8 +3728,22 @@
                   <a:srgbClr val="00B050"/>
                 </a:solidFill>
               </a:rPr>
-              <a:t>link</a:t>
-            </a:r>
+              <a:t>Link</a:t>
+            </a:r>
+          </a:p>
+          <a:p>
+            <a:endParaRPr lang="de-DE" sz="1200" dirty="0">
+              <a:solidFill>
+                <a:srgbClr val="00B050"/>
+              </a:solidFill>
+            </a:endParaRPr>
+          </a:p>
+          <a:p>
+            <a:endParaRPr lang="de-DE" sz="1200" dirty="0">
+              <a:solidFill>
+                <a:srgbClr val="00B050"/>
+              </a:solidFill>
+            </a:endParaRPr>
           </a:p>
         </p:txBody>
       </p:sp>
@@ -3716,8 +3755,8 @@
         </p:nvSpPr>
         <p:spPr>
           <a:xfrm>
-            <a:off x="3674709" y="1840686"/>
-            <a:ext cx="1227300" cy="1200329"/>
+            <a:off x="3671036" y="2186286"/>
+            <a:ext cx="1227300" cy="1754326"/>
           </a:xfrm>
           <a:prstGeom prst="rect">
             <a:avLst/>
@@ -3751,6 +3790,20 @@
             </a:endParaRPr>
           </a:p>
           <a:p>
+            <a:endParaRPr lang="de-DE" sz="1200" dirty="0">
+              <a:solidFill>
+                <a:srgbClr val="00B050"/>
+              </a:solidFill>
+            </a:endParaRPr>
+          </a:p>
+          <a:p>
+            <a:endParaRPr lang="de-DE" sz="1200" dirty="0">
+              <a:solidFill>
+                <a:srgbClr val="00B050"/>
+              </a:solidFill>
+            </a:endParaRPr>
+          </a:p>
+          <a:p>
             <a:r>
               <a:rPr lang="de-DE" sz="1200" dirty="0" err="1">
                 <a:solidFill>
@@ -3780,7 +3833,9 @@
           <a:p>
             <a:endParaRPr lang="de-DE" sz="1200" dirty="0">
               <a:solidFill>
-                <a:srgbClr val="0070C0"/>
+                <a:schemeClr val="bg1">
+                  <a:lumMod val="75000"/>
+                </a:schemeClr>
               </a:solidFill>
             </a:endParaRPr>
           </a:p>
@@ -3798,91 +3853,15 @@
               </a:solidFill>
             </a:endParaRPr>
           </a:p>
-        </p:txBody>
-      </p:sp>
-      <p:cxnSp>
-        <p:nvCxnSpPr>
-          <p:cNvPr id="11" name="Gerade Verbindung mit Pfeil 10"/>
-          <p:cNvCxnSpPr>
-            <a:stCxn id="9" idx="1"/>
-            <a:endCxn id="7" idx="3"/>
-          </p:cNvCxnSpPr>
-          <p:nvPr/>
-        </p:nvCxnSpPr>
-        <p:spPr>
-          <a:xfrm flipH="1">
-            <a:off x="3520096" y="2440851"/>
-            <a:ext cx="154613" cy="530265"/>
-          </a:xfrm>
-          <a:prstGeom prst="straightConnector1">
-            <a:avLst/>
-          </a:prstGeom>
-          <a:ln>
-            <a:solidFill>
-              <a:schemeClr val="tx1">
-                <a:lumMod val="50000"/>
-                <a:lumOff val="50000"/>
-              </a:schemeClr>
-            </a:solidFill>
-            <a:prstDash val="dash"/>
-            <a:tailEnd type="triangle"/>
-          </a:ln>
-        </p:spPr>
-        <p:style>
-          <a:lnRef idx="1">
-            <a:schemeClr val="accent1"/>
-          </a:lnRef>
-          <a:fillRef idx="0">
-            <a:schemeClr val="accent1"/>
-          </a:fillRef>
-          <a:effectRef idx="0">
-            <a:schemeClr val="accent1"/>
-          </a:effectRef>
-          <a:fontRef idx="minor">
-            <a:schemeClr val="tx1"/>
-          </a:fontRef>
-        </p:style>
-      </p:cxnSp>
-      <p:cxnSp>
-        <p:nvCxnSpPr>
-          <p:cNvPr id="14" name="Gerade Verbindung mit Pfeil 13"/>
-          <p:cNvCxnSpPr/>
-          <p:nvPr/>
-        </p:nvCxnSpPr>
-        <p:spPr>
-          <a:xfrm flipH="1">
-            <a:off x="3520096" y="1259751"/>
-            <a:ext cx="154613" cy="0"/>
-          </a:xfrm>
-          <a:prstGeom prst="straightConnector1">
-            <a:avLst/>
-          </a:prstGeom>
-          <a:ln>
-            <a:solidFill>
-              <a:schemeClr val="tx1">
-                <a:lumMod val="50000"/>
-                <a:lumOff val="50000"/>
-              </a:schemeClr>
-            </a:solidFill>
-            <a:prstDash val="dash"/>
-            <a:tailEnd type="triangle"/>
-          </a:ln>
-        </p:spPr>
-        <p:style>
-          <a:lnRef idx="1">
-            <a:schemeClr val="accent1"/>
-          </a:lnRef>
-          <a:fillRef idx="0">
-            <a:schemeClr val="accent1"/>
-          </a:fillRef>
-          <a:effectRef idx="0">
-            <a:schemeClr val="accent1"/>
-          </a:effectRef>
-          <a:fontRef idx="minor">
-            <a:schemeClr val="tx1"/>
-          </a:fontRef>
-        </p:style>
-      </p:cxnSp>
+          <a:p>
+            <a:endParaRPr lang="de-DE" sz="1200" dirty="0">
+              <a:solidFill>
+                <a:srgbClr val="0070C0"/>
+              </a:solidFill>
+            </a:endParaRPr>
+          </a:p>
+        </p:txBody>
+      </p:sp>
       <p:sp>
         <p:nvSpPr>
           <p:cNvPr id="15" name="Textfeld 14"/>
@@ -3892,7 +3871,7 @@
         <p:spPr>
           <a:xfrm>
             <a:off x="5089794" y="1286689"/>
-            <a:ext cx="1344178" cy="1754326"/>
+            <a:ext cx="1426830" cy="2862322"/>
           </a:xfrm>
           <a:prstGeom prst="rect">
             <a:avLst/>
@@ -3929,11 +3908,147 @@
             </a:r>
             <a:r>
               <a:rPr lang="de-DE" sz="1200" i="1" dirty="0"/>
+              <a:t>: </a:t>
+            </a:r>
+          </a:p>
+          <a:p>
+            <a:pPr marL="171450" indent="-171450">
+              <a:buFontTx/>
+              <a:buChar char="-"/>
+              <a:tabLst>
+                <a:tab pos="358775" algn="l"/>
+              </a:tabLst>
+            </a:pPr>
+            <a:r>
+              <a:rPr lang="de-DE" sz="1200" i="1" dirty="0" err="1"/>
+              <a:t>OperationClient</a:t>
+            </a:r>
+            <a:endParaRPr lang="de-DE" sz="1200" i="1" dirty="0"/>
+          </a:p>
+          <a:p>
+            <a:pPr marL="171450" indent="-171450">
+              <a:buFontTx/>
+              <a:buChar char="-"/>
+              <a:tabLst>
+                <a:tab pos="358775" algn="l"/>
+              </a:tabLst>
+            </a:pPr>
+            <a:r>
+              <a:rPr lang="de-DE" sz="1200" i="1" dirty="0" err="1"/>
+              <a:t>OperationServer</a:t>
+            </a:r>
+            <a:endParaRPr lang="de-DE" sz="1200" i="1" dirty="0"/>
+          </a:p>
+          <a:p>
+            <a:pPr marL="171450" indent="-171450">
+              <a:buFontTx/>
+              <a:buChar char="-"/>
+              <a:tabLst>
+                <a:tab pos="358775" algn="l"/>
+              </a:tabLst>
+            </a:pPr>
+            <a:r>
+              <a:rPr lang="de-DE" sz="1200" i="1" dirty="0" err="1"/>
+              <a:t>Fc</a:t>
+            </a:r>
+            <a:r>
+              <a:rPr lang="de-DE" sz="1200" i="1" dirty="0"/>
               <a:t> </a:t>
             </a:r>
             <a:r>
               <a:rPr lang="de-DE" sz="1200" i="1" dirty="0" err="1"/>
-              <a:t>client</a:t>
+              <a:t>for</a:t>
+            </a:r>
+            <a:r>
+              <a:rPr lang="de-DE" sz="1200" i="1" dirty="0"/>
+              <a:t> </a:t>
+            </a:r>
+            <a:r>
+              <a:rPr lang="de-DE" sz="1200" i="1" dirty="0" err="1"/>
+              <a:t>operations</a:t>
+            </a:r>
+            <a:endParaRPr lang="de-DE" sz="1200" i="1" dirty="0"/>
+          </a:p>
+          <a:p>
+            <a:pPr>
+              <a:tabLst>
+                <a:tab pos="358775" algn="l"/>
+              </a:tabLst>
+            </a:pPr>
+            <a:endParaRPr lang="de-DE" sz="1200" i="1" dirty="0"/>
+          </a:p>
+          <a:p>
+            <a:pPr>
+              <a:tabLst>
+                <a:tab pos="358775" algn="l"/>
+              </a:tabLst>
+            </a:pPr>
+            <a:r>
+              <a:rPr lang="de-DE" sz="1200" i="1" dirty="0"/>
+              <a:t>not </a:t>
+            </a:r>
+            <a:r>
+              <a:rPr lang="de-DE" sz="1200" i="1" dirty="0" err="1"/>
+              <a:t>for</a:t>
+            </a:r>
+            <a:r>
+              <a:rPr lang="de-DE" sz="1200" i="1" dirty="0"/>
+              <a:t>:</a:t>
+            </a:r>
+          </a:p>
+          <a:p>
+            <a:pPr marL="171450" indent="-171450">
+              <a:buFontTx/>
+              <a:buChar char="-"/>
+              <a:tabLst>
+                <a:tab pos="358775" algn="l"/>
+              </a:tabLst>
+            </a:pPr>
+            <a:r>
+              <a:rPr lang="de-DE" sz="1200" i="1" dirty="0" err="1"/>
+              <a:t>HttpClient</a:t>
+            </a:r>
+            <a:r>
+              <a:rPr lang="de-DE" sz="1200" i="1" dirty="0"/>
+              <a:t>/Server</a:t>
+            </a:r>
+          </a:p>
+          <a:p>
+            <a:pPr marL="171450" indent="-171450">
+              <a:buFontTx/>
+              <a:buChar char="-"/>
+              <a:tabLst>
+                <a:tab pos="358775" algn="l"/>
+              </a:tabLst>
+            </a:pPr>
+            <a:r>
+              <a:rPr lang="de-DE" sz="1200" i="1" dirty="0" err="1"/>
+              <a:t>TcpClient</a:t>
+            </a:r>
+            <a:r>
+              <a:rPr lang="de-DE" sz="1200" i="1" dirty="0"/>
+              <a:t>/Server</a:t>
+            </a:r>
+          </a:p>
+          <a:p>
+            <a:pPr marL="171450" indent="-171450">
+              <a:buFontTx/>
+              <a:buChar char="-"/>
+              <a:tabLst>
+                <a:tab pos="358775" algn="l"/>
+              </a:tabLst>
+            </a:pPr>
+            <a:r>
+              <a:rPr lang="de-DE" sz="1200" i="1" dirty="0" err="1"/>
+              <a:t>any</a:t>
+            </a:r>
+            <a:r>
+              <a:rPr lang="de-DE" sz="1200" i="1" dirty="0"/>
+              <a:t> </a:t>
+            </a:r>
+            <a:r>
+              <a:rPr lang="de-DE" sz="1200" i="1" dirty="0" err="1"/>
+              <a:t>profile</a:t>
             </a:r>
             <a:r>
               <a:rPr lang="de-DE" sz="1200" i="1" dirty="0"/>
@@ -3941,26 +4056,7 @@
             </a:r>
             <a:r>
               <a:rPr lang="de-DE" sz="1200" i="1" dirty="0" err="1"/>
-              <a:t>server</a:t>
-            </a:r>
-            <a:r>
-              <a:rPr lang="de-DE" sz="1200" i="1" dirty="0"/>
-              <a:t> and </a:t>
-            </a:r>
-            <a:r>
-              <a:rPr lang="de-DE" sz="1200" i="1" dirty="0" err="1"/>
-              <a:t>fc</a:t>
-            </a:r>
-            <a:br>
-              <a:rPr lang="de-DE" sz="1200" i="1" dirty="0"/>
-            </a:br>
-            <a:r>
-              <a:rPr lang="de-DE" sz="1200" i="1" dirty="0"/>
-              <a:t>not </a:t>
-            </a:r>
-            <a:r>
-              <a:rPr lang="de-DE" sz="1200" i="1" dirty="0" err="1"/>
-              <a:t>for</a:t>
+              <a:t>fd</a:t>
             </a:r>
             <a:r>
               <a:rPr lang="de-DE" sz="1200" i="1" dirty="0"/>
@@ -3968,19 +4064,11 @@
             </a:r>
             <a:r>
               <a:rPr lang="de-DE" sz="1200" i="1" dirty="0" err="1"/>
-              <a:t>profile</a:t>
+              <a:t>or</a:t>
             </a:r>
             <a:r>
               <a:rPr lang="de-DE" sz="1200" i="1" dirty="0"/>
-              <a:t>, </a:t>
-            </a:r>
-            <a:r>
-              <a:rPr lang="de-DE" sz="1200" i="1" dirty="0" err="1"/>
-              <a:t>fd</a:t>
-            </a:r>
-            <a:r>
-              <a:rPr lang="de-DE" sz="1200" i="1" dirty="0"/>
-              <a:t> and link!</a:t>
+              <a:t> link!</a:t>
             </a:r>
           </a:p>
           <a:p>
@@ -4223,8 +4311,8 @@
         </p:nvCxnSpPr>
         <p:spPr>
           <a:xfrm>
-            <a:off x="4190178" y="1022400"/>
-            <a:ext cx="899616" cy="406350"/>
+            <a:off x="4203774" y="916579"/>
+            <a:ext cx="863183" cy="637901"/>
           </a:xfrm>
           <a:prstGeom prst="straightConnector1">
             <a:avLst/>
@@ -4259,7 +4347,7 @@
         </p:nvSpPr>
         <p:spPr>
           <a:xfrm>
-            <a:off x="6598418" y="1130240"/>
+            <a:off x="6652127" y="1130240"/>
             <a:ext cx="2215207" cy="1015663"/>
           </a:xfrm>
           <a:prstGeom prst="rect">
@@ -4375,7 +4463,7 @@
         </p:nvSpPr>
         <p:spPr>
           <a:xfrm>
-            <a:off x="8978573" y="825023"/>
+            <a:off x="9063917" y="825023"/>
             <a:ext cx="1689428" cy="1015663"/>
           </a:xfrm>
           <a:prstGeom prst="rect">
@@ -4431,13 +4519,15 @@
       <p:cxnSp>
         <p:nvCxnSpPr>
           <p:cNvPr id="25" name="Gerade Verbindung mit Pfeil 24"/>
-          <p:cNvCxnSpPr/>
+          <p:cNvCxnSpPr>
+            <a:cxnSpLocks/>
+          </p:cNvCxnSpPr>
           <p:nvPr/>
         </p:nvCxnSpPr>
         <p:spPr>
           <a:xfrm>
-            <a:off x="4190178" y="1158468"/>
-            <a:ext cx="906414" cy="476250"/>
+            <a:off x="4197423" y="1136717"/>
+            <a:ext cx="888972" cy="649411"/>
           </a:xfrm>
           <a:prstGeom prst="straightConnector1">
             <a:avLst/>
@@ -4474,8 +4564,8 @@
         </p:nvCxnSpPr>
         <p:spPr>
           <a:xfrm>
-            <a:off x="4190178" y="885600"/>
-            <a:ext cx="2408240" cy="305025"/>
+            <a:off x="4203774" y="922331"/>
+            <a:ext cx="2394644" cy="268294"/>
           </a:xfrm>
           <a:prstGeom prst="straightConnector1">
             <a:avLst/>
@@ -4511,13 +4601,15 @@
               </a:ext>
             </a:extLst>
           </p:cNvPr>
-          <p:cNvCxnSpPr/>
+          <p:cNvCxnSpPr>
+            <a:cxnSpLocks/>
+          </p:cNvCxnSpPr>
           <p:nvPr/>
         </p:nvCxnSpPr>
         <p:spPr>
           <a:xfrm>
-            <a:off x="4179981" y="1530016"/>
-            <a:ext cx="906414" cy="476250"/>
+            <a:off x="4183380" y="1514340"/>
+            <a:ext cx="903015" cy="491926"/>
           </a:xfrm>
           <a:prstGeom prst="straightConnector1">
             <a:avLst/>
@@ -4560,8 +4652,8 @@
         </p:nvCxnSpPr>
         <p:spPr>
           <a:xfrm>
-            <a:off x="3211200" y="885600"/>
-            <a:ext cx="968781" cy="0"/>
+            <a:off x="3208849" y="879123"/>
+            <a:ext cx="981449" cy="55245"/>
           </a:xfrm>
           <a:prstGeom prst="line">
             <a:avLst/>
@@ -4573,6 +4665,175 @@
             <a:headEnd type="diamond"/>
             <a:tailEnd type="diamond"/>
           </a:ln>
+        </p:spPr>
+        <p:style>
+          <a:lnRef idx="1">
+            <a:schemeClr val="accent1"/>
+          </a:lnRef>
+          <a:fillRef idx="0">
+            <a:schemeClr val="accent1"/>
+          </a:fillRef>
+          <a:effectRef idx="0">
+            <a:schemeClr val="accent1"/>
+          </a:effectRef>
+          <a:fontRef idx="minor">
+            <a:schemeClr val="tx1"/>
+          </a:fontRef>
+        </p:style>
+      </p:cxnSp>
+      <p:cxnSp>
+        <p:nvCxnSpPr>
+          <p:cNvPr id="24" name="Gerader Verbinder 23">
+            <a:extLst>
+              <a:ext uri="{FF2B5EF4-FFF2-40B4-BE49-F238E27FC236}">
+                <a16:creationId xmlns:a16="http://schemas.microsoft.com/office/drawing/2014/main" id="{71650663-CBBD-4AA4-8729-CA7CBF32CB90}"/>
+              </a:ext>
+            </a:extLst>
+          </p:cNvPr>
+          <p:cNvCxnSpPr>
+            <a:cxnSpLocks/>
+          </p:cNvCxnSpPr>
+          <p:nvPr/>
+        </p:nvCxnSpPr>
+        <p:spPr>
+          <a:xfrm>
+            <a:off x="3208849" y="879123"/>
+            <a:ext cx="981329" cy="251117"/>
+          </a:xfrm>
+          <a:prstGeom prst="line">
+            <a:avLst/>
+          </a:prstGeom>
+          <a:ln>
+            <a:solidFill>
+              <a:schemeClr val="tx1"/>
+            </a:solidFill>
+            <a:headEnd type="diamond"/>
+            <a:tailEnd type="diamond"/>
+          </a:ln>
+        </p:spPr>
+        <p:style>
+          <a:lnRef idx="1">
+            <a:schemeClr val="accent1"/>
+          </a:lnRef>
+          <a:fillRef idx="0">
+            <a:schemeClr val="accent1"/>
+          </a:fillRef>
+          <a:effectRef idx="0">
+            <a:schemeClr val="accent1"/>
+          </a:effectRef>
+          <a:fontRef idx="minor">
+            <a:schemeClr val="tx1"/>
+          </a:fontRef>
+        </p:style>
+      </p:cxnSp>
+      <p:cxnSp>
+        <p:nvCxnSpPr>
+          <p:cNvPr id="30" name="Gerader Verbinder 29">
+            <a:extLst>
+              <a:ext uri="{FF2B5EF4-FFF2-40B4-BE49-F238E27FC236}">
+                <a16:creationId xmlns:a16="http://schemas.microsoft.com/office/drawing/2014/main" id="{97D2B7D8-4FF1-4242-9A30-7EBEDD8B63F3}"/>
+              </a:ext>
+            </a:extLst>
+          </p:cNvPr>
+          <p:cNvCxnSpPr>
+            <a:cxnSpLocks/>
+          </p:cNvCxnSpPr>
+          <p:nvPr/>
+        </p:nvCxnSpPr>
+        <p:spPr>
+          <a:xfrm>
+            <a:off x="3175688" y="862712"/>
+            <a:ext cx="990697" cy="635217"/>
+          </a:xfrm>
+          <a:prstGeom prst="line">
+            <a:avLst/>
+          </a:prstGeom>
+          <a:ln>
+            <a:solidFill>
+              <a:schemeClr val="tx1"/>
+            </a:solidFill>
+            <a:headEnd type="diamond"/>
+            <a:tailEnd type="diamond"/>
+          </a:ln>
+        </p:spPr>
+        <p:style>
+          <a:lnRef idx="1">
+            <a:schemeClr val="accent1"/>
+          </a:lnRef>
+          <a:fillRef idx="0">
+            <a:schemeClr val="accent1"/>
+          </a:fillRef>
+          <a:effectRef idx="0">
+            <a:schemeClr val="accent1"/>
+          </a:effectRef>
+          <a:fontRef idx="minor">
+            <a:schemeClr val="tx1"/>
+          </a:fontRef>
+        </p:style>
+      </p:cxnSp>
+      <p:cxnSp>
+        <p:nvCxnSpPr>
+          <p:cNvPr id="44" name="Gerader Verbinder 43">
+            <a:extLst>
+              <a:ext uri="{FF2B5EF4-FFF2-40B4-BE49-F238E27FC236}">
+                <a16:creationId xmlns:a16="http://schemas.microsoft.com/office/drawing/2014/main" id="{20D01D81-D756-445F-8139-1BEB07ADBDED}"/>
+              </a:ext>
+            </a:extLst>
+          </p:cNvPr>
+          <p:cNvCxnSpPr>
+            <a:stCxn id="7" idx="3"/>
+            <a:endCxn id="9" idx="1"/>
+          </p:cNvCxnSpPr>
+          <p:nvPr/>
+        </p:nvCxnSpPr>
+        <p:spPr>
+          <a:xfrm>
+            <a:off x="3520096" y="3063449"/>
+            <a:ext cx="150940" cy="0"/>
+          </a:xfrm>
+          <a:prstGeom prst="line">
+            <a:avLst/>
+          </a:prstGeom>
+        </p:spPr>
+        <p:style>
+          <a:lnRef idx="1">
+            <a:schemeClr val="accent1"/>
+          </a:lnRef>
+          <a:fillRef idx="0">
+            <a:schemeClr val="accent1"/>
+          </a:fillRef>
+          <a:effectRef idx="0">
+            <a:schemeClr val="accent1"/>
+          </a:effectRef>
+          <a:fontRef idx="minor">
+            <a:schemeClr val="tx1"/>
+          </a:fontRef>
+        </p:style>
+      </p:cxnSp>
+      <p:cxnSp>
+        <p:nvCxnSpPr>
+          <p:cNvPr id="45" name="Gerader Verbinder 44">
+            <a:extLst>
+              <a:ext uri="{FF2B5EF4-FFF2-40B4-BE49-F238E27FC236}">
+                <a16:creationId xmlns:a16="http://schemas.microsoft.com/office/drawing/2014/main" id="{E68A7D18-0E7F-4423-85B7-11B08FA035F1}"/>
+              </a:ext>
+            </a:extLst>
+          </p:cNvPr>
+          <p:cNvCxnSpPr>
+            <a:cxnSpLocks/>
+            <a:stCxn id="6" idx="3"/>
+            <a:endCxn id="8" idx="1"/>
+          </p:cNvCxnSpPr>
+          <p:nvPr/>
+        </p:nvCxnSpPr>
+        <p:spPr>
+          <a:xfrm>
+            <a:off x="3520097" y="1517521"/>
+            <a:ext cx="154612" cy="0"/>
+          </a:xfrm>
+          <a:prstGeom prst="line">
+            <a:avLst/>
+          </a:prstGeom>
         </p:spPr>
         <p:style>
           <a:lnRef idx="1">

</xml_diff>

<commit_message>
Updates picture/slide (removes link) (fixes #629)
</commit_message>
<xml_diff>
--- a/doc/ElementsApplicationPattern/Names/StructureOfUuids/pictures/uuid-structure.pptx
+++ b/doc/ElementsApplicationPattern/Names/StructureOfUuids/pictures/uuid-structure.pptx
@@ -241,7 +241,7 @@
           <a:p>
             <a:fld id="{C1068C6F-CF2F-4201-9BAA-A88518D20D6F}" type="datetimeFigureOut">
               <a:rPr lang="de-DE" smtClean="0"/>
-              <a:t>07.12.2022</a:t>
+              <a:t>31.03.2023</a:t>
             </a:fld>
             <a:endParaRPr lang="de-DE"/>
           </a:p>
@@ -409,7 +409,7 @@
           <a:p>
             <a:fld id="{C1068C6F-CF2F-4201-9BAA-A88518D20D6F}" type="datetimeFigureOut">
               <a:rPr lang="de-DE" smtClean="0"/>
-              <a:t>07.12.2022</a:t>
+              <a:t>31.03.2023</a:t>
             </a:fld>
             <a:endParaRPr lang="de-DE"/>
           </a:p>
@@ -587,7 +587,7 @@
           <a:p>
             <a:fld id="{C1068C6F-CF2F-4201-9BAA-A88518D20D6F}" type="datetimeFigureOut">
               <a:rPr lang="de-DE" smtClean="0"/>
-              <a:t>07.12.2022</a:t>
+              <a:t>31.03.2023</a:t>
             </a:fld>
             <a:endParaRPr lang="de-DE"/>
           </a:p>
@@ -755,7 +755,7 @@
           <a:p>
             <a:fld id="{C1068C6F-CF2F-4201-9BAA-A88518D20D6F}" type="datetimeFigureOut">
               <a:rPr lang="de-DE" smtClean="0"/>
-              <a:t>07.12.2022</a:t>
+              <a:t>31.03.2023</a:t>
             </a:fld>
             <a:endParaRPr lang="de-DE"/>
           </a:p>
@@ -1000,7 +1000,7 @@
           <a:p>
             <a:fld id="{C1068C6F-CF2F-4201-9BAA-A88518D20D6F}" type="datetimeFigureOut">
               <a:rPr lang="de-DE" smtClean="0"/>
-              <a:t>07.12.2022</a:t>
+              <a:t>31.03.2023</a:t>
             </a:fld>
             <a:endParaRPr lang="de-DE"/>
           </a:p>
@@ -1229,7 +1229,7 @@
           <a:p>
             <a:fld id="{C1068C6F-CF2F-4201-9BAA-A88518D20D6F}" type="datetimeFigureOut">
               <a:rPr lang="de-DE" smtClean="0"/>
-              <a:t>07.12.2022</a:t>
+              <a:t>31.03.2023</a:t>
             </a:fld>
             <a:endParaRPr lang="de-DE"/>
           </a:p>
@@ -1593,7 +1593,7 @@
           <a:p>
             <a:fld id="{C1068C6F-CF2F-4201-9BAA-A88518D20D6F}" type="datetimeFigureOut">
               <a:rPr lang="de-DE" smtClean="0"/>
-              <a:t>07.12.2022</a:t>
+              <a:t>31.03.2023</a:t>
             </a:fld>
             <a:endParaRPr lang="de-DE"/>
           </a:p>
@@ -1710,7 +1710,7 @@
           <a:p>
             <a:fld id="{C1068C6F-CF2F-4201-9BAA-A88518D20D6F}" type="datetimeFigureOut">
               <a:rPr lang="de-DE" smtClean="0"/>
-              <a:t>07.12.2022</a:t>
+              <a:t>31.03.2023</a:t>
             </a:fld>
             <a:endParaRPr lang="de-DE"/>
           </a:p>
@@ -1805,7 +1805,7 @@
           <a:p>
             <a:fld id="{C1068C6F-CF2F-4201-9BAA-A88518D20D6F}" type="datetimeFigureOut">
               <a:rPr lang="de-DE" smtClean="0"/>
-              <a:t>07.12.2022</a:t>
+              <a:t>31.03.2023</a:t>
             </a:fld>
             <a:endParaRPr lang="de-DE"/>
           </a:p>
@@ -2080,7 +2080,7 @@
           <a:p>
             <a:fld id="{C1068C6F-CF2F-4201-9BAA-A88518D20D6F}" type="datetimeFigureOut">
               <a:rPr lang="de-DE" smtClean="0"/>
-              <a:t>07.12.2022</a:t>
+              <a:t>31.03.2023</a:t>
             </a:fld>
             <a:endParaRPr lang="de-DE"/>
           </a:p>
@@ -2332,7 +2332,7 @@
           <a:p>
             <a:fld id="{C1068C6F-CF2F-4201-9BAA-A88518D20D6F}" type="datetimeFigureOut">
               <a:rPr lang="de-DE" smtClean="0"/>
-              <a:t>07.12.2022</a:t>
+              <a:t>31.03.2023</a:t>
             </a:fld>
             <a:endParaRPr lang="de-DE"/>
           </a:p>
@@ -2543,7 +2543,7 @@
           <a:p>
             <a:fld id="{C1068C6F-CF2F-4201-9BAA-A88518D20D6F}" type="datetimeFigureOut">
               <a:rPr lang="de-DE" smtClean="0"/>
-              <a:t>07.12.2022</a:t>
+              <a:t>31.03.2023</a:t>
             </a:fld>
             <a:endParaRPr lang="de-DE"/>
           </a:p>
@@ -3618,7 +3618,7 @@
         <p:spPr>
           <a:xfrm>
             <a:off x="3674709" y="825023"/>
-            <a:ext cx="1227300" cy="1384995"/>
+            <a:ext cx="1227300" cy="1200329"/>
           </a:xfrm>
           <a:prstGeom prst="rect">
             <a:avLst/>
@@ -3708,7 +3708,7 @@
           </a:p>
           <a:p>
             <a:r>
-              <a:rPr lang="de-DE" sz="1200" dirty="0" err="1">
+              <a:rPr lang="de-DE" sz="1200">
                 <a:solidFill>
                   <a:srgbClr val="00B050"/>
                 </a:solidFill>
@@ -3720,16 +3720,6 @@
                 <a:srgbClr val="00B050"/>
               </a:solidFill>
             </a:endParaRPr>
-          </a:p>
-          <a:p>
-            <a:r>
-              <a:rPr lang="de-DE" sz="1200" dirty="0">
-                <a:solidFill>
-                  <a:srgbClr val="00B050"/>
-                </a:solidFill>
-              </a:rPr>
-              <a:t>Link</a:t>
-            </a:r>
           </a:p>
           <a:p>
             <a:endParaRPr lang="de-DE" sz="1200" dirty="0">
@@ -4827,9 +4817,9 @@
           <p:nvPr/>
         </p:nvCxnSpPr>
         <p:spPr>
-          <a:xfrm>
-            <a:off x="3520097" y="1517521"/>
-            <a:ext cx="154612" cy="0"/>
+          <a:xfrm flipV="1">
+            <a:off x="3520097" y="1425188"/>
+            <a:ext cx="154612" cy="92333"/>
           </a:xfrm>
           <a:prstGeom prst="line">
             <a:avLst/>

</xml_diff>

<commit_message>
Update documentation of uuids Fixes #911
</commit_message>
<xml_diff>
--- a/doc/ElementsApplicationPattern/Names/StructureOfUuids/pictures/uuid-structure.pptx
+++ b/doc/ElementsApplicationPattern/Names/StructureOfUuids/pictures/uuid-structure.pptx
@@ -6,6 +6,7 @@
   </p:sldMasterIdLst>
   <p:sldIdLst>
     <p:sldId id="256" r:id="rId2"/>
+    <p:sldId id="257" r:id="rId3"/>
   </p:sldIdLst>
   <p:sldSz cx="12192000" cy="6858000"/>
   <p:notesSz cx="6858000" cy="9144000"/>
@@ -241,7 +242,7 @@
           <a:p>
             <a:fld id="{C1068C6F-CF2F-4201-9BAA-A88518D20D6F}" type="datetimeFigureOut">
               <a:rPr lang="de-DE" smtClean="0"/>
-              <a:t>31.03.2023</a:t>
+              <a:t>13.05.2024</a:t>
             </a:fld>
             <a:endParaRPr lang="de-DE"/>
           </a:p>
@@ -409,7 +410,7 @@
           <a:p>
             <a:fld id="{C1068C6F-CF2F-4201-9BAA-A88518D20D6F}" type="datetimeFigureOut">
               <a:rPr lang="de-DE" smtClean="0"/>
-              <a:t>31.03.2023</a:t>
+              <a:t>13.05.2024</a:t>
             </a:fld>
             <a:endParaRPr lang="de-DE"/>
           </a:p>
@@ -587,7 +588,7 @@
           <a:p>
             <a:fld id="{C1068C6F-CF2F-4201-9BAA-A88518D20D6F}" type="datetimeFigureOut">
               <a:rPr lang="de-DE" smtClean="0"/>
-              <a:t>31.03.2023</a:t>
+              <a:t>13.05.2024</a:t>
             </a:fld>
             <a:endParaRPr lang="de-DE"/>
           </a:p>
@@ -755,7 +756,7 @@
           <a:p>
             <a:fld id="{C1068C6F-CF2F-4201-9BAA-A88518D20D6F}" type="datetimeFigureOut">
               <a:rPr lang="de-DE" smtClean="0"/>
-              <a:t>31.03.2023</a:t>
+              <a:t>13.05.2024</a:t>
             </a:fld>
             <a:endParaRPr lang="de-DE"/>
           </a:p>
@@ -1000,7 +1001,7 @@
           <a:p>
             <a:fld id="{C1068C6F-CF2F-4201-9BAA-A88518D20D6F}" type="datetimeFigureOut">
               <a:rPr lang="de-DE" smtClean="0"/>
-              <a:t>31.03.2023</a:t>
+              <a:t>13.05.2024</a:t>
             </a:fld>
             <a:endParaRPr lang="de-DE"/>
           </a:p>
@@ -1229,7 +1230,7 @@
           <a:p>
             <a:fld id="{C1068C6F-CF2F-4201-9BAA-A88518D20D6F}" type="datetimeFigureOut">
               <a:rPr lang="de-DE" smtClean="0"/>
-              <a:t>31.03.2023</a:t>
+              <a:t>13.05.2024</a:t>
             </a:fld>
             <a:endParaRPr lang="de-DE"/>
           </a:p>
@@ -1593,7 +1594,7 @@
           <a:p>
             <a:fld id="{C1068C6F-CF2F-4201-9BAA-A88518D20D6F}" type="datetimeFigureOut">
               <a:rPr lang="de-DE" smtClean="0"/>
-              <a:t>31.03.2023</a:t>
+              <a:t>13.05.2024</a:t>
             </a:fld>
             <a:endParaRPr lang="de-DE"/>
           </a:p>
@@ -1710,7 +1711,7 @@
           <a:p>
             <a:fld id="{C1068C6F-CF2F-4201-9BAA-A88518D20D6F}" type="datetimeFigureOut">
               <a:rPr lang="de-DE" smtClean="0"/>
-              <a:t>31.03.2023</a:t>
+              <a:t>13.05.2024</a:t>
             </a:fld>
             <a:endParaRPr lang="de-DE"/>
           </a:p>
@@ -1805,7 +1806,7 @@
           <a:p>
             <a:fld id="{C1068C6F-CF2F-4201-9BAA-A88518D20D6F}" type="datetimeFigureOut">
               <a:rPr lang="de-DE" smtClean="0"/>
-              <a:t>31.03.2023</a:t>
+              <a:t>13.05.2024</a:t>
             </a:fld>
             <a:endParaRPr lang="de-DE"/>
           </a:p>
@@ -2080,7 +2081,7 @@
           <a:p>
             <a:fld id="{C1068C6F-CF2F-4201-9BAA-A88518D20D6F}" type="datetimeFigureOut">
               <a:rPr lang="de-DE" smtClean="0"/>
-              <a:t>31.03.2023</a:t>
+              <a:t>13.05.2024</a:t>
             </a:fld>
             <a:endParaRPr lang="de-DE"/>
           </a:p>
@@ -2332,7 +2333,7 @@
           <a:p>
             <a:fld id="{C1068C6F-CF2F-4201-9BAA-A88518D20D6F}" type="datetimeFigureOut">
               <a:rPr lang="de-DE" smtClean="0"/>
-              <a:t>31.03.2023</a:t>
+              <a:t>13.05.2024</a:t>
             </a:fld>
             <a:endParaRPr lang="de-DE"/>
           </a:p>
@@ -2543,7 +2544,7 @@
           <a:p>
             <a:fld id="{C1068C6F-CF2F-4201-9BAA-A88518D20D6F}" type="datetimeFigureOut">
               <a:rPr lang="de-DE" smtClean="0"/>
-              <a:t>31.03.2023</a:t>
+              <a:t>13.05.2024</a:t>
             </a:fld>
             <a:endParaRPr lang="de-DE"/>
           </a:p>
@@ -4853,6 +4854,2371 @@
 </p:sld>
 </file>
 
+<file path=ppt/slides/slide2.xml><?xml version="1.0" encoding="utf-8"?>
+<p:sld xmlns:a="http://schemas.openxmlformats.org/drawingml/2006/main" xmlns:r="http://schemas.openxmlformats.org/officeDocument/2006/relationships" xmlns:p="http://schemas.openxmlformats.org/presentationml/2006/main">
+  <p:cSld>
+    <p:spTree>
+      <p:nvGrpSpPr>
+        <p:cNvPr id="1" name=""/>
+        <p:cNvGrpSpPr/>
+        <p:nvPr/>
+      </p:nvGrpSpPr>
+      <p:grpSpPr>
+        <a:xfrm>
+          <a:off x="0" y="0"/>
+          <a:ext cx="0" cy="0"/>
+          <a:chOff x="0" y="0"/>
+          <a:chExt cx="0" cy="0"/>
+        </a:xfrm>
+      </p:grpSpPr>
+      <p:sp>
+        <p:nvSpPr>
+          <p:cNvPr id="2" name="Rechteck 1">
+            <a:extLst>
+              <a:ext uri="{FF2B5EF4-FFF2-40B4-BE49-F238E27FC236}">
+                <a16:creationId xmlns:a16="http://schemas.microsoft.com/office/drawing/2014/main" id="{26CB59BB-C41A-57BC-9EA8-38C475084D5F}"/>
+              </a:ext>
+            </a:extLst>
+          </p:cNvPr>
+          <p:cNvSpPr/>
+          <p:nvPr/>
+        </p:nvSpPr>
+        <p:spPr>
+          <a:xfrm>
+            <a:off x="100900" y="385944"/>
+            <a:ext cx="10992550" cy="3989205"/>
+          </a:xfrm>
+          <a:prstGeom prst="rect">
+            <a:avLst/>
+          </a:prstGeom>
+          <a:solidFill>
+            <a:schemeClr val="accent5">
+              <a:lumMod val="20000"/>
+              <a:lumOff val="80000"/>
+            </a:schemeClr>
+          </a:solidFill>
+          <a:ln w="6350"/>
+        </p:spPr>
+        <p:style>
+          <a:lnRef idx="2">
+            <a:schemeClr val="accent1">
+              <a:shade val="15000"/>
+            </a:schemeClr>
+          </a:lnRef>
+          <a:fillRef idx="1">
+            <a:schemeClr val="accent1"/>
+          </a:fillRef>
+          <a:effectRef idx="0">
+            <a:schemeClr val="accent1"/>
+          </a:effectRef>
+          <a:fontRef idx="minor">
+            <a:schemeClr val="lt1"/>
+          </a:fontRef>
+        </p:style>
+        <p:txBody>
+          <a:bodyPr rtlCol="0" anchor="ctr"/>
+          <a:lstStyle/>
+          <a:p>
+            <a:pPr algn="ctr"/>
+            <a:endParaRPr lang="de-DE"/>
+          </a:p>
+        </p:txBody>
+      </p:sp>
+      <p:sp>
+        <p:nvSpPr>
+          <p:cNvPr id="4" name="Rechteck 3"/>
+          <p:cNvSpPr/>
+          <p:nvPr/>
+        </p:nvSpPr>
+        <p:spPr>
+          <a:xfrm>
+            <a:off x="100900" y="436207"/>
+            <a:ext cx="11048684" cy="338554"/>
+          </a:xfrm>
+          <a:prstGeom prst="rect">
+            <a:avLst/>
+          </a:prstGeom>
+        </p:spPr>
+        <p:txBody>
+          <a:bodyPr wrap="square">
+            <a:spAutoFit/>
+          </a:bodyPr>
+          <a:lstStyle/>
+          <a:p>
+            <a:r>
+              <a:rPr lang="en-US" sz="1600" b="0" i="0" dirty="0">
+                <a:effectLst/>
+                <a:latin typeface="Consolas" panose="020B0609020204030204" pitchFamily="49" charset="0"/>
+                <a:cs typeface="Consolas" panose="020B0609020204030204" pitchFamily="49" charset="0"/>
+              </a:rPr>
+              <a:t>[</a:t>
+            </a:r>
+            <a:r>
+              <a:rPr lang="en-US" sz="1600" b="0" i="0" dirty="0" err="1">
+                <a:effectLst/>
+                <a:latin typeface="Consolas" panose="020B0609020204030204" pitchFamily="49" charset="0"/>
+                <a:cs typeface="Consolas" panose="020B0609020204030204" pitchFamily="49" charset="0"/>
+              </a:rPr>
+              <a:t>OwnApplicationID</a:t>
+            </a:r>
+            <a:r>
+              <a:rPr lang="en-US" sz="1600" b="0" i="0" dirty="0">
+                <a:effectLst/>
+                <a:latin typeface="Consolas" panose="020B0609020204030204" pitchFamily="49" charset="0"/>
+                <a:cs typeface="Consolas" panose="020B0609020204030204" pitchFamily="49" charset="0"/>
+              </a:rPr>
+              <a:t>]-</a:t>
+            </a:r>
+            <a:r>
+              <a:rPr lang="en-US" sz="1600" b="0" i="0" dirty="0">
+                <a:solidFill>
+                  <a:srgbClr val="0070C0"/>
+                </a:solidFill>
+                <a:effectLst/>
+                <a:latin typeface="Consolas" panose="020B0609020204030204" pitchFamily="49" charset="0"/>
+                <a:cs typeface="Consolas" panose="020B0609020204030204" pitchFamily="49" charset="0"/>
+              </a:rPr>
+              <a:t>[</a:t>
+            </a:r>
+            <a:r>
+              <a:rPr lang="en-US" sz="1600" b="0" i="0" dirty="0" err="1">
+                <a:solidFill>
+                  <a:srgbClr val="0070C0"/>
+                </a:solidFill>
+                <a:effectLst/>
+                <a:latin typeface="Consolas" panose="020B0609020204030204" pitchFamily="49" charset="0"/>
+                <a:cs typeface="Consolas" panose="020B0609020204030204" pitchFamily="49" charset="0"/>
+              </a:rPr>
+              <a:t>LayerID</a:t>
+            </a:r>
+            <a:r>
+              <a:rPr lang="en-US" sz="1600" b="0" i="0" dirty="0">
+                <a:solidFill>
+                  <a:srgbClr val="0070C0"/>
+                </a:solidFill>
+                <a:effectLst/>
+                <a:latin typeface="Consolas" panose="020B0609020204030204" pitchFamily="49" charset="0"/>
+                <a:cs typeface="Consolas" panose="020B0609020204030204" pitchFamily="49" charset="0"/>
+              </a:rPr>
+              <a:t>] </a:t>
+            </a:r>
+            <a:r>
+              <a:rPr lang="en-US" sz="1600" b="0" i="0" dirty="0">
+                <a:effectLst/>
+                <a:latin typeface="Consolas" panose="020B0609020204030204" pitchFamily="49" charset="0"/>
+                <a:cs typeface="Consolas" panose="020B0609020204030204" pitchFamily="49" charset="0"/>
+              </a:rPr>
+              <a:t>- </a:t>
+            </a:r>
+            <a:r>
+              <a:rPr lang="en-US" sz="1600" b="0" i="0" dirty="0">
+                <a:solidFill>
+                  <a:srgbClr val="00B050"/>
+                </a:solidFill>
+                <a:effectLst/>
+                <a:latin typeface="Consolas" panose="020B0609020204030204" pitchFamily="49" charset="0"/>
+                <a:cs typeface="Consolas" panose="020B0609020204030204" pitchFamily="49" charset="0"/>
+              </a:rPr>
+              <a:t>[</a:t>
+            </a:r>
+            <a:r>
+              <a:rPr lang="en-US" sz="1600" b="0" i="0" dirty="0" err="1">
+                <a:solidFill>
+                  <a:srgbClr val="00B050"/>
+                </a:solidFill>
+                <a:effectLst/>
+                <a:latin typeface="Consolas" panose="020B0609020204030204" pitchFamily="49" charset="0"/>
+                <a:cs typeface="Consolas" panose="020B0609020204030204" pitchFamily="49" charset="0"/>
+              </a:rPr>
+              <a:t>ObjectType</a:t>
+            </a:r>
+            <a:r>
+              <a:rPr lang="en-US" sz="1600" b="0" i="0" dirty="0">
+                <a:solidFill>
+                  <a:srgbClr val="00B050"/>
+                </a:solidFill>
+                <a:effectLst/>
+                <a:latin typeface="Consolas" panose="020B0609020204030204" pitchFamily="49" charset="0"/>
+                <a:cs typeface="Consolas" panose="020B0609020204030204" pitchFamily="49" charset="0"/>
+              </a:rPr>
+              <a:t>]</a:t>
+            </a:r>
+            <a:r>
+              <a:rPr lang="en-US" sz="1600" b="0" i="0" dirty="0">
+                <a:effectLst/>
+                <a:latin typeface="Consolas" panose="020B0609020204030204" pitchFamily="49" charset="0"/>
+                <a:cs typeface="Consolas" panose="020B0609020204030204" pitchFamily="49" charset="0"/>
+              </a:rPr>
+              <a:t>-</a:t>
+            </a:r>
+            <a:r>
+              <a:rPr lang="en-US" sz="1600" b="0" i="0" dirty="0">
+                <a:solidFill>
+                  <a:srgbClr val="C00000"/>
+                </a:solidFill>
+                <a:effectLst/>
+                <a:latin typeface="Consolas" panose="020B0609020204030204" pitchFamily="49" charset="0"/>
+                <a:cs typeface="Consolas" panose="020B0609020204030204" pitchFamily="49" charset="0"/>
+              </a:rPr>
+              <a:t>[</a:t>
+            </a:r>
+            <a:r>
+              <a:rPr lang="en-US" sz="1600" b="0" i="0" dirty="0" err="1">
+                <a:solidFill>
+                  <a:srgbClr val="C00000"/>
+                </a:solidFill>
+                <a:effectLst/>
+                <a:latin typeface="Consolas" panose="020B0609020204030204" pitchFamily="49" charset="0"/>
+                <a:cs typeface="Consolas" panose="020B0609020204030204" pitchFamily="49" charset="0"/>
+              </a:rPr>
+              <a:t>ApiSegment</a:t>
+            </a:r>
+            <a:r>
+              <a:rPr lang="en-US" sz="1600" b="0" i="0" dirty="0">
+                <a:solidFill>
+                  <a:srgbClr val="C00000"/>
+                </a:solidFill>
+                <a:effectLst/>
+                <a:latin typeface="Consolas" panose="020B0609020204030204" pitchFamily="49" charset="0"/>
+                <a:cs typeface="Consolas" panose="020B0609020204030204" pitchFamily="49" charset="0"/>
+              </a:rPr>
+              <a:t>]</a:t>
+            </a:r>
+            <a:r>
+              <a:rPr lang="en-US" sz="1600" b="0" i="0" dirty="0">
+                <a:effectLst/>
+                <a:latin typeface="Consolas" panose="020B0609020204030204" pitchFamily="49" charset="0"/>
+                <a:cs typeface="Consolas" panose="020B0609020204030204" pitchFamily="49" charset="0"/>
+              </a:rPr>
+              <a:t>-</a:t>
+            </a:r>
+            <a:r>
+              <a:rPr lang="en-US" sz="1600" b="0" i="0" dirty="0">
+                <a:solidFill>
+                  <a:schemeClr val="accent2">
+                    <a:lumMod val="75000"/>
+                  </a:schemeClr>
+                </a:solidFill>
+                <a:effectLst/>
+                <a:latin typeface="Consolas" panose="020B0609020204030204" pitchFamily="49" charset="0"/>
+                <a:cs typeface="Consolas" panose="020B0609020204030204" pitchFamily="49" charset="0"/>
+              </a:rPr>
+              <a:t>[</a:t>
+            </a:r>
+            <a:r>
+              <a:rPr lang="en-US" sz="1600" b="0" i="0" dirty="0" err="1">
+                <a:solidFill>
+                  <a:schemeClr val="accent2">
+                    <a:lumMod val="75000"/>
+                  </a:schemeClr>
+                </a:solidFill>
+                <a:effectLst/>
+                <a:latin typeface="Consolas" panose="020B0609020204030204" pitchFamily="49" charset="0"/>
+                <a:cs typeface="Consolas" panose="020B0609020204030204" pitchFamily="49" charset="0"/>
+              </a:rPr>
+              <a:t>TargetApplicationID</a:t>
+            </a:r>
+            <a:r>
+              <a:rPr lang="en-US" sz="1600" b="0" i="0" dirty="0">
+                <a:solidFill>
+                  <a:schemeClr val="accent2">
+                    <a:lumMod val="75000"/>
+                  </a:schemeClr>
+                </a:solidFill>
+                <a:effectLst/>
+                <a:latin typeface="Consolas" panose="020B0609020204030204" pitchFamily="49" charset="0"/>
+                <a:cs typeface="Consolas" panose="020B0609020204030204" pitchFamily="49" charset="0"/>
+              </a:rPr>
+              <a:t>]</a:t>
+            </a:r>
+            <a:r>
+              <a:rPr lang="en-US" sz="1600" b="0" i="0" dirty="0">
+                <a:effectLst/>
+                <a:latin typeface="Consolas" panose="020B0609020204030204" pitchFamily="49" charset="0"/>
+                <a:cs typeface="Consolas" panose="020B0609020204030204" pitchFamily="49" charset="0"/>
+              </a:rPr>
+              <a:t>-</a:t>
+            </a:r>
+            <a:r>
+              <a:rPr lang="en-US" sz="1600" b="0" i="0" dirty="0">
+                <a:solidFill>
+                  <a:srgbClr val="7030A0"/>
+                </a:solidFill>
+                <a:effectLst/>
+                <a:latin typeface="Consolas" panose="020B0609020204030204" pitchFamily="49" charset="0"/>
+                <a:cs typeface="Consolas" panose="020B0609020204030204" pitchFamily="49" charset="0"/>
+              </a:rPr>
+              <a:t>[</a:t>
+            </a:r>
+            <a:r>
+              <a:rPr lang="en-US" sz="1600" b="0" i="0" dirty="0" err="1">
+                <a:solidFill>
+                  <a:srgbClr val="7030A0"/>
+                </a:solidFill>
+                <a:effectLst/>
+                <a:latin typeface="Consolas" panose="020B0609020204030204" pitchFamily="49" charset="0"/>
+                <a:cs typeface="Consolas" panose="020B0609020204030204" pitchFamily="49" charset="0"/>
+              </a:rPr>
+              <a:t>SequenceNumber</a:t>
+            </a:r>
+            <a:r>
+              <a:rPr lang="en-US" sz="1600" b="0" i="0" dirty="0">
+                <a:solidFill>
+                  <a:srgbClr val="7030A0"/>
+                </a:solidFill>
+                <a:effectLst/>
+                <a:latin typeface="Consolas" panose="020B0609020204030204" pitchFamily="49" charset="0"/>
+                <a:cs typeface="Consolas" panose="020B0609020204030204" pitchFamily="49" charset="0"/>
+              </a:rPr>
+              <a:t>]</a:t>
+            </a:r>
+            <a:endParaRPr lang="de-DE" sz="1600" dirty="0">
+              <a:solidFill>
+                <a:srgbClr val="7030A0"/>
+              </a:solidFill>
+              <a:latin typeface="Consolas" panose="020B0609020204030204" pitchFamily="49" charset="0"/>
+              <a:cs typeface="Consolas" panose="020B0609020204030204" pitchFamily="49" charset="0"/>
+            </a:endParaRPr>
+          </a:p>
+        </p:txBody>
+      </p:sp>
+      <p:sp>
+        <p:nvSpPr>
+          <p:cNvPr id="5" name="Textfeld 4"/>
+          <p:cNvSpPr txBox="1"/>
+          <p:nvPr/>
+        </p:nvSpPr>
+        <p:spPr>
+          <a:xfrm>
+            <a:off x="228686" y="836909"/>
+            <a:ext cx="1888464" cy="1015663"/>
+          </a:xfrm>
+          <a:prstGeom prst="rect">
+            <a:avLst/>
+          </a:prstGeom>
+          <a:solidFill>
+            <a:schemeClr val="bg1"/>
+          </a:solidFill>
+          <a:ln>
+            <a:solidFill>
+              <a:schemeClr val="tx1"/>
+            </a:solidFill>
+          </a:ln>
+        </p:spPr>
+        <p:txBody>
+          <a:bodyPr wrap="square" rtlCol="0">
+            <a:spAutoFit/>
+          </a:bodyPr>
+          <a:lstStyle/>
+          <a:p>
+            <a:r>
+              <a:rPr lang="de-DE" sz="1200" i="1"/>
+              <a:t>Official abbreviation of app name &amp; official release number</a:t>
+            </a:r>
+          </a:p>
+          <a:p>
+            <a:endParaRPr lang="de-DE" sz="1200" i="1"/>
+          </a:p>
+          <a:p>
+            <a:r>
+              <a:rPr lang="de-DE" sz="1200" i="1"/>
+              <a:t>e.g. </a:t>
+            </a:r>
+            <a:r>
+              <a:rPr lang="de-DE" sz="1200"/>
+              <a:t>tar-1-0-1</a:t>
+            </a:r>
+          </a:p>
+        </p:txBody>
+      </p:sp>
+      <p:sp>
+        <p:nvSpPr>
+          <p:cNvPr id="6" name="Textfeld 5"/>
+          <p:cNvSpPr txBox="1"/>
+          <p:nvPr/>
+        </p:nvSpPr>
+        <p:spPr>
+          <a:xfrm>
+            <a:off x="2218945" y="825023"/>
+            <a:ext cx="1301152" cy="1384995"/>
+          </a:xfrm>
+          <a:prstGeom prst="rect">
+            <a:avLst/>
+          </a:prstGeom>
+          <a:solidFill>
+            <a:srgbClr val="FCEEE4"/>
+          </a:solidFill>
+          <a:ln>
+            <a:solidFill>
+              <a:srgbClr val="0070C0"/>
+            </a:solidFill>
+          </a:ln>
+        </p:spPr>
+        <p:txBody>
+          <a:bodyPr wrap="square" rtlCol="0">
+            <a:spAutoFit/>
+          </a:bodyPr>
+          <a:lstStyle/>
+          <a:p>
+            <a:r>
+              <a:rPr lang="de-DE" sz="1200" dirty="0" err="1">
+                <a:solidFill>
+                  <a:srgbClr val="0070C0"/>
+                </a:solidFill>
+              </a:rPr>
+              <a:t>op</a:t>
+            </a:r>
+            <a:r>
+              <a:rPr lang="de-DE" sz="1200" dirty="0" err="1">
+                <a:solidFill>
+                  <a:schemeClr val="bg1">
+                    <a:lumMod val="75000"/>
+                  </a:schemeClr>
+                </a:solidFill>
+              </a:rPr>
+              <a:t>eration</a:t>
+            </a:r>
+            <a:endParaRPr lang="de-DE" sz="1200" dirty="0">
+              <a:solidFill>
+                <a:schemeClr val="bg1">
+                  <a:lumMod val="75000"/>
+                </a:schemeClr>
+              </a:solidFill>
+            </a:endParaRPr>
+          </a:p>
+          <a:p>
+            <a:r>
+              <a:rPr lang="de-DE" sz="1200" dirty="0">
+                <a:solidFill>
+                  <a:srgbClr val="0070C0"/>
+                </a:solidFill>
+              </a:rPr>
+              <a:t>http</a:t>
+            </a:r>
+          </a:p>
+          <a:p>
+            <a:r>
+              <a:rPr lang="de-DE" sz="1200" dirty="0" err="1">
+                <a:solidFill>
+                  <a:srgbClr val="0070C0"/>
+                </a:solidFill>
+              </a:rPr>
+              <a:t>tcp</a:t>
+            </a:r>
+            <a:endParaRPr lang="de-DE" sz="1200" dirty="0">
+              <a:solidFill>
+                <a:srgbClr val="0070C0"/>
+              </a:solidFill>
+            </a:endParaRPr>
+          </a:p>
+          <a:p>
+            <a:r>
+              <a:rPr lang="de-DE" sz="1200" dirty="0" err="1">
+                <a:solidFill>
+                  <a:srgbClr val="0070C0"/>
+                </a:solidFill>
+              </a:rPr>
+              <a:t>meth</a:t>
+            </a:r>
+            <a:r>
+              <a:rPr lang="de-DE" sz="1200" dirty="0" err="1">
+                <a:solidFill>
+                  <a:schemeClr val="bg1">
+                    <a:lumMod val="75000"/>
+                  </a:schemeClr>
+                </a:solidFill>
+              </a:rPr>
+              <a:t>od</a:t>
+            </a:r>
+            <a:endParaRPr lang="de-DE" sz="1200" dirty="0">
+              <a:solidFill>
+                <a:schemeClr val="bg1">
+                  <a:lumMod val="75000"/>
+                </a:schemeClr>
+              </a:solidFill>
+            </a:endParaRPr>
+          </a:p>
+          <a:p>
+            <a:r>
+              <a:rPr lang="de-DE" sz="1200" dirty="0" err="1">
+                <a:solidFill>
+                  <a:srgbClr val="0070C0"/>
+                </a:solidFill>
+              </a:rPr>
+              <a:t>prot</a:t>
+            </a:r>
+            <a:r>
+              <a:rPr lang="de-DE" sz="1200" dirty="0" err="1">
+                <a:solidFill>
+                  <a:schemeClr val="bg1">
+                    <a:lumMod val="75000"/>
+                  </a:schemeClr>
+                </a:solidFill>
+              </a:rPr>
+              <a:t>ocol</a:t>
+            </a:r>
+            <a:endParaRPr lang="de-DE" sz="1200" dirty="0">
+              <a:solidFill>
+                <a:schemeClr val="bg1">
+                  <a:lumMod val="75000"/>
+                </a:schemeClr>
+              </a:solidFill>
+            </a:endParaRPr>
+          </a:p>
+          <a:p>
+            <a:r>
+              <a:rPr lang="de-DE" sz="1200" dirty="0" err="1">
+                <a:solidFill>
+                  <a:srgbClr val="0070C0"/>
+                </a:solidFill>
+              </a:rPr>
+              <a:t>e</a:t>
+            </a:r>
+            <a:r>
+              <a:rPr lang="de-DE" sz="1200" dirty="0" err="1">
+                <a:solidFill>
+                  <a:schemeClr val="bg1">
+                    <a:lumMod val="75000"/>
+                  </a:schemeClr>
+                </a:solidFill>
+              </a:rPr>
+              <a:t>lastic</a:t>
+            </a:r>
+            <a:r>
+              <a:rPr lang="de-DE" sz="1200" dirty="0" err="1">
+                <a:solidFill>
+                  <a:srgbClr val="0070C0"/>
+                </a:solidFill>
+              </a:rPr>
+              <a:t>s</a:t>
+            </a:r>
+            <a:r>
+              <a:rPr lang="de-DE" sz="1200" dirty="0" err="1">
+                <a:solidFill>
+                  <a:schemeClr val="bg1">
+                    <a:lumMod val="75000"/>
+                  </a:schemeClr>
+                </a:solidFill>
+              </a:rPr>
+              <a:t>earch</a:t>
+            </a:r>
+            <a:endParaRPr lang="de-DE" sz="1200" dirty="0">
+              <a:solidFill>
+                <a:schemeClr val="bg1">
+                  <a:lumMod val="75000"/>
+                </a:schemeClr>
+              </a:solidFill>
+            </a:endParaRPr>
+          </a:p>
+          <a:p>
+            <a:endParaRPr lang="de-DE" sz="1200" dirty="0">
+              <a:solidFill>
+                <a:schemeClr val="bg1">
+                  <a:lumMod val="75000"/>
+                </a:schemeClr>
+              </a:solidFill>
+            </a:endParaRPr>
+          </a:p>
+        </p:txBody>
+      </p:sp>
+      <p:sp>
+        <p:nvSpPr>
+          <p:cNvPr id="7" name="Textfeld 6"/>
+          <p:cNvSpPr txBox="1"/>
+          <p:nvPr/>
+        </p:nvSpPr>
+        <p:spPr>
+          <a:xfrm>
+            <a:off x="2218944" y="2186286"/>
+            <a:ext cx="1301152" cy="1754326"/>
+          </a:xfrm>
+          <a:prstGeom prst="rect">
+            <a:avLst/>
+          </a:prstGeom>
+          <a:solidFill>
+            <a:srgbClr val="FFFAEB"/>
+          </a:solidFill>
+          <a:ln>
+            <a:solidFill>
+              <a:srgbClr val="0070C0"/>
+            </a:solidFill>
+          </a:ln>
+        </p:spPr>
+        <p:txBody>
+          <a:bodyPr wrap="square" rtlCol="0">
+            <a:spAutoFit/>
+          </a:bodyPr>
+          <a:lstStyle/>
+          <a:p>
+            <a:r>
+              <a:rPr lang="de-DE" sz="1200" dirty="0" err="1">
+                <a:solidFill>
+                  <a:srgbClr val="0070C0"/>
+                </a:solidFill>
+              </a:rPr>
+              <a:t>action</a:t>
+            </a:r>
+            <a:endParaRPr lang="de-DE" sz="1200" dirty="0">
+              <a:solidFill>
+                <a:srgbClr val="0070C0"/>
+              </a:solidFill>
+            </a:endParaRPr>
+          </a:p>
+          <a:p>
+            <a:r>
+              <a:rPr lang="de-DE" sz="1200" dirty="0" err="1">
+                <a:solidFill>
+                  <a:schemeClr val="bg1">
+                    <a:lumMod val="75000"/>
+                  </a:schemeClr>
+                </a:solidFill>
+              </a:rPr>
+              <a:t>generic</a:t>
+            </a:r>
+            <a:r>
+              <a:rPr lang="de-DE" sz="1200" dirty="0" err="1">
+                <a:solidFill>
+                  <a:srgbClr val="0070C0"/>
+                </a:solidFill>
+              </a:rPr>
+              <a:t>response</a:t>
+            </a:r>
+            <a:endParaRPr lang="de-DE" sz="1200" dirty="0">
+              <a:solidFill>
+                <a:srgbClr val="0070C0"/>
+              </a:solidFill>
+            </a:endParaRPr>
+          </a:p>
+          <a:p>
+            <a:r>
+              <a:rPr lang="de-DE" sz="1200" dirty="0" err="1">
+                <a:solidFill>
+                  <a:srgbClr val="0070C0"/>
+                </a:solidFill>
+              </a:rPr>
+              <a:t>file</a:t>
+            </a:r>
+            <a:endParaRPr lang="de-DE" sz="1200" dirty="0">
+              <a:solidFill>
+                <a:srgbClr val="0070C0"/>
+              </a:solidFill>
+            </a:endParaRPr>
+          </a:p>
+          <a:p>
+            <a:r>
+              <a:rPr lang="de-DE" sz="1200" dirty="0">
+                <a:solidFill>
+                  <a:srgbClr val="0070C0"/>
+                </a:solidFill>
+              </a:rPr>
+              <a:t>integer</a:t>
+            </a:r>
+          </a:p>
+          <a:p>
+            <a:r>
+              <a:rPr lang="de-DE" sz="1200" dirty="0" err="1">
+                <a:solidFill>
+                  <a:srgbClr val="0070C0"/>
+                </a:solidFill>
+              </a:rPr>
+              <a:t>string</a:t>
+            </a:r>
+            <a:endParaRPr lang="de-DE" sz="1200" dirty="0">
+              <a:solidFill>
+                <a:srgbClr val="0070C0"/>
+              </a:solidFill>
+            </a:endParaRPr>
+          </a:p>
+          <a:p>
+            <a:endParaRPr lang="de-DE" sz="1200" dirty="0">
+              <a:solidFill>
+                <a:srgbClr val="0070C0"/>
+              </a:solidFill>
+            </a:endParaRPr>
+          </a:p>
+          <a:p>
+            <a:endParaRPr lang="de-DE" sz="1200" dirty="0">
+              <a:solidFill>
+                <a:srgbClr val="0070C0"/>
+              </a:solidFill>
+            </a:endParaRPr>
+          </a:p>
+          <a:p>
+            <a:r>
+              <a:rPr lang="de-DE" sz="1200" dirty="0">
+                <a:solidFill>
+                  <a:srgbClr val="0070C0"/>
+                </a:solidFill>
+              </a:rPr>
+              <a:t>&lt;own </a:t>
+            </a:r>
+            <a:r>
+              <a:rPr lang="de-DE" sz="1200" dirty="0" err="1">
+                <a:solidFill>
+                  <a:srgbClr val="0070C0"/>
+                </a:solidFill>
+              </a:rPr>
+              <a:t>profile</a:t>
+            </a:r>
+            <a:r>
+              <a:rPr lang="de-DE" sz="1200" dirty="0">
+                <a:solidFill>
+                  <a:srgbClr val="0070C0"/>
+                </a:solidFill>
+              </a:rPr>
+              <a:t> </a:t>
+            </a:r>
+            <a:r>
+              <a:rPr lang="de-DE" sz="1200" dirty="0" err="1">
+                <a:solidFill>
+                  <a:srgbClr val="0070C0"/>
+                </a:solidFill>
+              </a:rPr>
+              <a:t>types</a:t>
+            </a:r>
+            <a:r>
+              <a:rPr lang="de-DE" sz="1200" dirty="0">
+                <a:solidFill>
+                  <a:srgbClr val="0070C0"/>
+                </a:solidFill>
+              </a:rPr>
+              <a:t>&gt;</a:t>
+            </a:r>
+          </a:p>
+        </p:txBody>
+      </p:sp>
+      <p:sp>
+        <p:nvSpPr>
+          <p:cNvPr id="8" name="Textfeld 7"/>
+          <p:cNvSpPr txBox="1"/>
+          <p:nvPr/>
+        </p:nvSpPr>
+        <p:spPr>
+          <a:xfrm>
+            <a:off x="3674709" y="825023"/>
+            <a:ext cx="1227300" cy="1200329"/>
+          </a:xfrm>
+          <a:prstGeom prst="rect">
+            <a:avLst/>
+          </a:prstGeom>
+          <a:solidFill>
+            <a:srgbClr val="FCEEE4"/>
+          </a:solidFill>
+          <a:ln>
+            <a:solidFill>
+              <a:srgbClr val="00B050"/>
+            </a:solidFill>
+          </a:ln>
+        </p:spPr>
+        <p:txBody>
+          <a:bodyPr wrap="square" rtlCol="0">
+            <a:spAutoFit/>
+          </a:bodyPr>
+          <a:lstStyle/>
+          <a:p>
+            <a:r>
+              <a:rPr lang="de-DE" sz="1200" dirty="0" err="1">
+                <a:solidFill>
+                  <a:srgbClr val="00B050"/>
+                </a:solidFill>
+              </a:rPr>
+              <a:t>c</a:t>
+            </a:r>
+            <a:r>
+              <a:rPr lang="de-DE" sz="1200" dirty="0" err="1">
+                <a:solidFill>
+                  <a:schemeClr val="bg1">
+                    <a:lumMod val="75000"/>
+                  </a:schemeClr>
+                </a:solidFill>
+              </a:rPr>
+              <a:t>lient</a:t>
+            </a:r>
+            <a:endParaRPr lang="de-DE" sz="1200" dirty="0">
+              <a:solidFill>
+                <a:schemeClr val="bg1">
+                  <a:lumMod val="75000"/>
+                </a:schemeClr>
+              </a:solidFill>
+            </a:endParaRPr>
+          </a:p>
+          <a:p>
+            <a:r>
+              <a:rPr lang="de-DE" sz="1200" dirty="0" err="1">
+                <a:solidFill>
+                  <a:srgbClr val="00B050"/>
+                </a:solidFill>
+              </a:rPr>
+              <a:t>s</a:t>
+            </a:r>
+            <a:r>
+              <a:rPr lang="de-DE" sz="1200" dirty="0" err="1">
+                <a:solidFill>
+                  <a:schemeClr val="bg1">
+                    <a:lumMod val="75000"/>
+                  </a:schemeClr>
+                </a:solidFill>
+              </a:rPr>
+              <a:t>erver</a:t>
+            </a:r>
+            <a:endParaRPr lang="de-DE" sz="1200" dirty="0">
+              <a:solidFill>
+                <a:schemeClr val="bg1">
+                  <a:lumMod val="75000"/>
+                </a:schemeClr>
+              </a:solidFill>
+            </a:endParaRPr>
+          </a:p>
+          <a:p>
+            <a:r>
+              <a:rPr lang="de-DE" sz="1200" dirty="0" err="1">
+                <a:solidFill>
+                  <a:srgbClr val="00B050"/>
+                </a:solidFill>
+              </a:rPr>
+              <a:t>fd</a:t>
+            </a:r>
+            <a:endParaRPr lang="de-DE" sz="1200" dirty="0">
+              <a:solidFill>
+                <a:srgbClr val="00B050"/>
+              </a:solidFill>
+            </a:endParaRPr>
+          </a:p>
+          <a:p>
+            <a:r>
+              <a:rPr lang="de-DE" sz="1200">
+                <a:solidFill>
+                  <a:srgbClr val="00B050"/>
+                </a:solidFill>
+              </a:rPr>
+              <a:t>fc</a:t>
+            </a:r>
+            <a:endParaRPr lang="de-DE" sz="1200" dirty="0">
+              <a:solidFill>
+                <a:srgbClr val="00B050"/>
+              </a:solidFill>
+            </a:endParaRPr>
+          </a:p>
+          <a:p>
+            <a:endParaRPr lang="de-DE" sz="1200" dirty="0">
+              <a:solidFill>
+                <a:srgbClr val="00B050"/>
+              </a:solidFill>
+            </a:endParaRPr>
+          </a:p>
+          <a:p>
+            <a:endParaRPr lang="de-DE" sz="1200" dirty="0">
+              <a:solidFill>
+                <a:srgbClr val="00B050"/>
+              </a:solidFill>
+            </a:endParaRPr>
+          </a:p>
+        </p:txBody>
+      </p:sp>
+      <p:sp>
+        <p:nvSpPr>
+          <p:cNvPr id="9" name="Textfeld 8"/>
+          <p:cNvSpPr txBox="1"/>
+          <p:nvPr/>
+        </p:nvSpPr>
+        <p:spPr>
+          <a:xfrm>
+            <a:off x="3671036" y="2186286"/>
+            <a:ext cx="1227300" cy="1754326"/>
+          </a:xfrm>
+          <a:prstGeom prst="rect">
+            <a:avLst/>
+          </a:prstGeom>
+          <a:solidFill>
+            <a:srgbClr val="FFFAEB"/>
+          </a:solidFill>
+          <a:ln>
+            <a:solidFill>
+              <a:srgbClr val="00B050"/>
+            </a:solidFill>
+          </a:ln>
+        </p:spPr>
+        <p:txBody>
+          <a:bodyPr wrap="square" rtlCol="0">
+            <a:spAutoFit/>
+          </a:bodyPr>
+          <a:lstStyle/>
+          <a:p>
+            <a:endParaRPr lang="de-DE" sz="1200" dirty="0">
+              <a:solidFill>
+                <a:srgbClr val="00B050"/>
+              </a:solidFill>
+            </a:endParaRPr>
+          </a:p>
+          <a:p>
+            <a:endParaRPr lang="de-DE" sz="1200" dirty="0">
+              <a:solidFill>
+                <a:srgbClr val="00B050"/>
+              </a:solidFill>
+            </a:endParaRPr>
+          </a:p>
+          <a:p>
+            <a:endParaRPr lang="de-DE" sz="1200" dirty="0">
+              <a:solidFill>
+                <a:srgbClr val="00B050"/>
+              </a:solidFill>
+            </a:endParaRPr>
+          </a:p>
+          <a:p>
+            <a:endParaRPr lang="de-DE" sz="1200" dirty="0">
+              <a:solidFill>
+                <a:srgbClr val="00B050"/>
+              </a:solidFill>
+            </a:endParaRPr>
+          </a:p>
+          <a:p>
+            <a:r>
+              <a:rPr lang="de-DE" sz="1200" dirty="0" err="1">
+                <a:solidFill>
+                  <a:srgbClr val="00B050"/>
+                </a:solidFill>
+              </a:rPr>
+              <a:t>p</a:t>
+            </a:r>
+            <a:r>
+              <a:rPr lang="de-DE" sz="1200" dirty="0" err="1">
+                <a:solidFill>
+                  <a:schemeClr val="bg1">
+                    <a:lumMod val="75000"/>
+                  </a:schemeClr>
+                </a:solidFill>
+              </a:rPr>
+              <a:t>rofile</a:t>
+            </a:r>
+            <a:endParaRPr lang="de-DE" sz="1200" dirty="0">
+              <a:solidFill>
+                <a:schemeClr val="bg1">
+                  <a:lumMod val="75000"/>
+                </a:schemeClr>
+              </a:solidFill>
+            </a:endParaRPr>
+          </a:p>
+          <a:p>
+            <a:endParaRPr lang="de-DE" sz="1200" dirty="0">
+              <a:solidFill>
+                <a:schemeClr val="bg1">
+                  <a:lumMod val="75000"/>
+                </a:schemeClr>
+              </a:solidFill>
+            </a:endParaRPr>
+          </a:p>
+          <a:p>
+            <a:endParaRPr lang="de-DE" sz="1200" dirty="0">
+              <a:solidFill>
+                <a:srgbClr val="0070C0"/>
+              </a:solidFill>
+            </a:endParaRPr>
+          </a:p>
+          <a:p>
+            <a:endParaRPr lang="de-DE" sz="1200" dirty="0">
+              <a:solidFill>
+                <a:srgbClr val="0070C0"/>
+              </a:solidFill>
+            </a:endParaRPr>
+          </a:p>
+          <a:p>
+            <a:endParaRPr lang="de-DE" sz="1200" dirty="0">
+              <a:solidFill>
+                <a:srgbClr val="0070C0"/>
+              </a:solidFill>
+            </a:endParaRPr>
+          </a:p>
+        </p:txBody>
+      </p:sp>
+      <p:sp>
+        <p:nvSpPr>
+          <p:cNvPr id="15" name="Textfeld 14"/>
+          <p:cNvSpPr txBox="1"/>
+          <p:nvPr/>
+        </p:nvSpPr>
+        <p:spPr>
+          <a:xfrm>
+            <a:off x="5089794" y="1286689"/>
+            <a:ext cx="1426830" cy="2862322"/>
+          </a:xfrm>
+          <a:prstGeom prst="rect">
+            <a:avLst/>
+          </a:prstGeom>
+          <a:solidFill>
+            <a:schemeClr val="bg1"/>
+          </a:solidFill>
+          <a:ln>
+            <a:solidFill>
+              <a:srgbClr val="C00000"/>
+            </a:solidFill>
+          </a:ln>
+        </p:spPr>
+        <p:txBody>
+          <a:bodyPr wrap="square" rtlCol="0">
+            <a:spAutoFit/>
+          </a:bodyPr>
+          <a:lstStyle/>
+          <a:p>
+            <a:pPr>
+              <a:tabLst>
+                <a:tab pos="358775" algn="l"/>
+              </a:tabLst>
+            </a:pPr>
+            <a:r>
+              <a:rPr lang="de-DE" sz="1200" i="1" dirty="0" err="1"/>
+              <a:t>only</a:t>
+            </a:r>
+            <a:r>
+              <a:rPr lang="de-DE" sz="1200" i="1" dirty="0"/>
+              <a:t> </a:t>
+            </a:r>
+            <a:r>
+              <a:rPr lang="de-DE" sz="1200" i="1" dirty="0" err="1"/>
+              <a:t>for</a:t>
+            </a:r>
+            <a:r>
+              <a:rPr lang="de-DE" sz="1200" i="1" dirty="0"/>
+              <a:t>: </a:t>
+            </a:r>
+          </a:p>
+          <a:p>
+            <a:pPr marL="171450" indent="-171450">
+              <a:buFontTx/>
+              <a:buChar char="-"/>
+              <a:tabLst>
+                <a:tab pos="358775" algn="l"/>
+              </a:tabLst>
+            </a:pPr>
+            <a:r>
+              <a:rPr lang="de-DE" sz="1200" i="1" dirty="0" err="1"/>
+              <a:t>OperationClient</a:t>
+            </a:r>
+            <a:endParaRPr lang="de-DE" sz="1200" i="1" dirty="0"/>
+          </a:p>
+          <a:p>
+            <a:pPr marL="171450" indent="-171450">
+              <a:buFontTx/>
+              <a:buChar char="-"/>
+              <a:tabLst>
+                <a:tab pos="358775" algn="l"/>
+              </a:tabLst>
+            </a:pPr>
+            <a:r>
+              <a:rPr lang="de-DE" sz="1200" i="1" dirty="0" err="1"/>
+              <a:t>OperationServer</a:t>
+            </a:r>
+            <a:endParaRPr lang="de-DE" sz="1200" i="1" dirty="0"/>
+          </a:p>
+          <a:p>
+            <a:pPr marL="171450" indent="-171450">
+              <a:buFontTx/>
+              <a:buChar char="-"/>
+              <a:tabLst>
+                <a:tab pos="358775" algn="l"/>
+              </a:tabLst>
+            </a:pPr>
+            <a:r>
+              <a:rPr lang="de-DE" sz="1200" i="1" dirty="0" err="1"/>
+              <a:t>Fc</a:t>
+            </a:r>
+            <a:r>
+              <a:rPr lang="de-DE" sz="1200" i="1" dirty="0"/>
+              <a:t> </a:t>
+            </a:r>
+            <a:r>
+              <a:rPr lang="de-DE" sz="1200" i="1" dirty="0" err="1"/>
+              <a:t>for</a:t>
+            </a:r>
+            <a:r>
+              <a:rPr lang="de-DE" sz="1200" i="1" dirty="0"/>
+              <a:t> </a:t>
+            </a:r>
+            <a:r>
+              <a:rPr lang="de-DE" sz="1200" i="1" dirty="0" err="1"/>
+              <a:t>operations</a:t>
+            </a:r>
+            <a:endParaRPr lang="de-DE" sz="1200" i="1" dirty="0"/>
+          </a:p>
+          <a:p>
+            <a:pPr>
+              <a:tabLst>
+                <a:tab pos="358775" algn="l"/>
+              </a:tabLst>
+            </a:pPr>
+            <a:endParaRPr lang="de-DE" sz="1200" i="1" dirty="0"/>
+          </a:p>
+          <a:p>
+            <a:pPr>
+              <a:tabLst>
+                <a:tab pos="358775" algn="l"/>
+              </a:tabLst>
+            </a:pPr>
+            <a:r>
+              <a:rPr lang="de-DE" sz="1200" i="1" dirty="0"/>
+              <a:t>not </a:t>
+            </a:r>
+            <a:r>
+              <a:rPr lang="de-DE" sz="1200" i="1" dirty="0" err="1"/>
+              <a:t>for</a:t>
+            </a:r>
+            <a:r>
+              <a:rPr lang="de-DE" sz="1200" i="1" dirty="0"/>
+              <a:t>:</a:t>
+            </a:r>
+          </a:p>
+          <a:p>
+            <a:pPr marL="171450" indent="-171450">
+              <a:buFontTx/>
+              <a:buChar char="-"/>
+              <a:tabLst>
+                <a:tab pos="358775" algn="l"/>
+              </a:tabLst>
+            </a:pPr>
+            <a:r>
+              <a:rPr lang="de-DE" sz="1200" i="1" dirty="0" err="1"/>
+              <a:t>HttpClient</a:t>
+            </a:r>
+            <a:r>
+              <a:rPr lang="de-DE" sz="1200" i="1" dirty="0"/>
+              <a:t>/Server</a:t>
+            </a:r>
+          </a:p>
+          <a:p>
+            <a:pPr marL="171450" indent="-171450">
+              <a:buFontTx/>
+              <a:buChar char="-"/>
+              <a:tabLst>
+                <a:tab pos="358775" algn="l"/>
+              </a:tabLst>
+            </a:pPr>
+            <a:r>
+              <a:rPr lang="de-DE" sz="1200" i="1" dirty="0" err="1"/>
+              <a:t>TcpClient</a:t>
+            </a:r>
+            <a:r>
+              <a:rPr lang="de-DE" sz="1200" i="1" dirty="0"/>
+              <a:t>/Server</a:t>
+            </a:r>
+          </a:p>
+          <a:p>
+            <a:pPr marL="171450" indent="-171450">
+              <a:buFontTx/>
+              <a:buChar char="-"/>
+              <a:tabLst>
+                <a:tab pos="358775" algn="l"/>
+              </a:tabLst>
+            </a:pPr>
+            <a:r>
+              <a:rPr lang="de-DE" sz="1200" i="1" dirty="0" err="1"/>
+              <a:t>any</a:t>
+            </a:r>
+            <a:r>
+              <a:rPr lang="de-DE" sz="1200" i="1" dirty="0"/>
+              <a:t> </a:t>
+            </a:r>
+            <a:r>
+              <a:rPr lang="de-DE" sz="1200" i="1" dirty="0" err="1"/>
+              <a:t>profile</a:t>
+            </a:r>
+            <a:r>
+              <a:rPr lang="de-DE" sz="1200" i="1" dirty="0"/>
+              <a:t>, </a:t>
+            </a:r>
+            <a:r>
+              <a:rPr lang="de-DE" sz="1200" i="1" dirty="0" err="1"/>
+              <a:t>fd</a:t>
+            </a:r>
+            <a:r>
+              <a:rPr lang="de-DE" sz="1200" i="1" dirty="0"/>
+              <a:t> </a:t>
+            </a:r>
+            <a:r>
+              <a:rPr lang="de-DE" sz="1200" i="1" dirty="0" err="1"/>
+              <a:t>or</a:t>
+            </a:r>
+            <a:r>
+              <a:rPr lang="de-DE" sz="1200" i="1" dirty="0"/>
+              <a:t> link!</a:t>
+            </a:r>
+          </a:p>
+          <a:p>
+            <a:pPr>
+              <a:tabLst>
+                <a:tab pos="358775" algn="l"/>
+              </a:tabLst>
+            </a:pPr>
+            <a:endParaRPr lang="de-DE" sz="1200" dirty="0">
+              <a:solidFill>
+                <a:srgbClr val="C00000"/>
+              </a:solidFill>
+            </a:endParaRPr>
+          </a:p>
+          <a:p>
+            <a:pPr>
+              <a:tabLst>
+                <a:tab pos="358775" algn="l"/>
+              </a:tabLst>
+            </a:pPr>
+            <a:r>
+              <a:rPr lang="de-DE" sz="1200" dirty="0" err="1">
+                <a:solidFill>
+                  <a:srgbClr val="C00000"/>
+                </a:solidFill>
+              </a:rPr>
+              <a:t>bm</a:t>
+            </a:r>
+            <a:r>
+              <a:rPr lang="de-DE" sz="1200" dirty="0">
+                <a:solidFill>
+                  <a:srgbClr val="C00000"/>
+                </a:solidFill>
+              </a:rPr>
+              <a:t>	</a:t>
+            </a:r>
+            <a:r>
+              <a:rPr lang="de-DE" sz="1200" dirty="0" err="1">
+                <a:solidFill>
+                  <a:schemeClr val="bg1">
+                    <a:lumMod val="75000"/>
+                  </a:schemeClr>
+                </a:solidFill>
+              </a:rPr>
+              <a:t>basic</a:t>
+            </a:r>
+            <a:r>
+              <a:rPr lang="de-DE" sz="1200" dirty="0">
+                <a:solidFill>
+                  <a:schemeClr val="bg1">
+                    <a:lumMod val="75000"/>
+                  </a:schemeClr>
+                </a:solidFill>
+              </a:rPr>
+              <a:t> </a:t>
+            </a:r>
+            <a:r>
+              <a:rPr lang="de-DE" sz="1200" dirty="0" err="1">
+                <a:solidFill>
+                  <a:schemeClr val="bg1">
+                    <a:lumMod val="75000"/>
+                  </a:schemeClr>
+                </a:solidFill>
+              </a:rPr>
+              <a:t>mgmt</a:t>
+            </a:r>
+            <a:endParaRPr lang="de-DE" sz="1200" dirty="0">
+              <a:solidFill>
+                <a:schemeClr val="bg1">
+                  <a:lumMod val="75000"/>
+                </a:schemeClr>
+              </a:solidFill>
+            </a:endParaRPr>
+          </a:p>
+          <a:p>
+            <a:pPr>
+              <a:tabLst>
+                <a:tab pos="358775" algn="l"/>
+              </a:tabLst>
+            </a:pPr>
+            <a:r>
+              <a:rPr lang="de-DE" sz="1200" dirty="0">
+                <a:solidFill>
+                  <a:srgbClr val="C00000"/>
+                </a:solidFill>
+              </a:rPr>
+              <a:t>im	</a:t>
+            </a:r>
+            <a:r>
+              <a:rPr lang="de-DE" sz="1200" dirty="0" err="1">
+                <a:solidFill>
+                  <a:schemeClr val="bg1">
+                    <a:lumMod val="75000"/>
+                  </a:schemeClr>
+                </a:solidFill>
+              </a:rPr>
+              <a:t>indiv</a:t>
+            </a:r>
+            <a:r>
+              <a:rPr lang="de-DE" sz="1200" dirty="0">
+                <a:solidFill>
+                  <a:schemeClr val="bg1">
+                    <a:lumMod val="75000"/>
+                  </a:schemeClr>
+                </a:solidFill>
+              </a:rPr>
+              <a:t>. </a:t>
+            </a:r>
+            <a:r>
+              <a:rPr lang="de-DE" sz="1200" dirty="0" err="1">
+                <a:solidFill>
+                  <a:schemeClr val="bg1">
+                    <a:lumMod val="75000"/>
+                  </a:schemeClr>
+                </a:solidFill>
+              </a:rPr>
+              <a:t>mgmt</a:t>
+            </a:r>
+            <a:endParaRPr lang="de-DE" sz="1200" dirty="0">
+              <a:solidFill>
+                <a:schemeClr val="bg1">
+                  <a:lumMod val="75000"/>
+                </a:schemeClr>
+              </a:solidFill>
+            </a:endParaRPr>
+          </a:p>
+          <a:p>
+            <a:pPr>
+              <a:tabLst>
+                <a:tab pos="358775" algn="l"/>
+              </a:tabLst>
+            </a:pPr>
+            <a:r>
+              <a:rPr lang="de-DE" sz="1200" dirty="0" err="1">
+                <a:solidFill>
+                  <a:srgbClr val="C00000"/>
+                </a:solidFill>
+              </a:rPr>
+              <a:t>bs</a:t>
+            </a:r>
+            <a:r>
+              <a:rPr lang="de-DE" sz="1200" dirty="0">
+                <a:solidFill>
+                  <a:srgbClr val="C00000"/>
+                </a:solidFill>
+              </a:rPr>
+              <a:t>	</a:t>
+            </a:r>
+            <a:r>
+              <a:rPr lang="de-DE" sz="1200" dirty="0" err="1">
+                <a:solidFill>
+                  <a:schemeClr val="bg1">
+                    <a:lumMod val="75000"/>
+                  </a:schemeClr>
+                </a:solidFill>
+              </a:rPr>
+              <a:t>basic</a:t>
+            </a:r>
+            <a:r>
+              <a:rPr lang="de-DE" sz="1200" dirty="0">
+                <a:solidFill>
+                  <a:schemeClr val="bg1">
+                    <a:lumMod val="75000"/>
+                  </a:schemeClr>
+                </a:solidFill>
+              </a:rPr>
+              <a:t> </a:t>
+            </a:r>
+            <a:r>
+              <a:rPr lang="de-DE" sz="1200" dirty="0" err="1">
+                <a:solidFill>
+                  <a:schemeClr val="bg1">
+                    <a:lumMod val="75000"/>
+                  </a:schemeClr>
+                </a:solidFill>
+              </a:rPr>
+              <a:t>service</a:t>
+            </a:r>
+            <a:r>
+              <a:rPr lang="de-DE" sz="1200" dirty="0">
+                <a:solidFill>
+                  <a:srgbClr val="C00000"/>
+                </a:solidFill>
+              </a:rPr>
+              <a:t>    </a:t>
+            </a:r>
+          </a:p>
+          <a:p>
+            <a:pPr>
+              <a:tabLst>
+                <a:tab pos="358775" algn="l"/>
+              </a:tabLst>
+            </a:pPr>
+            <a:r>
+              <a:rPr lang="de-DE" sz="1200" dirty="0" err="1">
+                <a:solidFill>
+                  <a:srgbClr val="C00000"/>
+                </a:solidFill>
+              </a:rPr>
+              <a:t>is</a:t>
+            </a:r>
+            <a:r>
+              <a:rPr lang="de-DE" sz="1200" dirty="0">
+                <a:solidFill>
+                  <a:srgbClr val="C00000"/>
+                </a:solidFill>
+              </a:rPr>
+              <a:t>	</a:t>
+            </a:r>
+            <a:r>
+              <a:rPr lang="de-DE" sz="1200" dirty="0" err="1">
+                <a:solidFill>
+                  <a:schemeClr val="bg1">
+                    <a:lumMod val="75000"/>
+                  </a:schemeClr>
+                </a:solidFill>
+              </a:rPr>
+              <a:t>indiv</a:t>
+            </a:r>
+            <a:r>
+              <a:rPr lang="de-DE" sz="1200" dirty="0">
+                <a:solidFill>
+                  <a:schemeClr val="bg1">
+                    <a:lumMod val="75000"/>
+                  </a:schemeClr>
+                </a:solidFill>
+              </a:rPr>
+              <a:t>. Service</a:t>
+            </a:r>
+          </a:p>
+        </p:txBody>
+      </p:sp>
+      <p:cxnSp>
+        <p:nvCxnSpPr>
+          <p:cNvPr id="17" name="Gerade Verbindung mit Pfeil 16"/>
+          <p:cNvCxnSpPr>
+            <a:cxnSpLocks/>
+          </p:cNvCxnSpPr>
+          <p:nvPr/>
+        </p:nvCxnSpPr>
+        <p:spPr>
+          <a:xfrm>
+            <a:off x="4203774" y="916579"/>
+            <a:ext cx="863183" cy="637901"/>
+          </a:xfrm>
+          <a:prstGeom prst="straightConnector1">
+            <a:avLst/>
+          </a:prstGeom>
+          <a:ln>
+            <a:solidFill>
+              <a:schemeClr val="tx1"/>
+            </a:solidFill>
+            <a:tailEnd type="triangle"/>
+          </a:ln>
+        </p:spPr>
+        <p:style>
+          <a:lnRef idx="1">
+            <a:schemeClr val="accent1"/>
+          </a:lnRef>
+          <a:fillRef idx="0">
+            <a:schemeClr val="accent1"/>
+          </a:fillRef>
+          <a:effectRef idx="0">
+            <a:schemeClr val="accent1"/>
+          </a:effectRef>
+          <a:fontRef idx="minor">
+            <a:schemeClr val="tx1"/>
+          </a:fontRef>
+        </p:style>
+      </p:cxnSp>
+      <p:sp>
+        <p:nvSpPr>
+          <p:cNvPr id="19" name="Textfeld 18"/>
+          <p:cNvSpPr txBox="1"/>
+          <p:nvPr/>
+        </p:nvSpPr>
+        <p:spPr>
+          <a:xfrm>
+            <a:off x="6652127" y="1130240"/>
+            <a:ext cx="2215207" cy="1015663"/>
+          </a:xfrm>
+          <a:prstGeom prst="rect">
+            <a:avLst/>
+          </a:prstGeom>
+          <a:solidFill>
+            <a:schemeClr val="bg1"/>
+          </a:solidFill>
+          <a:ln>
+            <a:solidFill>
+              <a:schemeClr val="accent2">
+                <a:lumMod val="50000"/>
+              </a:schemeClr>
+            </a:solidFill>
+          </a:ln>
+        </p:spPr>
+        <p:txBody>
+          <a:bodyPr wrap="square" rtlCol="0">
+            <a:spAutoFit/>
+          </a:bodyPr>
+          <a:lstStyle/>
+          <a:p>
+            <a:r>
+              <a:rPr lang="de-DE" sz="1200" i="1" dirty="0" err="1"/>
+              <a:t>only</a:t>
+            </a:r>
+            <a:r>
+              <a:rPr lang="de-DE" sz="1200" i="1" dirty="0"/>
+              <a:t> </a:t>
+            </a:r>
+            <a:r>
+              <a:rPr lang="de-DE" sz="1200" i="1" dirty="0" err="1"/>
+              <a:t>for</a:t>
+            </a:r>
+            <a:r>
+              <a:rPr lang="de-DE" sz="1200" i="1" dirty="0"/>
+              <a:t> </a:t>
+            </a:r>
+            <a:r>
+              <a:rPr lang="de-DE" sz="1200" i="1" dirty="0" err="1"/>
+              <a:t>OperationClients</a:t>
+            </a:r>
+            <a:r>
+              <a:rPr lang="de-DE" sz="1200" i="1" dirty="0"/>
+              <a:t> !</a:t>
+            </a:r>
+          </a:p>
+          <a:p>
+            <a:r>
+              <a:rPr lang="de-DE" sz="1200" i="1" dirty="0"/>
+              <a:t>Abbreviation &amp; release </a:t>
+            </a:r>
+            <a:r>
+              <a:rPr lang="de-DE" sz="1200" i="1" dirty="0" err="1"/>
+              <a:t>number</a:t>
+            </a:r>
+            <a:r>
+              <a:rPr lang="de-DE" sz="1200" i="1" dirty="0"/>
+              <a:t> </a:t>
+            </a:r>
+            <a:r>
+              <a:rPr lang="de-DE" sz="1200" i="1" dirty="0" err="1"/>
+              <a:t>of</a:t>
+            </a:r>
+            <a:r>
+              <a:rPr lang="de-DE" sz="1200" i="1" dirty="0"/>
+              <a:t> </a:t>
+            </a:r>
+            <a:r>
+              <a:rPr lang="de-DE" sz="1200" i="1" dirty="0" err="1"/>
+              <a:t>target</a:t>
+            </a:r>
+            <a:r>
+              <a:rPr lang="de-DE" sz="1200" i="1" dirty="0"/>
+              <a:t> </a:t>
+            </a:r>
+            <a:r>
+              <a:rPr lang="de-DE" sz="1200" i="1" dirty="0" err="1"/>
+              <a:t>application</a:t>
+            </a:r>
+            <a:endParaRPr lang="de-DE" sz="1200" i="1" dirty="0"/>
+          </a:p>
+          <a:p>
+            <a:endParaRPr lang="de-DE" sz="1200" dirty="0">
+              <a:solidFill>
+                <a:schemeClr val="accent2">
+                  <a:lumMod val="75000"/>
+                </a:schemeClr>
+              </a:solidFill>
+            </a:endParaRPr>
+          </a:p>
+          <a:p>
+            <a:r>
+              <a:rPr lang="de-DE" sz="1200" i="1" dirty="0"/>
+              <a:t>e.g. </a:t>
+            </a:r>
+            <a:r>
+              <a:rPr lang="de-DE" sz="1200" dirty="0">
+                <a:solidFill>
+                  <a:schemeClr val="accent2">
+                    <a:lumMod val="75000"/>
+                  </a:schemeClr>
+                </a:solidFill>
+              </a:rPr>
+              <a:t>mwdi-1-0-1</a:t>
+            </a:r>
+          </a:p>
+        </p:txBody>
+      </p:sp>
+      <p:sp>
+        <p:nvSpPr>
+          <p:cNvPr id="20" name="Textfeld 19"/>
+          <p:cNvSpPr txBox="1"/>
+          <p:nvPr/>
+        </p:nvSpPr>
+        <p:spPr>
+          <a:xfrm>
+            <a:off x="9063917" y="825023"/>
+            <a:ext cx="1689428" cy="1015663"/>
+          </a:xfrm>
+          <a:prstGeom prst="rect">
+            <a:avLst/>
+          </a:prstGeom>
+          <a:solidFill>
+            <a:schemeClr val="bg1"/>
+          </a:solidFill>
+          <a:ln>
+            <a:solidFill>
+              <a:schemeClr val="accent2">
+                <a:lumMod val="50000"/>
+              </a:schemeClr>
+            </a:solidFill>
+          </a:ln>
+        </p:spPr>
+        <p:txBody>
+          <a:bodyPr wrap="square" rtlCol="0">
+            <a:spAutoFit/>
+          </a:bodyPr>
+          <a:lstStyle/>
+          <a:p>
+            <a:r>
+              <a:rPr lang="de-DE" sz="1200" i="1"/>
+              <a:t>decimal number with 3 digits</a:t>
+            </a:r>
+          </a:p>
+          <a:p>
+            <a:endParaRPr lang="de-DE" sz="1200" i="1"/>
+          </a:p>
+          <a:p>
+            <a:endParaRPr lang="de-DE" sz="1200" i="1"/>
+          </a:p>
+          <a:p>
+            <a:r>
+              <a:rPr lang="de-DE" sz="1200" i="1"/>
+              <a:t>e.g. </a:t>
+            </a:r>
+            <a:r>
+              <a:rPr lang="de-DE" sz="1200" i="1">
+                <a:solidFill>
+                  <a:srgbClr val="7030A0"/>
+                </a:solidFill>
+              </a:rPr>
+              <a:t>002</a:t>
+            </a:r>
+            <a:endParaRPr lang="de-DE" sz="1200">
+              <a:solidFill>
+                <a:srgbClr val="7030A0"/>
+              </a:solidFill>
+            </a:endParaRPr>
+          </a:p>
+        </p:txBody>
+      </p:sp>
+      <p:cxnSp>
+        <p:nvCxnSpPr>
+          <p:cNvPr id="25" name="Gerade Verbindung mit Pfeil 24"/>
+          <p:cNvCxnSpPr>
+            <a:cxnSpLocks/>
+          </p:cNvCxnSpPr>
+          <p:nvPr/>
+        </p:nvCxnSpPr>
+        <p:spPr>
+          <a:xfrm>
+            <a:off x="4197423" y="1136717"/>
+            <a:ext cx="888972" cy="649411"/>
+          </a:xfrm>
+          <a:prstGeom prst="straightConnector1">
+            <a:avLst/>
+          </a:prstGeom>
+          <a:ln>
+            <a:solidFill>
+              <a:schemeClr val="tx1"/>
+            </a:solidFill>
+            <a:tailEnd type="triangle"/>
+          </a:ln>
+        </p:spPr>
+        <p:style>
+          <a:lnRef idx="1">
+            <a:schemeClr val="accent1"/>
+          </a:lnRef>
+          <a:fillRef idx="0">
+            <a:schemeClr val="accent1"/>
+          </a:fillRef>
+          <a:effectRef idx="0">
+            <a:schemeClr val="accent1"/>
+          </a:effectRef>
+          <a:fontRef idx="minor">
+            <a:schemeClr val="tx1"/>
+          </a:fontRef>
+        </p:style>
+      </p:cxnSp>
+      <p:cxnSp>
+        <p:nvCxnSpPr>
+          <p:cNvPr id="26" name="Gerade Verbindung mit Pfeil 25"/>
+          <p:cNvCxnSpPr>
+            <a:cxnSpLocks/>
+          </p:cNvCxnSpPr>
+          <p:nvPr/>
+        </p:nvCxnSpPr>
+        <p:spPr>
+          <a:xfrm>
+            <a:off x="4203774" y="922331"/>
+            <a:ext cx="2394644" cy="268294"/>
+          </a:xfrm>
+          <a:prstGeom prst="straightConnector1">
+            <a:avLst/>
+          </a:prstGeom>
+          <a:ln>
+            <a:solidFill>
+              <a:schemeClr val="tx1"/>
+            </a:solidFill>
+            <a:tailEnd type="triangle"/>
+          </a:ln>
+        </p:spPr>
+        <p:style>
+          <a:lnRef idx="1">
+            <a:schemeClr val="accent1"/>
+          </a:lnRef>
+          <a:fillRef idx="0">
+            <a:schemeClr val="accent1"/>
+          </a:fillRef>
+          <a:effectRef idx="0">
+            <a:schemeClr val="accent1"/>
+          </a:effectRef>
+          <a:fontRef idx="minor">
+            <a:schemeClr val="tx1"/>
+          </a:fontRef>
+        </p:style>
+      </p:cxnSp>
+      <p:cxnSp>
+        <p:nvCxnSpPr>
+          <p:cNvPr id="16" name="Gerade Verbindung mit Pfeil 15">
+            <a:extLst>
+              <a:ext uri="{FF2B5EF4-FFF2-40B4-BE49-F238E27FC236}">
+                <a16:creationId xmlns:a16="http://schemas.microsoft.com/office/drawing/2014/main" id="{E451CFCA-62BA-4828-8143-288032C2F4FF}"/>
+              </a:ext>
+            </a:extLst>
+          </p:cNvPr>
+          <p:cNvCxnSpPr>
+            <a:cxnSpLocks/>
+          </p:cNvCxnSpPr>
+          <p:nvPr/>
+        </p:nvCxnSpPr>
+        <p:spPr>
+          <a:xfrm>
+            <a:off x="4183380" y="1514340"/>
+            <a:ext cx="903015" cy="491926"/>
+          </a:xfrm>
+          <a:prstGeom prst="straightConnector1">
+            <a:avLst/>
+          </a:prstGeom>
+          <a:ln>
+            <a:solidFill>
+              <a:schemeClr val="tx1"/>
+            </a:solidFill>
+            <a:tailEnd type="triangle"/>
+          </a:ln>
+        </p:spPr>
+        <p:style>
+          <a:lnRef idx="1">
+            <a:schemeClr val="accent1"/>
+          </a:lnRef>
+          <a:fillRef idx="0">
+            <a:schemeClr val="accent1"/>
+          </a:fillRef>
+          <a:effectRef idx="0">
+            <a:schemeClr val="accent1"/>
+          </a:effectRef>
+          <a:fontRef idx="minor">
+            <a:schemeClr val="tx1"/>
+          </a:fontRef>
+        </p:style>
+      </p:cxnSp>
+      <p:cxnSp>
+        <p:nvCxnSpPr>
+          <p:cNvPr id="12" name="Gerader Verbinder 11">
+            <a:extLst>
+              <a:ext uri="{FF2B5EF4-FFF2-40B4-BE49-F238E27FC236}">
+                <a16:creationId xmlns:a16="http://schemas.microsoft.com/office/drawing/2014/main" id="{29861638-C847-46B0-A46D-0AC2F4F3DD83}"/>
+              </a:ext>
+            </a:extLst>
+          </p:cNvPr>
+          <p:cNvCxnSpPr>
+            <a:cxnSpLocks/>
+          </p:cNvCxnSpPr>
+          <p:nvPr/>
+        </p:nvCxnSpPr>
+        <p:spPr>
+          <a:xfrm>
+            <a:off x="3208849" y="879123"/>
+            <a:ext cx="981449" cy="55245"/>
+          </a:xfrm>
+          <a:prstGeom prst="line">
+            <a:avLst/>
+          </a:prstGeom>
+          <a:ln>
+            <a:solidFill>
+              <a:schemeClr val="tx1"/>
+            </a:solidFill>
+            <a:headEnd type="diamond"/>
+            <a:tailEnd type="diamond"/>
+          </a:ln>
+        </p:spPr>
+        <p:style>
+          <a:lnRef idx="1">
+            <a:schemeClr val="accent1"/>
+          </a:lnRef>
+          <a:fillRef idx="0">
+            <a:schemeClr val="accent1"/>
+          </a:fillRef>
+          <a:effectRef idx="0">
+            <a:schemeClr val="accent1"/>
+          </a:effectRef>
+          <a:fontRef idx="minor">
+            <a:schemeClr val="tx1"/>
+          </a:fontRef>
+        </p:style>
+      </p:cxnSp>
+      <p:cxnSp>
+        <p:nvCxnSpPr>
+          <p:cNvPr id="24" name="Gerader Verbinder 23">
+            <a:extLst>
+              <a:ext uri="{FF2B5EF4-FFF2-40B4-BE49-F238E27FC236}">
+                <a16:creationId xmlns:a16="http://schemas.microsoft.com/office/drawing/2014/main" id="{71650663-CBBD-4AA4-8729-CA7CBF32CB90}"/>
+              </a:ext>
+            </a:extLst>
+          </p:cNvPr>
+          <p:cNvCxnSpPr>
+            <a:cxnSpLocks/>
+          </p:cNvCxnSpPr>
+          <p:nvPr/>
+        </p:nvCxnSpPr>
+        <p:spPr>
+          <a:xfrm>
+            <a:off x="3208849" y="879123"/>
+            <a:ext cx="981329" cy="251117"/>
+          </a:xfrm>
+          <a:prstGeom prst="line">
+            <a:avLst/>
+          </a:prstGeom>
+          <a:ln>
+            <a:solidFill>
+              <a:schemeClr val="tx1"/>
+            </a:solidFill>
+            <a:headEnd type="diamond"/>
+            <a:tailEnd type="diamond"/>
+          </a:ln>
+        </p:spPr>
+        <p:style>
+          <a:lnRef idx="1">
+            <a:schemeClr val="accent1"/>
+          </a:lnRef>
+          <a:fillRef idx="0">
+            <a:schemeClr val="accent1"/>
+          </a:fillRef>
+          <a:effectRef idx="0">
+            <a:schemeClr val="accent1"/>
+          </a:effectRef>
+          <a:fontRef idx="minor">
+            <a:schemeClr val="tx1"/>
+          </a:fontRef>
+        </p:style>
+      </p:cxnSp>
+      <p:cxnSp>
+        <p:nvCxnSpPr>
+          <p:cNvPr id="30" name="Gerader Verbinder 29">
+            <a:extLst>
+              <a:ext uri="{FF2B5EF4-FFF2-40B4-BE49-F238E27FC236}">
+                <a16:creationId xmlns:a16="http://schemas.microsoft.com/office/drawing/2014/main" id="{97D2B7D8-4FF1-4242-9A30-7EBEDD8B63F3}"/>
+              </a:ext>
+            </a:extLst>
+          </p:cNvPr>
+          <p:cNvCxnSpPr>
+            <a:cxnSpLocks/>
+          </p:cNvCxnSpPr>
+          <p:nvPr/>
+        </p:nvCxnSpPr>
+        <p:spPr>
+          <a:xfrm>
+            <a:off x="3175688" y="862712"/>
+            <a:ext cx="990697" cy="635217"/>
+          </a:xfrm>
+          <a:prstGeom prst="line">
+            <a:avLst/>
+          </a:prstGeom>
+          <a:ln>
+            <a:solidFill>
+              <a:schemeClr val="tx1"/>
+            </a:solidFill>
+            <a:headEnd type="diamond"/>
+            <a:tailEnd type="diamond"/>
+          </a:ln>
+        </p:spPr>
+        <p:style>
+          <a:lnRef idx="1">
+            <a:schemeClr val="accent1"/>
+          </a:lnRef>
+          <a:fillRef idx="0">
+            <a:schemeClr val="accent1"/>
+          </a:fillRef>
+          <a:effectRef idx="0">
+            <a:schemeClr val="accent1"/>
+          </a:effectRef>
+          <a:fontRef idx="minor">
+            <a:schemeClr val="tx1"/>
+          </a:fontRef>
+        </p:style>
+      </p:cxnSp>
+      <p:cxnSp>
+        <p:nvCxnSpPr>
+          <p:cNvPr id="44" name="Gerader Verbinder 43">
+            <a:extLst>
+              <a:ext uri="{FF2B5EF4-FFF2-40B4-BE49-F238E27FC236}">
+                <a16:creationId xmlns:a16="http://schemas.microsoft.com/office/drawing/2014/main" id="{20D01D81-D756-445F-8139-1BEB07ADBDED}"/>
+              </a:ext>
+            </a:extLst>
+          </p:cNvPr>
+          <p:cNvCxnSpPr>
+            <a:stCxn id="7" idx="3"/>
+            <a:endCxn id="9" idx="1"/>
+          </p:cNvCxnSpPr>
+          <p:nvPr/>
+        </p:nvCxnSpPr>
+        <p:spPr>
+          <a:xfrm>
+            <a:off x="3520096" y="3063449"/>
+            <a:ext cx="150940" cy="0"/>
+          </a:xfrm>
+          <a:prstGeom prst="line">
+            <a:avLst/>
+          </a:prstGeom>
+        </p:spPr>
+        <p:style>
+          <a:lnRef idx="1">
+            <a:schemeClr val="accent1"/>
+          </a:lnRef>
+          <a:fillRef idx="0">
+            <a:schemeClr val="accent1"/>
+          </a:fillRef>
+          <a:effectRef idx="0">
+            <a:schemeClr val="accent1"/>
+          </a:effectRef>
+          <a:fontRef idx="minor">
+            <a:schemeClr val="tx1"/>
+          </a:fontRef>
+        </p:style>
+      </p:cxnSp>
+      <p:cxnSp>
+        <p:nvCxnSpPr>
+          <p:cNvPr id="45" name="Gerader Verbinder 44">
+            <a:extLst>
+              <a:ext uri="{FF2B5EF4-FFF2-40B4-BE49-F238E27FC236}">
+                <a16:creationId xmlns:a16="http://schemas.microsoft.com/office/drawing/2014/main" id="{E68A7D18-0E7F-4423-85B7-11B08FA035F1}"/>
+              </a:ext>
+            </a:extLst>
+          </p:cNvPr>
+          <p:cNvCxnSpPr>
+            <a:cxnSpLocks/>
+            <a:stCxn id="6" idx="3"/>
+            <a:endCxn id="8" idx="1"/>
+          </p:cNvCxnSpPr>
+          <p:nvPr/>
+        </p:nvCxnSpPr>
+        <p:spPr>
+          <a:xfrm flipV="1">
+            <a:off x="3520097" y="1425188"/>
+            <a:ext cx="154612" cy="92333"/>
+          </a:xfrm>
+          <a:prstGeom prst="line">
+            <a:avLst/>
+          </a:prstGeom>
+        </p:spPr>
+        <p:style>
+          <a:lnRef idx="1">
+            <a:schemeClr val="accent1"/>
+          </a:lnRef>
+          <a:fillRef idx="0">
+            <a:schemeClr val="accent1"/>
+          </a:fillRef>
+          <a:effectRef idx="0">
+            <a:schemeClr val="accent1"/>
+          </a:effectRef>
+          <a:fontRef idx="minor">
+            <a:schemeClr val="tx1"/>
+          </a:fontRef>
+        </p:style>
+      </p:cxnSp>
+      <p:sp>
+        <p:nvSpPr>
+          <p:cNvPr id="3" name="Rechteck 2">
+            <a:extLst>
+              <a:ext uri="{FF2B5EF4-FFF2-40B4-BE49-F238E27FC236}">
+                <a16:creationId xmlns:a16="http://schemas.microsoft.com/office/drawing/2014/main" id="{2FA9C97E-512F-09EC-ACCC-2BEF6E6AF27E}"/>
+              </a:ext>
+            </a:extLst>
+          </p:cNvPr>
+          <p:cNvSpPr/>
+          <p:nvPr/>
+        </p:nvSpPr>
+        <p:spPr>
+          <a:xfrm>
+            <a:off x="100900" y="4555494"/>
+            <a:ext cx="7100834" cy="1180918"/>
+          </a:xfrm>
+          <a:prstGeom prst="rect">
+            <a:avLst/>
+          </a:prstGeom>
+          <a:solidFill>
+            <a:schemeClr val="bg1">
+              <a:lumMod val="95000"/>
+            </a:schemeClr>
+          </a:solidFill>
+          <a:ln w="6350"/>
+        </p:spPr>
+        <p:style>
+          <a:lnRef idx="2">
+            <a:schemeClr val="accent1">
+              <a:shade val="15000"/>
+            </a:schemeClr>
+          </a:lnRef>
+          <a:fillRef idx="1">
+            <a:schemeClr val="accent1"/>
+          </a:fillRef>
+          <a:effectRef idx="0">
+            <a:schemeClr val="accent1"/>
+          </a:effectRef>
+          <a:fontRef idx="minor">
+            <a:schemeClr val="lt1"/>
+          </a:fontRef>
+        </p:style>
+        <p:txBody>
+          <a:bodyPr rtlCol="0" anchor="ctr"/>
+          <a:lstStyle/>
+          <a:p>
+            <a:pPr algn="ctr"/>
+            <a:endParaRPr lang="de-DE"/>
+          </a:p>
+        </p:txBody>
+      </p:sp>
+      <p:sp>
+        <p:nvSpPr>
+          <p:cNvPr id="10" name="Textfeld 9">
+            <a:extLst>
+              <a:ext uri="{FF2B5EF4-FFF2-40B4-BE49-F238E27FC236}">
+                <a16:creationId xmlns:a16="http://schemas.microsoft.com/office/drawing/2014/main" id="{88185C42-2881-1BBA-4ADF-5F7C8D395454}"/>
+              </a:ext>
+            </a:extLst>
+          </p:cNvPr>
+          <p:cNvSpPr txBox="1"/>
+          <p:nvPr/>
+        </p:nvSpPr>
+        <p:spPr>
+          <a:xfrm>
+            <a:off x="100900" y="4555494"/>
+            <a:ext cx="5592408" cy="261610"/>
+          </a:xfrm>
+          <a:prstGeom prst="rect">
+            <a:avLst/>
+          </a:prstGeom>
+          <a:noFill/>
+        </p:spPr>
+        <p:txBody>
+          <a:bodyPr wrap="square" rtlCol="0">
+            <a:spAutoFit/>
+          </a:bodyPr>
+          <a:lstStyle/>
+          <a:p>
+            <a:r>
+              <a:rPr lang="de-DE" sz="1100" b="1" i="1"/>
+              <a:t>Special case</a:t>
+            </a:r>
+            <a:r>
+              <a:rPr lang="de-DE" sz="1100" i="1"/>
+              <a:t>: put/get/del services for direct ElasticSearch manipulation (e.g. used in MWDI)</a:t>
+            </a:r>
+          </a:p>
+        </p:txBody>
+      </p:sp>
+      <p:sp>
+        <p:nvSpPr>
+          <p:cNvPr id="11" name="Rechteck 10">
+            <a:extLst>
+              <a:ext uri="{FF2B5EF4-FFF2-40B4-BE49-F238E27FC236}">
+                <a16:creationId xmlns:a16="http://schemas.microsoft.com/office/drawing/2014/main" id="{60416EA2-11EB-ED2D-C973-DB3700CEA264}"/>
+              </a:ext>
+            </a:extLst>
+          </p:cNvPr>
+          <p:cNvSpPr/>
+          <p:nvPr/>
+        </p:nvSpPr>
+        <p:spPr>
+          <a:xfrm>
+            <a:off x="72833" y="4861721"/>
+            <a:ext cx="8090022" cy="246221"/>
+          </a:xfrm>
+          <a:prstGeom prst="rect">
+            <a:avLst/>
+          </a:prstGeom>
+          <a:noFill/>
+        </p:spPr>
+        <p:txBody>
+          <a:bodyPr wrap="square">
+            <a:spAutoFit/>
+          </a:bodyPr>
+          <a:lstStyle/>
+          <a:p>
+            <a:r>
+              <a:rPr lang="en-US" sz="1000" b="0" i="0" dirty="0">
+                <a:effectLst/>
+                <a:latin typeface="Consolas" panose="020B0609020204030204" pitchFamily="49" charset="0"/>
+                <a:cs typeface="Consolas" panose="020B0609020204030204" pitchFamily="49" charset="0"/>
+              </a:rPr>
+              <a:t>[</a:t>
+            </a:r>
+            <a:r>
+              <a:rPr lang="en-US" sz="1000" b="0" i="0" dirty="0" err="1">
+                <a:effectLst/>
+                <a:latin typeface="Consolas" panose="020B0609020204030204" pitchFamily="49" charset="0"/>
+                <a:cs typeface="Consolas" panose="020B0609020204030204" pitchFamily="49" charset="0"/>
+              </a:rPr>
+              <a:t>OwnApplicationID</a:t>
+            </a:r>
+            <a:r>
+              <a:rPr lang="en-US" sz="1000" b="0" i="0" dirty="0">
+                <a:effectLst/>
+                <a:latin typeface="Consolas" panose="020B0609020204030204" pitchFamily="49" charset="0"/>
+                <a:cs typeface="Consolas" panose="020B0609020204030204" pitchFamily="49" charset="0"/>
+              </a:rPr>
+              <a:t>]-</a:t>
+            </a:r>
+            <a:r>
+              <a:rPr lang="en-US" sz="1000" b="0" i="0" dirty="0">
+                <a:solidFill>
+                  <a:srgbClr val="0070C0"/>
+                </a:solidFill>
+                <a:effectLst/>
+                <a:latin typeface="Consolas" panose="020B0609020204030204" pitchFamily="49" charset="0"/>
+                <a:cs typeface="Consolas" panose="020B0609020204030204" pitchFamily="49" charset="0"/>
+              </a:rPr>
+              <a:t>[</a:t>
+            </a:r>
+            <a:r>
+              <a:rPr lang="en-US" sz="1000" b="0" i="0" err="1">
+                <a:solidFill>
+                  <a:srgbClr val="0070C0"/>
+                </a:solidFill>
+                <a:effectLst/>
+                <a:latin typeface="Consolas" panose="020B0609020204030204" pitchFamily="49" charset="0"/>
+                <a:cs typeface="Consolas" panose="020B0609020204030204" pitchFamily="49" charset="0"/>
+              </a:rPr>
+              <a:t>LayerID</a:t>
+            </a:r>
+            <a:r>
+              <a:rPr lang="en-US" sz="1000" b="0" i="0">
+                <a:solidFill>
+                  <a:srgbClr val="0070C0"/>
+                </a:solidFill>
+                <a:effectLst/>
+                <a:latin typeface="Consolas" panose="020B0609020204030204" pitchFamily="49" charset="0"/>
+                <a:cs typeface="Consolas" panose="020B0609020204030204" pitchFamily="49" charset="0"/>
+              </a:rPr>
+              <a:t>]</a:t>
+            </a:r>
+            <a:r>
+              <a:rPr lang="en-US" sz="1000" b="0" i="0">
+                <a:effectLst/>
+                <a:latin typeface="Consolas" panose="020B0609020204030204" pitchFamily="49" charset="0"/>
+                <a:cs typeface="Consolas" panose="020B0609020204030204" pitchFamily="49" charset="0"/>
+              </a:rPr>
+              <a:t>-</a:t>
+            </a:r>
+            <a:r>
+              <a:rPr lang="en-US" sz="1000" b="0" i="0">
+                <a:solidFill>
+                  <a:srgbClr val="00B050"/>
+                </a:solidFill>
+                <a:effectLst/>
+                <a:latin typeface="Consolas" panose="020B0609020204030204" pitchFamily="49" charset="0"/>
+                <a:cs typeface="Consolas" panose="020B0609020204030204" pitchFamily="49" charset="0"/>
+              </a:rPr>
+              <a:t>[</a:t>
+            </a:r>
+            <a:r>
+              <a:rPr lang="en-US" sz="1000" b="0" i="0" err="1">
+                <a:solidFill>
+                  <a:srgbClr val="00B050"/>
+                </a:solidFill>
+                <a:effectLst/>
+                <a:latin typeface="Consolas" panose="020B0609020204030204" pitchFamily="49" charset="0"/>
+                <a:cs typeface="Consolas" panose="020B0609020204030204" pitchFamily="49" charset="0"/>
+              </a:rPr>
+              <a:t>ObjectType</a:t>
+            </a:r>
+            <a:r>
+              <a:rPr lang="en-US" sz="1000" b="0" i="0">
+                <a:solidFill>
+                  <a:srgbClr val="00B050"/>
+                </a:solidFill>
+                <a:effectLst/>
+                <a:latin typeface="Consolas" panose="020B0609020204030204" pitchFamily="49" charset="0"/>
+                <a:cs typeface="Consolas" panose="020B0609020204030204" pitchFamily="49" charset="0"/>
+              </a:rPr>
+              <a:t>]</a:t>
+            </a:r>
+            <a:r>
+              <a:rPr lang="en-US" sz="1000" b="0" i="0">
+                <a:effectLst/>
+                <a:latin typeface="Consolas" panose="020B0609020204030204" pitchFamily="49" charset="0"/>
+                <a:cs typeface="Consolas" panose="020B0609020204030204" pitchFamily="49" charset="0"/>
+              </a:rPr>
+              <a:t>-</a:t>
+            </a:r>
+            <a:r>
+              <a:rPr lang="en-US" sz="1000" b="0" i="0">
+                <a:solidFill>
+                  <a:schemeClr val="accent4">
+                    <a:lumMod val="75000"/>
+                  </a:schemeClr>
+                </a:solidFill>
+                <a:effectLst/>
+                <a:latin typeface="Consolas" panose="020B0609020204030204" pitchFamily="49" charset="0"/>
+                <a:cs typeface="Consolas" panose="020B0609020204030204" pitchFamily="49" charset="0"/>
+              </a:rPr>
+              <a:t>[ElasticSearchOperationInfo]</a:t>
+            </a:r>
+            <a:r>
+              <a:rPr lang="en-US" sz="1000" b="0" i="0">
+                <a:effectLst/>
+                <a:latin typeface="Consolas" panose="020B0609020204030204" pitchFamily="49" charset="0"/>
+                <a:cs typeface="Consolas" panose="020B0609020204030204" pitchFamily="49" charset="0"/>
+              </a:rPr>
+              <a:t>-</a:t>
+            </a:r>
+            <a:r>
+              <a:rPr lang="en-US" sz="1000" b="0" i="0">
+                <a:solidFill>
+                  <a:srgbClr val="C00000"/>
+                </a:solidFill>
+                <a:effectLst/>
+                <a:latin typeface="Consolas" panose="020B0609020204030204" pitchFamily="49" charset="0"/>
+                <a:cs typeface="Consolas" panose="020B0609020204030204" pitchFamily="49" charset="0"/>
+              </a:rPr>
+              <a:t>[ApiSegment]</a:t>
+            </a:r>
+            <a:r>
+              <a:rPr lang="en-US" sz="1000" b="0" i="0">
+                <a:effectLst/>
+                <a:latin typeface="Consolas" panose="020B0609020204030204" pitchFamily="49" charset="0"/>
+                <a:cs typeface="Consolas" panose="020B0609020204030204" pitchFamily="49" charset="0"/>
+              </a:rPr>
+              <a:t>-</a:t>
+            </a:r>
+            <a:r>
+              <a:rPr lang="en-US" sz="1000" b="0" i="0">
+                <a:solidFill>
+                  <a:srgbClr val="7030A0"/>
+                </a:solidFill>
+                <a:effectLst/>
+                <a:latin typeface="Consolas" panose="020B0609020204030204" pitchFamily="49" charset="0"/>
+                <a:cs typeface="Consolas" panose="020B0609020204030204" pitchFamily="49" charset="0"/>
+              </a:rPr>
+              <a:t>[</a:t>
+            </a:r>
+            <a:r>
+              <a:rPr lang="en-US" sz="1000" b="0" i="0" dirty="0" err="1">
+                <a:solidFill>
+                  <a:srgbClr val="7030A0"/>
+                </a:solidFill>
+                <a:effectLst/>
+                <a:latin typeface="Consolas" panose="020B0609020204030204" pitchFamily="49" charset="0"/>
+                <a:cs typeface="Consolas" panose="020B0609020204030204" pitchFamily="49" charset="0"/>
+              </a:rPr>
+              <a:t>SequenceNumber</a:t>
+            </a:r>
+            <a:r>
+              <a:rPr lang="en-US" sz="1000" b="0" i="0" dirty="0">
+                <a:solidFill>
+                  <a:srgbClr val="7030A0"/>
+                </a:solidFill>
+                <a:effectLst/>
+                <a:latin typeface="Consolas" panose="020B0609020204030204" pitchFamily="49" charset="0"/>
+                <a:cs typeface="Consolas" panose="020B0609020204030204" pitchFamily="49" charset="0"/>
+              </a:rPr>
+              <a:t>]</a:t>
+            </a:r>
+            <a:endParaRPr lang="de-DE" sz="1000" dirty="0">
+              <a:solidFill>
+                <a:srgbClr val="7030A0"/>
+              </a:solidFill>
+              <a:latin typeface="Consolas" panose="020B0609020204030204" pitchFamily="49" charset="0"/>
+              <a:cs typeface="Consolas" panose="020B0609020204030204" pitchFamily="49" charset="0"/>
+            </a:endParaRPr>
+          </a:p>
+        </p:txBody>
+      </p:sp>
+      <p:sp>
+        <p:nvSpPr>
+          <p:cNvPr id="13" name="Textfeld 12">
+            <a:extLst>
+              <a:ext uri="{FF2B5EF4-FFF2-40B4-BE49-F238E27FC236}">
+                <a16:creationId xmlns:a16="http://schemas.microsoft.com/office/drawing/2014/main" id="{5330E395-0BF0-4709-27FB-C2B54B3330EE}"/>
+              </a:ext>
+            </a:extLst>
+          </p:cNvPr>
+          <p:cNvSpPr txBox="1"/>
+          <p:nvPr/>
+        </p:nvSpPr>
+        <p:spPr>
+          <a:xfrm>
+            <a:off x="3785071" y="5118642"/>
+            <a:ext cx="405107" cy="553998"/>
+          </a:xfrm>
+          <a:prstGeom prst="rect">
+            <a:avLst/>
+          </a:prstGeom>
+          <a:solidFill>
+            <a:schemeClr val="bg1"/>
+          </a:solidFill>
+          <a:ln w="3175">
+            <a:solidFill>
+              <a:schemeClr val="accent2">
+                <a:lumMod val="50000"/>
+              </a:schemeClr>
+            </a:solidFill>
+          </a:ln>
+        </p:spPr>
+        <p:txBody>
+          <a:bodyPr wrap="square" rtlCol="0">
+            <a:spAutoFit/>
+          </a:bodyPr>
+          <a:lstStyle/>
+          <a:p>
+            <a:r>
+              <a:rPr lang="de-DE" sz="1000">
+                <a:solidFill>
+                  <a:schemeClr val="accent4">
+                    <a:lumMod val="75000"/>
+                  </a:schemeClr>
+                </a:solidFill>
+              </a:rPr>
+              <a:t>get</a:t>
+            </a:r>
+          </a:p>
+          <a:p>
+            <a:r>
+              <a:rPr lang="de-DE" sz="1000">
+                <a:solidFill>
+                  <a:schemeClr val="accent4">
+                    <a:lumMod val="75000"/>
+                  </a:schemeClr>
+                </a:solidFill>
+              </a:rPr>
+              <a:t>put</a:t>
+            </a:r>
+          </a:p>
+          <a:p>
+            <a:r>
+              <a:rPr lang="de-DE" sz="1000">
+                <a:solidFill>
+                  <a:schemeClr val="accent4">
+                    <a:lumMod val="75000"/>
+                  </a:schemeClr>
+                </a:solidFill>
+              </a:rPr>
+              <a:t>del</a:t>
+            </a:r>
+          </a:p>
+        </p:txBody>
+      </p:sp>
+    </p:spTree>
+    <p:extLst>
+      <p:ext uri="{BB962C8B-B14F-4D97-AF65-F5344CB8AC3E}">
+        <p14:creationId xmlns:p14="http://schemas.microsoft.com/office/powerpoint/2010/main" val="1869668747"/>
+      </p:ext>
+    </p:extLst>
+  </p:cSld>
+  <p:clrMapOvr>
+    <a:masterClrMapping/>
+  </p:clrMapOvr>
+</p:sld>
+</file>
+
 <file path=ppt/theme/theme1.xml><?xml version="1.0" encoding="utf-8"?>
 <a:theme xmlns:a="http://schemas.openxmlformats.org/drawingml/2006/main" name="Office Theme">
   <a:themeElements>

</xml_diff>